<commit_message>
Final presentation slides for demo.
</commit_message>
<xml_diff>
--- a/d3/CSC301 TDSB Education app final presentation.pptx
+++ b/d3/CSC301 TDSB Education app final presentation.pptx
@@ -5,10 +5,10 @@
     <p:sldMasterId id="2147483648" r:id="rId4"/>
   </p:sldMasterIdLst>
   <p:notesMasterIdLst>
-    <p:notesMasterId r:id="rId16"/>
+    <p:notesMasterId r:id="rId18"/>
   </p:notesMasterIdLst>
   <p:handoutMasterIdLst>
-    <p:handoutMasterId r:id="rId17"/>
+    <p:handoutMasterId r:id="rId19"/>
   </p:handoutMasterIdLst>
   <p:sldIdLst>
     <p:sldId id="256" r:id="rId5"/>
@@ -16,15 +16,17 @@
     <p:sldId id="274" r:id="rId7"/>
     <p:sldId id="275" r:id="rId8"/>
     <p:sldId id="276" r:id="rId9"/>
-    <p:sldId id="278" r:id="rId10"/>
+    <p:sldId id="280" r:id="rId10"/>
     <p:sldId id="279" r:id="rId11"/>
-    <p:sldId id="280" r:id="rId12"/>
+    <p:sldId id="278" r:id="rId12"/>
     <p:sldId id="277" r:id="rId13"/>
-    <p:sldId id="281" r:id="rId14"/>
-    <p:sldId id="264" r:id="rId15"/>
+    <p:sldId id="283" r:id="rId14"/>
+    <p:sldId id="282" r:id="rId15"/>
+    <p:sldId id="281" r:id="rId16"/>
+    <p:sldId id="264" r:id="rId17"/>
   </p:sldIdLst>
   <p:sldSz cx="9144000" cy="6858000" type="screen4x3"/>
-  <p:notesSz cx="6858000" cy="9144000"/>
+  <p:notesSz cx="6858000" cy="1695450"/>
   <p:defaultTextStyle>
     <a:defPPr>
       <a:defRPr lang="en-US"/>
@@ -131,6 +133,22 @@
 </p:presentation>
 </file>
 
+<file path=ppt/revisionInfo.xml><?xml version="1.0" encoding="utf-8"?>
+<p1510:revInfo xmlns:a="http://schemas.openxmlformats.org/drawingml/2006/main" xmlns:r="http://schemas.openxmlformats.org/officeDocument/2006/relationships" xmlns:p1510="http://schemas.microsoft.com/office/powerpoint/2015/10/main">
+  <p1510:revLst>
+    <p1510:client id="{1A886CED-2615-49F5-833E-25027BC51652}" v="310" dt="2019-12-01T22:27:01.366"/>
+    <p1510:client id="{1DEDFADF-0383-41FF-8498-BCECD30305AD}" v="441" dt="2019-12-01T21:29:33.302"/>
+    <p1510:client id="{28D5F29E-EC9D-4660-8CD3-4A827FFE4250}" v="438" dt="2019-12-01T21:24:37.034"/>
+    <p1510:client id="{2B651934-2DDE-43FD-94BF-327B8DF9FE7A}" v="2128" dt="2019-12-02T01:33:35.658"/>
+    <p1510:client id="{3C66685E-56E6-42E7-8A48-5D0104AA3597}" v="181" dt="2019-12-01T21:23:31.481"/>
+    <p1510:client id="{6BC22695-2845-4807-B1B9-592C3E63FD4C}" v="36" dt="2019-12-01T21:17:37.299"/>
+    <p1510:client id="{6BF37F1D-CAC5-4487-81E1-AB32A7DCBF0E}" v="18" dt="2019-12-01T21:29:32.748"/>
+    <p1510:client id="{7B7A1361-C5F3-4482-BAC5-9EB41DD3BF06}" v="10" dt="2019-12-01T21:05:40.763"/>
+    <p1510:client id="{8F17442D-E337-4639-9536-4FDA37CAAD90}" v="82" dt="2019-12-01T21:52:10.720"/>
+  </p1510:revLst>
+</p1510:revInfo>
+</file>
+
 <file path=ppt/handoutMasters/handoutMaster1.xml><?xml version="1.0" encoding="utf-8"?>
 <p:handoutMaster xmlns:a="http://schemas.openxmlformats.org/drawingml/2006/main" xmlns:r="http://schemas.openxmlformats.org/officeDocument/2006/relationships" xmlns:p="http://schemas.openxmlformats.org/presentationml/2006/main">
   <p:cSld>
@@ -225,7 +243,7 @@
           <a:p>
             <a:fld id="{73B2889B-A0AC-4482-8592-5C96F2309420}" type="datetimeFigureOut">
               <a:rPr lang="en-US" smtClean="0"/>
-              <a:t>11/30/2019</a:t>
+              <a:t>12/1/2019</a:t>
             </a:fld>
             <a:endParaRPr lang="en-US"/>
           </a:p>
@@ -402,7 +420,7 @@
           <a:p>
             <a:fld id="{830EB223-FFC0-462A-A3B8-EAA7CE0F8CBD}" type="datetimeFigureOut">
               <a:rPr lang="en-US" smtClean="0"/>
-              <a:t>11/30/2019</a:t>
+              <a:t>12/1/2019</a:t>
             </a:fld>
             <a:endParaRPr lang="en-US" dirty="0"/>
           </a:p>
@@ -696,6 +714,285 @@
             <p:ph type="sldImg"/>
           </p:nvPr>
         </p:nvSpPr>
+        <p:spPr/>
+      </p:sp>
+      <p:sp>
+        <p:nvSpPr>
+          <p:cNvPr id="3" name="Notes Placeholder 2"/>
+          <p:cNvSpPr>
+            <a:spLocks noGrp="1"/>
+          </p:cNvSpPr>
+          <p:nvPr>
+            <p:ph type="body" idx="1"/>
+          </p:nvPr>
+        </p:nvSpPr>
+        <p:spPr/>
+        <p:txBody>
+          <a:bodyPr/>
+          <a:lstStyle/>
+          <a:p>
+            <a:r>
+              <a:rPr lang="en-CA" dirty="0"/>
+              <a:t>Arian (part of 5min demo)</a:t>
+            </a:r>
+          </a:p>
+          <a:p>
+            <a:r>
+              <a:rPr lang="en-CA" dirty="0"/>
+              <a:t>Partner is Veronica, a teacher at a school in the Toronto district school board. She wants this app to be used for her classrooms as a replacement for the paper agenda.</a:t>
+            </a:r>
+          </a:p>
+          <a:p>
+            <a:r>
+              <a:rPr lang="en-CA" dirty="0"/>
+              <a:t>A key criterion was that they wanted integration with google classroom to pull data from all the assignments they have on their classes and to get their due dates.</a:t>
+            </a:r>
+          </a:p>
+        </p:txBody>
+      </p:sp>
+      <p:sp>
+        <p:nvSpPr>
+          <p:cNvPr id="4" name="Slide Number Placeholder 3"/>
+          <p:cNvSpPr>
+            <a:spLocks noGrp="1"/>
+          </p:cNvSpPr>
+          <p:nvPr>
+            <p:ph type="sldNum" sz="quarter" idx="5"/>
+          </p:nvPr>
+        </p:nvSpPr>
+        <p:spPr/>
+        <p:txBody>
+          <a:bodyPr/>
+          <a:lstStyle/>
+          <a:p>
+            <a:fld id="{BC849E9A-41F7-4779-A581-48A7C374A227}" type="slidenum">
+              <a:rPr lang="en-US" smtClean="0"/>
+              <a:t>2</a:t>
+            </a:fld>
+            <a:endParaRPr lang="en-US" dirty="0"/>
+          </a:p>
+        </p:txBody>
+      </p:sp>
+    </p:spTree>
+    <p:extLst>
+      <p:ext uri="{BB962C8B-B14F-4D97-AF65-F5344CB8AC3E}">
+        <p14:creationId xmlns:p14="http://schemas.microsoft.com/office/powerpoint/2010/main" val="4219246846"/>
+      </p:ext>
+    </p:extLst>
+  </p:cSld>
+  <p:clrMapOvr>
+    <a:masterClrMapping/>
+  </p:clrMapOvr>
+</p:notes>
+</file>
+
+<file path=ppt/notesSlides/notesSlide10.xml><?xml version="1.0" encoding="utf-8"?>
+<p:notes xmlns:a="http://schemas.openxmlformats.org/drawingml/2006/main" xmlns:r="http://schemas.openxmlformats.org/officeDocument/2006/relationships" xmlns:p="http://schemas.openxmlformats.org/presentationml/2006/main">
+  <p:cSld>
+    <p:spTree>
+      <p:nvGrpSpPr>
+        <p:cNvPr id="1" name=""/>
+        <p:cNvGrpSpPr/>
+        <p:nvPr/>
+      </p:nvGrpSpPr>
+      <p:grpSpPr>
+        <a:xfrm>
+          <a:off x="0" y="0"/>
+          <a:ext cx="0" cy="0"/>
+          <a:chOff x="0" y="0"/>
+          <a:chExt cx="0" cy="0"/>
+        </a:xfrm>
+      </p:grpSpPr>
+      <p:sp>
+        <p:nvSpPr>
+          <p:cNvPr id="2" name="Slide Image Placeholder 1"/>
+          <p:cNvSpPr>
+            <a:spLocks noGrp="1" noRot="1" noChangeAspect="1"/>
+          </p:cNvSpPr>
+          <p:nvPr>
+            <p:ph type="sldImg"/>
+          </p:nvPr>
+        </p:nvSpPr>
+        <p:spPr/>
+      </p:sp>
+      <p:sp>
+        <p:nvSpPr>
+          <p:cNvPr id="3" name="Notes Placeholder 2"/>
+          <p:cNvSpPr>
+            <a:spLocks noGrp="1"/>
+          </p:cNvSpPr>
+          <p:nvPr>
+            <p:ph type="body" idx="1"/>
+          </p:nvPr>
+        </p:nvSpPr>
+        <p:spPr/>
+        <p:txBody>
+          <a:bodyPr/>
+          <a:lstStyle/>
+          <a:p>
+            <a:r>
+              <a:rPr lang="en-CA" dirty="0"/>
+              <a:t>Josh (2min total with last 2 slides)</a:t>
+            </a:r>
+          </a:p>
+        </p:txBody>
+      </p:sp>
+      <p:sp>
+        <p:nvSpPr>
+          <p:cNvPr id="4" name="Slide Number Placeholder 3"/>
+          <p:cNvSpPr>
+            <a:spLocks noGrp="1"/>
+          </p:cNvSpPr>
+          <p:nvPr>
+            <p:ph type="sldNum" sz="quarter" idx="5"/>
+          </p:nvPr>
+        </p:nvSpPr>
+        <p:spPr/>
+        <p:txBody>
+          <a:bodyPr/>
+          <a:lstStyle/>
+          <a:p>
+            <a:fld id="{BC849E9A-41F7-4779-A581-48A7C374A227}" type="slidenum">
+              <a:rPr lang="en-US" smtClean="0"/>
+              <a:t>11</a:t>
+            </a:fld>
+            <a:endParaRPr lang="en-US" dirty="0"/>
+          </a:p>
+        </p:txBody>
+      </p:sp>
+    </p:spTree>
+    <p:extLst>
+      <p:ext uri="{BB962C8B-B14F-4D97-AF65-F5344CB8AC3E}">
+        <p14:creationId xmlns:p14="http://schemas.microsoft.com/office/powerpoint/2010/main" val="1046804971"/>
+      </p:ext>
+    </p:extLst>
+  </p:cSld>
+  <p:clrMapOvr>
+    <a:masterClrMapping/>
+  </p:clrMapOvr>
+</p:notes>
+</file>
+
+<file path=ppt/notesSlides/notesSlide11.xml><?xml version="1.0" encoding="utf-8"?>
+<p:notes xmlns:a="http://schemas.openxmlformats.org/drawingml/2006/main" xmlns:r="http://schemas.openxmlformats.org/officeDocument/2006/relationships" xmlns:p="http://schemas.openxmlformats.org/presentationml/2006/main">
+  <p:cSld>
+    <p:spTree>
+      <p:nvGrpSpPr>
+        <p:cNvPr id="1" name=""/>
+        <p:cNvGrpSpPr/>
+        <p:nvPr/>
+      </p:nvGrpSpPr>
+      <p:grpSpPr>
+        <a:xfrm>
+          <a:off x="0" y="0"/>
+          <a:ext cx="0" cy="0"/>
+          <a:chOff x="0" y="0"/>
+          <a:chExt cx="0" cy="0"/>
+        </a:xfrm>
+      </p:grpSpPr>
+      <p:sp>
+        <p:nvSpPr>
+          <p:cNvPr id="2" name="Slide Image Placeholder 1"/>
+          <p:cNvSpPr>
+            <a:spLocks noGrp="1" noRot="1" noChangeAspect="1"/>
+          </p:cNvSpPr>
+          <p:nvPr>
+            <p:ph type="sldImg"/>
+          </p:nvPr>
+        </p:nvSpPr>
+        <p:spPr/>
+      </p:sp>
+      <p:sp>
+        <p:nvSpPr>
+          <p:cNvPr id="3" name="Notes Placeholder 2"/>
+          <p:cNvSpPr>
+            <a:spLocks noGrp="1"/>
+          </p:cNvSpPr>
+          <p:nvPr>
+            <p:ph type="body" idx="1"/>
+          </p:nvPr>
+        </p:nvSpPr>
+        <p:spPr/>
+        <p:txBody>
+          <a:bodyPr/>
+          <a:lstStyle/>
+          <a:p>
+            <a:r>
+              <a:rPr lang="en-CA" dirty="0"/>
+              <a:t>30 seconds each</a:t>
+            </a:r>
+          </a:p>
+          <a:p>
+            <a:r>
+              <a:rPr lang="en-CA" dirty="0"/>
+              <a:t>Arian: Main contribution was calendar view. It takes in all the goals from firebase and displays them on the calendar based on their due dates. They show up as dots on the calendar. If you click on a day with goals, you see the goal title. The main lesson learned here was to learn how to use APIs with limited documentation. Flutter as a whole was new, but the calendar API is not a native API for flutter so reading about that with limited documentation was a challenge. Updating elements of the calendar was also new to me and I realized I was greatly limited by the attributes defined in the API. I had to work with the data structure the API used which in this case was a Map of events.</a:t>
+            </a:r>
+          </a:p>
+        </p:txBody>
+      </p:sp>
+      <p:sp>
+        <p:nvSpPr>
+          <p:cNvPr id="4" name="Slide Number Placeholder 3"/>
+          <p:cNvSpPr>
+            <a:spLocks noGrp="1"/>
+          </p:cNvSpPr>
+          <p:nvPr>
+            <p:ph type="sldNum" sz="quarter" idx="5"/>
+          </p:nvPr>
+        </p:nvSpPr>
+        <p:spPr/>
+        <p:txBody>
+          <a:bodyPr/>
+          <a:lstStyle/>
+          <a:p>
+            <a:fld id="{BC849E9A-41F7-4779-A581-48A7C374A227}" type="slidenum">
+              <a:rPr lang="en-US" smtClean="0"/>
+              <a:t>12</a:t>
+            </a:fld>
+            <a:endParaRPr lang="en-US" dirty="0"/>
+          </a:p>
+        </p:txBody>
+      </p:sp>
+    </p:spTree>
+    <p:extLst>
+      <p:ext uri="{BB962C8B-B14F-4D97-AF65-F5344CB8AC3E}">
+        <p14:creationId xmlns:p14="http://schemas.microsoft.com/office/powerpoint/2010/main" val="2484218576"/>
+      </p:ext>
+    </p:extLst>
+  </p:cSld>
+  <p:clrMapOvr>
+    <a:masterClrMapping/>
+  </p:clrMapOvr>
+</p:notes>
+</file>
+
+<file path=ppt/notesSlides/notesSlide12.xml><?xml version="1.0" encoding="utf-8"?>
+<p:notes xmlns:a="http://schemas.openxmlformats.org/drawingml/2006/main" xmlns:r="http://schemas.openxmlformats.org/officeDocument/2006/relationships" xmlns:p="http://schemas.openxmlformats.org/presentationml/2006/main">
+  <p:cSld>
+    <p:spTree>
+      <p:nvGrpSpPr>
+        <p:cNvPr id="1" name=""/>
+        <p:cNvGrpSpPr/>
+        <p:nvPr/>
+      </p:nvGrpSpPr>
+      <p:grpSpPr>
+        <a:xfrm>
+          <a:off x="0" y="0"/>
+          <a:ext cx="0" cy="0"/>
+          <a:chOff x="0" y="0"/>
+          <a:chExt cx="0" cy="0"/>
+        </a:xfrm>
+      </p:grpSpPr>
+      <p:sp>
+        <p:nvSpPr>
+          <p:cNvPr id="2" name="Slide Image Placeholder 1"/>
+          <p:cNvSpPr>
+            <a:spLocks noGrp="1" noRot="1" noChangeAspect="1"/>
+          </p:cNvSpPr>
+          <p:nvPr>
+            <p:ph type="sldImg"/>
+          </p:nvPr>
+        </p:nvSpPr>
         <p:spPr>
           <a:xfrm>
             <a:off x="1371600" y="1143000"/>
@@ -718,98 +1015,11 @@
           <a:bodyPr/>
           <a:lstStyle/>
           <a:p>
-            <a:r>
-              <a:rPr lang="en-US" dirty="0">
-                <a:latin typeface="Segoe UI" panose="020B0502040204020203" pitchFamily="34" charset="0"/>
-                <a:cs typeface="Segoe UI" panose="020B0502040204020203" pitchFamily="34" charset="0"/>
-              </a:rPr>
-              <a:t>You can use this slide as your opening or closing slide.  Should you choose to use it as a closing, make sure you review the main points of your presentation.  One creative way to do that is by adding animations to the various graphics on a slide.  This slide has 4 different graphics, and, when you view the slideshow, you will see that you can click to reveal the next graphic.  Similarly, as you review the main topics in your presentation, you may want each point to show up when you are addressing that topic. </a:t>
-            </a:r>
-          </a:p>
-          <a:p>
-            <a:endParaRPr lang="en-US" dirty="0">
-              <a:latin typeface="Segoe UI" panose="020B0502040204020203" pitchFamily="34" charset="0"/>
-              <a:cs typeface="Segoe UI" panose="020B0502040204020203" pitchFamily="34" charset="0"/>
-            </a:endParaRPr>
-          </a:p>
-          <a:p>
-            <a:r>
-              <a:rPr lang="en-US" b="1" dirty="0">
-                <a:latin typeface="Segoe UI" panose="020B0502040204020203" pitchFamily="34" charset="0"/>
-                <a:cs typeface="Segoe UI" panose="020B0502040204020203" pitchFamily="34" charset="0"/>
-              </a:rPr>
-              <a:t>Add animation to images and graphics: </a:t>
-            </a:r>
-          </a:p>
-          <a:p>
-            <a:pPr marL="228600" indent="-228600">
-              <a:buAutoNum type="arabicPeriod"/>
-            </a:pPr>
-            <a:r>
-              <a:rPr lang="en-US" dirty="0">
-                <a:latin typeface="Segoe UI" panose="020B0502040204020203" pitchFamily="34" charset="0"/>
-                <a:cs typeface="Segoe UI" panose="020B0502040204020203" pitchFamily="34" charset="0"/>
-              </a:rPr>
-              <a:t>Select your image or graphic.</a:t>
-            </a:r>
-          </a:p>
-          <a:p>
-            <a:pPr marL="228600" indent="-228600">
-              <a:buAutoNum type="arabicPeriod"/>
-            </a:pPr>
-            <a:r>
-              <a:rPr lang="en-US" dirty="0">
-                <a:latin typeface="Segoe UI" panose="020B0502040204020203" pitchFamily="34" charset="0"/>
-                <a:cs typeface="Segoe UI" panose="020B0502040204020203" pitchFamily="34" charset="0"/>
-              </a:rPr>
-              <a:t>Click on the Animations tab.</a:t>
-            </a:r>
-          </a:p>
-          <a:p>
-            <a:pPr marL="228600" indent="-228600">
-              <a:buAutoNum type="arabicPeriod"/>
-            </a:pPr>
-            <a:r>
-              <a:rPr lang="en-US" dirty="0">
-                <a:latin typeface="Segoe UI" panose="020B0502040204020203" pitchFamily="34" charset="0"/>
-                <a:cs typeface="Segoe UI" panose="020B0502040204020203" pitchFamily="34" charset="0"/>
-              </a:rPr>
-              <a:t>Choose from the options.  The animation for this slide is “Split”.  The drop-down menu in the Animation section gives even more animations you can use.</a:t>
-            </a:r>
-          </a:p>
-          <a:p>
-            <a:pPr marL="228600" indent="-228600">
-              <a:buAutoNum type="arabicPeriod"/>
-            </a:pPr>
-            <a:r>
-              <a:rPr lang="en-US" dirty="0">
-                <a:latin typeface="Segoe UI" panose="020B0502040204020203" pitchFamily="34" charset="0"/>
-                <a:cs typeface="Segoe UI" panose="020B0502040204020203" pitchFamily="34" charset="0"/>
-              </a:rPr>
-              <a:t>If you have multiple graphics or images, you will see a number appear next to it that notes the order of the animations.</a:t>
-            </a:r>
-          </a:p>
-          <a:p>
-            <a:pPr marL="228600" indent="-228600">
-              <a:buAutoNum type="arabicPeriod"/>
-            </a:pPr>
             <a:endParaRPr lang="en-US" b="1" dirty="0">
               <a:latin typeface="Segoe UI" panose="020B0502040204020203" pitchFamily="34" charset="0"/>
               <a:cs typeface="Segoe UI" panose="020B0502040204020203" pitchFamily="34" charset="0"/>
             </a:endParaRPr>
           </a:p>
-          <a:p>
-            <a:pPr marL="0" indent="0">
-              <a:buNone/>
-            </a:pPr>
-            <a:r>
-              <a:rPr lang="en-US" b="1" dirty="0">
-                <a:latin typeface="Segoe UI" panose="020B0502040204020203" pitchFamily="34" charset="0"/>
-                <a:cs typeface="Segoe UI" panose="020B0502040204020203" pitchFamily="34" charset="0"/>
-              </a:rPr>
-              <a:t>Note: You will want to choose the animations carefully.  You do not want to make your audience dizzy from your presentation.</a:t>
-            </a:r>
-          </a:p>
         </p:txBody>
       </p:sp>
       <p:sp>
@@ -829,7 +1039,7 @@
           <a:p>
             <a:fld id="{BC849E9A-41F7-4779-A581-48A7C374A227}" type="slidenum">
               <a:rPr lang="en-US" smtClean="0"/>
-              <a:t>11</a:t>
+              <a:t>13</a:t>
             </a:fld>
             <a:endParaRPr lang="en-US" dirty="0"/>
           </a:p>
@@ -839,6 +1049,864 @@
     <p:extLst>
       <p:ext uri="{BB962C8B-B14F-4D97-AF65-F5344CB8AC3E}">
         <p14:creationId xmlns:p14="http://schemas.microsoft.com/office/powerpoint/2010/main" val="644202468"/>
+      </p:ext>
+    </p:extLst>
+  </p:cSld>
+  <p:clrMapOvr>
+    <a:masterClrMapping/>
+  </p:clrMapOvr>
+</p:notes>
+</file>
+
+<file path=ppt/notesSlides/notesSlide2.xml><?xml version="1.0" encoding="utf-8"?>
+<p:notes xmlns:a="http://schemas.openxmlformats.org/drawingml/2006/main" xmlns:r="http://schemas.openxmlformats.org/officeDocument/2006/relationships" xmlns:p="http://schemas.openxmlformats.org/presentationml/2006/main">
+  <p:cSld>
+    <p:spTree>
+      <p:nvGrpSpPr>
+        <p:cNvPr id="1" name=""/>
+        <p:cNvGrpSpPr/>
+        <p:nvPr/>
+      </p:nvGrpSpPr>
+      <p:grpSpPr>
+        <a:xfrm>
+          <a:off x="0" y="0"/>
+          <a:ext cx="0" cy="0"/>
+          <a:chOff x="0" y="0"/>
+          <a:chExt cx="0" cy="0"/>
+        </a:xfrm>
+      </p:grpSpPr>
+      <p:sp>
+        <p:nvSpPr>
+          <p:cNvPr id="2" name="Slide Image Placeholder 1"/>
+          <p:cNvSpPr>
+            <a:spLocks noGrp="1" noRot="1" noChangeAspect="1"/>
+          </p:cNvSpPr>
+          <p:nvPr>
+            <p:ph type="sldImg"/>
+          </p:nvPr>
+        </p:nvSpPr>
+        <p:spPr/>
+      </p:sp>
+      <p:sp>
+        <p:nvSpPr>
+          <p:cNvPr id="3" name="Notes Placeholder 2"/>
+          <p:cNvSpPr>
+            <a:spLocks noGrp="1"/>
+          </p:cNvSpPr>
+          <p:nvPr>
+            <p:ph type="body" idx="1"/>
+          </p:nvPr>
+        </p:nvSpPr>
+        <p:spPr/>
+        <p:txBody>
+          <a:bodyPr/>
+          <a:lstStyle/>
+          <a:p>
+            <a:r>
+              <a:rPr lang="en-CA" dirty="0"/>
+              <a:t>Arian (part of 5min demo)</a:t>
+            </a:r>
+          </a:p>
+          <a:p>
+            <a:r>
+              <a:rPr lang="en-CA" dirty="0"/>
+              <a:t>The main idea is for students to improve on their goal setting and time management skills. Our partner also emphasized the important of self regulation, so they wanted limited intervention from the teachers to the students in the app.</a:t>
+            </a:r>
+          </a:p>
+          <a:p>
+            <a:pPr marL="0" marR="0" lvl="0" indent="0" algn="l" defTabSz="914400" rtl="0" eaLnBrk="1" fontAlgn="auto" latinLnBrk="0" hangingPunct="1">
+              <a:lnSpc>
+                <a:spcPct val="100000"/>
+              </a:lnSpc>
+              <a:spcBef>
+                <a:spcPts val="0"/>
+              </a:spcBef>
+              <a:spcAft>
+                <a:spcPts val="0"/>
+              </a:spcAft>
+              <a:buClrTx/>
+              <a:buSzTx/>
+              <a:buFontTx/>
+              <a:buNone/>
+              <a:tabLst/>
+              <a:defRPr/>
+            </a:pPr>
+            <a:r>
+              <a:rPr lang="en-CA" dirty="0"/>
+              <a:t>They also want to make use of students personal devices so they always have access to the goals they set and their upcoming assignments.</a:t>
+            </a:r>
+          </a:p>
+          <a:p>
+            <a:endParaRPr lang="en-CA" dirty="0"/>
+          </a:p>
+        </p:txBody>
+      </p:sp>
+      <p:sp>
+        <p:nvSpPr>
+          <p:cNvPr id="4" name="Slide Number Placeholder 3"/>
+          <p:cNvSpPr>
+            <a:spLocks noGrp="1"/>
+          </p:cNvSpPr>
+          <p:nvPr>
+            <p:ph type="sldNum" sz="quarter" idx="5"/>
+          </p:nvPr>
+        </p:nvSpPr>
+        <p:spPr/>
+        <p:txBody>
+          <a:bodyPr/>
+          <a:lstStyle/>
+          <a:p>
+            <a:fld id="{BC849E9A-41F7-4779-A581-48A7C374A227}" type="slidenum">
+              <a:rPr lang="en-US" smtClean="0"/>
+              <a:t>3</a:t>
+            </a:fld>
+            <a:endParaRPr lang="en-US" dirty="0"/>
+          </a:p>
+        </p:txBody>
+      </p:sp>
+    </p:spTree>
+    <p:extLst>
+      <p:ext uri="{BB962C8B-B14F-4D97-AF65-F5344CB8AC3E}">
+        <p14:creationId xmlns:p14="http://schemas.microsoft.com/office/powerpoint/2010/main" val="2265866999"/>
+      </p:ext>
+    </p:extLst>
+  </p:cSld>
+  <p:clrMapOvr>
+    <a:masterClrMapping/>
+  </p:clrMapOvr>
+</p:notes>
+</file>
+
+<file path=ppt/notesSlides/notesSlide3.xml><?xml version="1.0" encoding="utf-8"?>
+<p:notes xmlns:a="http://schemas.openxmlformats.org/drawingml/2006/main" xmlns:r="http://schemas.openxmlformats.org/officeDocument/2006/relationships" xmlns:p="http://schemas.openxmlformats.org/presentationml/2006/main">
+  <p:cSld>
+    <p:spTree>
+      <p:nvGrpSpPr>
+        <p:cNvPr id="1" name=""/>
+        <p:cNvGrpSpPr/>
+        <p:nvPr/>
+      </p:nvGrpSpPr>
+      <p:grpSpPr>
+        <a:xfrm>
+          <a:off x="0" y="0"/>
+          <a:ext cx="0" cy="0"/>
+          <a:chOff x="0" y="0"/>
+          <a:chExt cx="0" cy="0"/>
+        </a:xfrm>
+      </p:grpSpPr>
+      <p:sp>
+        <p:nvSpPr>
+          <p:cNvPr id="2" name="Slide Image Placeholder 1"/>
+          <p:cNvSpPr>
+            <a:spLocks noGrp="1" noRot="1" noChangeAspect="1"/>
+          </p:cNvSpPr>
+          <p:nvPr>
+            <p:ph type="sldImg"/>
+          </p:nvPr>
+        </p:nvSpPr>
+        <p:spPr/>
+      </p:sp>
+      <p:sp>
+        <p:nvSpPr>
+          <p:cNvPr id="3" name="Notes Placeholder 2"/>
+          <p:cNvSpPr>
+            <a:spLocks noGrp="1"/>
+          </p:cNvSpPr>
+          <p:nvPr>
+            <p:ph type="body" idx="1"/>
+          </p:nvPr>
+        </p:nvSpPr>
+        <p:spPr/>
+        <p:txBody>
+          <a:bodyPr/>
+          <a:lstStyle/>
+          <a:p>
+            <a:r>
+              <a:rPr lang="en-CA" dirty="0"/>
+              <a:t>Arian 5min: We do a walkthrough of adding a goal, show how it updates on all screens.</a:t>
+            </a:r>
+          </a:p>
+          <a:p>
+            <a:r>
+              <a:rPr lang="en-CA" dirty="0"/>
+              <a:t>CLEAR GOALS FROM SETTINGS BEFORE START</a:t>
+            </a:r>
+          </a:p>
+          <a:p>
+            <a:r>
+              <a:rPr lang="en-CA" dirty="0"/>
+              <a:t>Make one goal in the past to show completed late. One goal on current day, and one goal in future.</a:t>
+            </a:r>
+          </a:p>
+          <a:p>
+            <a:r>
+              <a:rPr lang="en-CA" dirty="0"/>
+              <a:t>Show performance screen at each step, then when all goals are added show calendar screen.</a:t>
+            </a:r>
+          </a:p>
+          <a:p>
+            <a:r>
+              <a:rPr lang="en-CA" dirty="0"/>
+              <a:t>After all this, go the my courses view, click on one course where you are student to show assignments.</a:t>
+            </a:r>
+          </a:p>
+          <a:p>
+            <a:r>
+              <a:rPr lang="en-CA" dirty="0"/>
+              <a:t>Then click on course as a teacher to show you can see all students in that course.</a:t>
+            </a:r>
+          </a:p>
+          <a:p>
+            <a:r>
+              <a:rPr lang="en-CA" dirty="0"/>
+              <a:t>ADD DUMMY GOALS TO SETTINGS TO SHOW APP SCALES</a:t>
+            </a:r>
+          </a:p>
+        </p:txBody>
+      </p:sp>
+      <p:sp>
+        <p:nvSpPr>
+          <p:cNvPr id="4" name="Slide Number Placeholder 3"/>
+          <p:cNvSpPr>
+            <a:spLocks noGrp="1"/>
+          </p:cNvSpPr>
+          <p:nvPr>
+            <p:ph type="sldNum" sz="quarter" idx="5"/>
+          </p:nvPr>
+        </p:nvSpPr>
+        <p:spPr/>
+        <p:txBody>
+          <a:bodyPr/>
+          <a:lstStyle/>
+          <a:p>
+            <a:fld id="{BC849E9A-41F7-4779-A581-48A7C374A227}" type="slidenum">
+              <a:rPr lang="en-US" smtClean="0"/>
+              <a:t>4</a:t>
+            </a:fld>
+            <a:endParaRPr lang="en-US" dirty="0"/>
+          </a:p>
+        </p:txBody>
+      </p:sp>
+    </p:spTree>
+    <p:extLst>
+      <p:ext uri="{BB962C8B-B14F-4D97-AF65-F5344CB8AC3E}">
+        <p14:creationId xmlns:p14="http://schemas.microsoft.com/office/powerpoint/2010/main" val="4096694946"/>
+      </p:ext>
+    </p:extLst>
+  </p:cSld>
+  <p:clrMapOvr>
+    <a:masterClrMapping/>
+  </p:clrMapOvr>
+</p:notes>
+</file>
+
+<file path=ppt/notesSlides/notesSlide4.xml><?xml version="1.0" encoding="utf-8"?>
+<p:notes xmlns:a="http://schemas.openxmlformats.org/drawingml/2006/main" xmlns:r="http://schemas.openxmlformats.org/officeDocument/2006/relationships" xmlns:p="http://schemas.openxmlformats.org/presentationml/2006/main">
+  <p:cSld>
+    <p:spTree>
+      <p:nvGrpSpPr>
+        <p:cNvPr id="1" name=""/>
+        <p:cNvGrpSpPr/>
+        <p:nvPr/>
+      </p:nvGrpSpPr>
+      <p:grpSpPr>
+        <a:xfrm>
+          <a:off x="0" y="0"/>
+          <a:ext cx="0" cy="0"/>
+          <a:chOff x="0" y="0"/>
+          <a:chExt cx="0" cy="0"/>
+        </a:xfrm>
+      </p:grpSpPr>
+      <p:sp>
+        <p:nvSpPr>
+          <p:cNvPr id="2" name="Slide Image Placeholder 1"/>
+          <p:cNvSpPr>
+            <a:spLocks noGrp="1" noRot="1" noChangeAspect="1"/>
+          </p:cNvSpPr>
+          <p:nvPr>
+            <p:ph type="sldImg"/>
+          </p:nvPr>
+        </p:nvSpPr>
+        <p:spPr/>
+      </p:sp>
+      <p:sp>
+        <p:nvSpPr>
+          <p:cNvPr id="3" name="Notes Placeholder 2"/>
+          <p:cNvSpPr>
+            <a:spLocks noGrp="1"/>
+          </p:cNvSpPr>
+          <p:nvPr>
+            <p:ph type="body" idx="1"/>
+          </p:nvPr>
+        </p:nvSpPr>
+        <p:spPr/>
+        <p:txBody>
+          <a:bodyPr/>
+          <a:lstStyle/>
+          <a:p>
+            <a:r>
+              <a:rPr lang="en-CA" dirty="0"/>
+              <a:t>Michael</a:t>
+            </a:r>
+          </a:p>
+        </p:txBody>
+      </p:sp>
+      <p:sp>
+        <p:nvSpPr>
+          <p:cNvPr id="4" name="Slide Number Placeholder 3"/>
+          <p:cNvSpPr>
+            <a:spLocks noGrp="1"/>
+          </p:cNvSpPr>
+          <p:nvPr>
+            <p:ph type="sldNum" sz="quarter" idx="5"/>
+          </p:nvPr>
+        </p:nvSpPr>
+        <p:spPr/>
+        <p:txBody>
+          <a:bodyPr/>
+          <a:lstStyle/>
+          <a:p>
+            <a:fld id="{BC849E9A-41F7-4779-A581-48A7C374A227}" type="slidenum">
+              <a:rPr lang="en-US" smtClean="0"/>
+              <a:t>5</a:t>
+            </a:fld>
+            <a:endParaRPr lang="en-US" dirty="0"/>
+          </a:p>
+        </p:txBody>
+      </p:sp>
+    </p:spTree>
+    <p:extLst>
+      <p:ext uri="{BB962C8B-B14F-4D97-AF65-F5344CB8AC3E}">
+        <p14:creationId xmlns:p14="http://schemas.microsoft.com/office/powerpoint/2010/main" val="2782699444"/>
+      </p:ext>
+    </p:extLst>
+  </p:cSld>
+  <p:clrMapOvr>
+    <a:masterClrMapping/>
+  </p:clrMapOvr>
+</p:notes>
+</file>
+
+<file path=ppt/notesSlides/notesSlide5.xml><?xml version="1.0" encoding="utf-8"?>
+<p:notes xmlns:a="http://schemas.openxmlformats.org/drawingml/2006/main" xmlns:r="http://schemas.openxmlformats.org/officeDocument/2006/relationships" xmlns:p="http://schemas.openxmlformats.org/presentationml/2006/main">
+  <p:cSld>
+    <p:spTree>
+      <p:nvGrpSpPr>
+        <p:cNvPr id="1" name=""/>
+        <p:cNvGrpSpPr/>
+        <p:nvPr/>
+      </p:nvGrpSpPr>
+      <p:grpSpPr>
+        <a:xfrm>
+          <a:off x="0" y="0"/>
+          <a:ext cx="0" cy="0"/>
+          <a:chOff x="0" y="0"/>
+          <a:chExt cx="0" cy="0"/>
+        </a:xfrm>
+      </p:grpSpPr>
+      <p:sp>
+        <p:nvSpPr>
+          <p:cNvPr id="2" name="Slide Image Placeholder 1"/>
+          <p:cNvSpPr>
+            <a:spLocks noGrp="1" noRot="1" noChangeAspect="1"/>
+          </p:cNvSpPr>
+          <p:nvPr>
+            <p:ph type="sldImg"/>
+          </p:nvPr>
+        </p:nvSpPr>
+        <p:spPr/>
+      </p:sp>
+      <p:sp>
+        <p:nvSpPr>
+          <p:cNvPr id="3" name="Notes Placeholder 2"/>
+          <p:cNvSpPr>
+            <a:spLocks noGrp="1"/>
+          </p:cNvSpPr>
+          <p:nvPr>
+            <p:ph type="body" idx="1"/>
+          </p:nvPr>
+        </p:nvSpPr>
+        <p:spPr/>
+        <p:txBody>
+          <a:bodyPr/>
+          <a:lstStyle/>
+          <a:p>
+            <a:r>
+              <a:rPr lang="en-CA" dirty="0"/>
+              <a:t>Josh (1min)</a:t>
+            </a:r>
+          </a:p>
+        </p:txBody>
+      </p:sp>
+      <p:sp>
+        <p:nvSpPr>
+          <p:cNvPr id="4" name="Slide Number Placeholder 3"/>
+          <p:cNvSpPr>
+            <a:spLocks noGrp="1"/>
+          </p:cNvSpPr>
+          <p:nvPr>
+            <p:ph type="sldNum" sz="quarter" idx="5"/>
+          </p:nvPr>
+        </p:nvSpPr>
+        <p:spPr/>
+        <p:txBody>
+          <a:bodyPr/>
+          <a:lstStyle/>
+          <a:p>
+            <a:fld id="{BC849E9A-41F7-4779-A581-48A7C374A227}" type="slidenum">
+              <a:rPr lang="en-US" smtClean="0"/>
+              <a:t>6</a:t>
+            </a:fld>
+            <a:endParaRPr lang="en-US" dirty="0"/>
+          </a:p>
+        </p:txBody>
+      </p:sp>
+    </p:spTree>
+    <p:extLst>
+      <p:ext uri="{BB962C8B-B14F-4D97-AF65-F5344CB8AC3E}">
+        <p14:creationId xmlns:p14="http://schemas.microsoft.com/office/powerpoint/2010/main" val="2216826799"/>
+      </p:ext>
+    </p:extLst>
+  </p:cSld>
+  <p:clrMapOvr>
+    <a:masterClrMapping/>
+  </p:clrMapOvr>
+</p:notes>
+</file>
+
+<file path=ppt/notesSlides/notesSlide6.xml><?xml version="1.0" encoding="utf-8"?>
+<p:notes xmlns:a="http://schemas.openxmlformats.org/drawingml/2006/main" xmlns:r="http://schemas.openxmlformats.org/officeDocument/2006/relationships" xmlns:p="http://schemas.openxmlformats.org/presentationml/2006/main">
+  <p:cSld>
+    <p:spTree>
+      <p:nvGrpSpPr>
+        <p:cNvPr id="1" name=""/>
+        <p:cNvGrpSpPr/>
+        <p:nvPr/>
+      </p:nvGrpSpPr>
+      <p:grpSpPr>
+        <a:xfrm>
+          <a:off x="0" y="0"/>
+          <a:ext cx="0" cy="0"/>
+          <a:chOff x="0" y="0"/>
+          <a:chExt cx="0" cy="0"/>
+        </a:xfrm>
+      </p:grpSpPr>
+      <p:sp>
+        <p:nvSpPr>
+          <p:cNvPr id="2" name="Slide Image Placeholder 1"/>
+          <p:cNvSpPr>
+            <a:spLocks noGrp="1" noRot="1" noChangeAspect="1"/>
+          </p:cNvSpPr>
+          <p:nvPr>
+            <p:ph type="sldImg"/>
+          </p:nvPr>
+        </p:nvSpPr>
+        <p:spPr/>
+      </p:sp>
+      <p:sp>
+        <p:nvSpPr>
+          <p:cNvPr id="3" name="Notes Placeholder 2"/>
+          <p:cNvSpPr>
+            <a:spLocks noGrp="1"/>
+          </p:cNvSpPr>
+          <p:nvPr>
+            <p:ph type="body" idx="1"/>
+          </p:nvPr>
+        </p:nvSpPr>
+        <p:spPr/>
+        <p:txBody>
+          <a:bodyPr/>
+          <a:lstStyle/>
+          <a:p>
+            <a:r>
+              <a:rPr lang="en-CA" dirty="0"/>
+              <a:t>Arian, will talk about the lack of documentation.</a:t>
+            </a:r>
+          </a:p>
+          <a:p>
+            <a:r>
+              <a:rPr lang="en-CA" dirty="0"/>
+              <a:t>Victor talks about futures</a:t>
+            </a:r>
+          </a:p>
+          <a:p>
+            <a:r>
+              <a:rPr lang="en-CA" dirty="0"/>
+              <a:t>1min</a:t>
+            </a:r>
+            <a:endParaRPr lang="en-CA" dirty="0">
+              <a:cs typeface="Calibri"/>
+            </a:endParaRPr>
+          </a:p>
+          <a:p>
+            <a:endParaRPr lang="en-CA" dirty="0">
+              <a:cs typeface="Calibri"/>
+            </a:endParaRPr>
+          </a:p>
+          <a:p>
+            <a:endParaRPr lang="en-CA" dirty="0">
+              <a:cs typeface="Calibri"/>
+            </a:endParaRPr>
+          </a:p>
+          <a:p>
+            <a:r>
+              <a:rPr lang="en-CA" dirty="0">
+                <a:cs typeface="Calibri"/>
+              </a:rPr>
+              <a:t>FUTURES:</a:t>
+            </a:r>
+          </a:p>
+          <a:p>
+            <a:r>
+              <a:rPr lang="en-CA" dirty="0">
+                <a:cs typeface="Calibri"/>
+              </a:rPr>
+              <a:t>Our application had to communicate with a lot of technologies over the web from validating our sign in through OAth2 keys to making calls to the classroom API and making requests to Firebase. Futures were interesting to work with as they are a type/concept that none of us have really encountered before. The idea is that it is a type that wraps data that will be returned in the Future, but it is uncertain when exactly in the Future it will be returned. Think of a web API call like a call to Classroom API. The challenge with this was to sync our backend and front end so that the front end is only loaded once the backend data is available. Otherwise a lot of funny and </a:t>
+            </a:r>
+            <a:r>
+              <a:rPr lang="en-CA" dirty="0" err="1">
+                <a:cs typeface="Calibri"/>
+              </a:rPr>
+              <a:t>puzzlign</a:t>
+            </a:r>
+            <a:r>
+              <a:rPr lang="en-CA" dirty="0">
+                <a:cs typeface="Calibri"/>
+              </a:rPr>
+              <a:t> errors would occur. </a:t>
+            </a:r>
+          </a:p>
+        </p:txBody>
+      </p:sp>
+      <p:sp>
+        <p:nvSpPr>
+          <p:cNvPr id="4" name="Slide Number Placeholder 3"/>
+          <p:cNvSpPr>
+            <a:spLocks noGrp="1"/>
+          </p:cNvSpPr>
+          <p:nvPr>
+            <p:ph type="sldNum" sz="quarter" idx="5"/>
+          </p:nvPr>
+        </p:nvSpPr>
+        <p:spPr/>
+        <p:txBody>
+          <a:bodyPr/>
+          <a:lstStyle/>
+          <a:p>
+            <a:fld id="{BC849E9A-41F7-4779-A581-48A7C374A227}" type="slidenum">
+              <a:rPr lang="en-US" smtClean="0"/>
+              <a:t>7</a:t>
+            </a:fld>
+            <a:endParaRPr lang="en-US" dirty="0"/>
+          </a:p>
+        </p:txBody>
+      </p:sp>
+    </p:spTree>
+    <p:extLst>
+      <p:ext uri="{BB962C8B-B14F-4D97-AF65-F5344CB8AC3E}">
+        <p14:creationId xmlns:p14="http://schemas.microsoft.com/office/powerpoint/2010/main" val="2009838603"/>
+      </p:ext>
+    </p:extLst>
+  </p:cSld>
+  <p:clrMapOvr>
+    <a:masterClrMapping/>
+  </p:clrMapOvr>
+</p:notes>
+</file>
+
+<file path=ppt/notesSlides/notesSlide7.xml><?xml version="1.0" encoding="utf-8"?>
+<p:notes xmlns:a="http://schemas.openxmlformats.org/drawingml/2006/main" xmlns:r="http://schemas.openxmlformats.org/officeDocument/2006/relationships" xmlns:p="http://schemas.openxmlformats.org/presentationml/2006/main">
+  <p:cSld>
+    <p:spTree>
+      <p:nvGrpSpPr>
+        <p:cNvPr id="1" name=""/>
+        <p:cNvGrpSpPr/>
+        <p:nvPr/>
+      </p:nvGrpSpPr>
+      <p:grpSpPr>
+        <a:xfrm>
+          <a:off x="0" y="0"/>
+          <a:ext cx="0" cy="0"/>
+          <a:chOff x="0" y="0"/>
+          <a:chExt cx="0" cy="0"/>
+        </a:xfrm>
+      </p:grpSpPr>
+      <p:sp>
+        <p:nvSpPr>
+          <p:cNvPr id="2" name="Slide Image Placeholder 1"/>
+          <p:cNvSpPr>
+            <a:spLocks noGrp="1" noRot="1" noChangeAspect="1"/>
+          </p:cNvSpPr>
+          <p:nvPr>
+            <p:ph type="sldImg"/>
+          </p:nvPr>
+        </p:nvSpPr>
+        <p:spPr/>
+      </p:sp>
+      <p:sp>
+        <p:nvSpPr>
+          <p:cNvPr id="3" name="Notes Placeholder 2"/>
+          <p:cNvSpPr>
+            <a:spLocks noGrp="1"/>
+          </p:cNvSpPr>
+          <p:nvPr>
+            <p:ph type="body" idx="1"/>
+          </p:nvPr>
+        </p:nvSpPr>
+        <p:spPr/>
+        <p:txBody>
+          <a:bodyPr/>
+          <a:lstStyle/>
+          <a:p>
+            <a:r>
+              <a:rPr lang="en-CA">
+                <a:cs typeface="Calibri"/>
+              </a:rPr>
+              <a:t>One of the challenges we faced was connecting our application to all of the services that we needed. ClassroomApiAccess is a singleton that has methods for comminocating with the Classroom API, its purpose is to abstract away the Google Classroom types returned by Classroom API calls. It basically handles data conversion into types that we can use in Dart. </a:t>
+            </a:r>
+          </a:p>
+          <a:p>
+            <a:endParaRPr lang="en-CA">
+              <a:cs typeface="Calibri"/>
+            </a:endParaRPr>
+          </a:p>
+          <a:p>
+            <a:r>
+              <a:rPr lang="en-CA">
+                <a:cs typeface="Calibri"/>
+              </a:rPr>
+              <a:t>FirestoreManager is our DAO that abstracts away the database implementation from the rest of our code. It just communicates with our database and retrieves or sends the requested data.</a:t>
+            </a:r>
+          </a:p>
+          <a:p>
+            <a:endParaRPr lang="en-CA">
+              <a:cs typeface="Calibri"/>
+            </a:endParaRPr>
+          </a:p>
+          <a:p>
+            <a:r>
+              <a:rPr lang="en-CA">
+                <a:cs typeface="Calibri"/>
+              </a:rPr>
+              <a:t>We chose a NoSQL database because it was very easy to set up and learn how to use. It also allowed us for a lot more flexibility since our requirements changed rather quickly and with them changes the types of data that we have to store.</a:t>
+            </a:r>
+          </a:p>
+          <a:p>
+            <a:endParaRPr lang="en-CA">
+              <a:cs typeface="Calibri"/>
+            </a:endParaRPr>
+          </a:p>
+          <a:p>
+            <a:r>
+              <a:rPr lang="en-CA">
+                <a:cs typeface="Calibri"/>
+              </a:rPr>
+              <a:t>Very little data ends up being stored by the application, most of it resides in the database and is retrieved when necessary</a:t>
+            </a:r>
+          </a:p>
+        </p:txBody>
+      </p:sp>
+      <p:sp>
+        <p:nvSpPr>
+          <p:cNvPr id="4" name="Slide Number Placeholder 3"/>
+          <p:cNvSpPr>
+            <a:spLocks noGrp="1"/>
+          </p:cNvSpPr>
+          <p:nvPr>
+            <p:ph type="sldNum" sz="quarter" idx="5"/>
+          </p:nvPr>
+        </p:nvSpPr>
+        <p:spPr/>
+        <p:txBody>
+          <a:bodyPr/>
+          <a:lstStyle/>
+          <a:p>
+            <a:fld id="{BC849E9A-41F7-4779-A581-48A7C374A227}" type="slidenum">
+              <a:rPr lang="en-US" smtClean="0"/>
+              <a:t>8</a:t>
+            </a:fld>
+            <a:endParaRPr lang="en-US" dirty="0"/>
+          </a:p>
+        </p:txBody>
+      </p:sp>
+    </p:spTree>
+    <p:extLst>
+      <p:ext uri="{BB962C8B-B14F-4D97-AF65-F5344CB8AC3E}">
+        <p14:creationId xmlns:p14="http://schemas.microsoft.com/office/powerpoint/2010/main" val="1224708016"/>
+      </p:ext>
+    </p:extLst>
+  </p:cSld>
+  <p:clrMapOvr>
+    <a:masterClrMapping/>
+  </p:clrMapOvr>
+</p:notes>
+</file>
+
+<file path=ppt/notesSlides/notesSlide8.xml><?xml version="1.0" encoding="utf-8"?>
+<p:notes xmlns:a="http://schemas.openxmlformats.org/drawingml/2006/main" xmlns:r="http://schemas.openxmlformats.org/officeDocument/2006/relationships" xmlns:p="http://schemas.openxmlformats.org/presentationml/2006/main">
+  <p:cSld>
+    <p:spTree>
+      <p:nvGrpSpPr>
+        <p:cNvPr id="1" name=""/>
+        <p:cNvGrpSpPr/>
+        <p:nvPr/>
+      </p:nvGrpSpPr>
+      <p:grpSpPr>
+        <a:xfrm>
+          <a:off x="0" y="0"/>
+          <a:ext cx="0" cy="0"/>
+          <a:chOff x="0" y="0"/>
+          <a:chExt cx="0" cy="0"/>
+        </a:xfrm>
+      </p:grpSpPr>
+      <p:sp>
+        <p:nvSpPr>
+          <p:cNvPr id="2" name="Slide Image Placeholder 1"/>
+          <p:cNvSpPr>
+            <a:spLocks noGrp="1" noRot="1" noChangeAspect="1"/>
+          </p:cNvSpPr>
+          <p:nvPr>
+            <p:ph type="sldImg"/>
+          </p:nvPr>
+        </p:nvSpPr>
+        <p:spPr/>
+      </p:sp>
+      <p:sp>
+        <p:nvSpPr>
+          <p:cNvPr id="3" name="Notes Placeholder 2"/>
+          <p:cNvSpPr>
+            <a:spLocks noGrp="1"/>
+          </p:cNvSpPr>
+          <p:nvPr>
+            <p:ph type="body" idx="1"/>
+          </p:nvPr>
+        </p:nvSpPr>
+        <p:spPr/>
+        <p:txBody>
+          <a:bodyPr/>
+          <a:lstStyle/>
+          <a:p>
+            <a:r>
+              <a:rPr lang="en-CA" dirty="0"/>
+              <a:t>Josh (2min)</a:t>
+            </a:r>
+          </a:p>
+        </p:txBody>
+      </p:sp>
+      <p:sp>
+        <p:nvSpPr>
+          <p:cNvPr id="4" name="Slide Number Placeholder 3"/>
+          <p:cNvSpPr>
+            <a:spLocks noGrp="1"/>
+          </p:cNvSpPr>
+          <p:nvPr>
+            <p:ph type="sldNum" sz="quarter" idx="5"/>
+          </p:nvPr>
+        </p:nvSpPr>
+        <p:spPr/>
+        <p:txBody>
+          <a:bodyPr/>
+          <a:lstStyle/>
+          <a:p>
+            <a:fld id="{BC849E9A-41F7-4779-A581-48A7C374A227}" type="slidenum">
+              <a:rPr lang="en-US" smtClean="0"/>
+              <a:t>9</a:t>
+            </a:fld>
+            <a:endParaRPr lang="en-US" dirty="0"/>
+          </a:p>
+        </p:txBody>
+      </p:sp>
+    </p:spTree>
+    <p:extLst>
+      <p:ext uri="{BB962C8B-B14F-4D97-AF65-F5344CB8AC3E}">
+        <p14:creationId xmlns:p14="http://schemas.microsoft.com/office/powerpoint/2010/main" val="4006883059"/>
+      </p:ext>
+    </p:extLst>
+  </p:cSld>
+  <p:clrMapOvr>
+    <a:masterClrMapping/>
+  </p:clrMapOvr>
+</p:notes>
+</file>
+
+<file path=ppt/notesSlides/notesSlide9.xml><?xml version="1.0" encoding="utf-8"?>
+<p:notes xmlns:a="http://schemas.openxmlformats.org/drawingml/2006/main" xmlns:r="http://schemas.openxmlformats.org/officeDocument/2006/relationships" xmlns:p="http://schemas.openxmlformats.org/presentationml/2006/main">
+  <p:cSld>
+    <p:spTree>
+      <p:nvGrpSpPr>
+        <p:cNvPr id="1" name=""/>
+        <p:cNvGrpSpPr/>
+        <p:nvPr/>
+      </p:nvGrpSpPr>
+      <p:grpSpPr>
+        <a:xfrm>
+          <a:off x="0" y="0"/>
+          <a:ext cx="0" cy="0"/>
+          <a:chOff x="0" y="0"/>
+          <a:chExt cx="0" cy="0"/>
+        </a:xfrm>
+      </p:grpSpPr>
+      <p:sp>
+        <p:nvSpPr>
+          <p:cNvPr id="2" name="Slide Image Placeholder 1"/>
+          <p:cNvSpPr>
+            <a:spLocks noGrp="1" noRot="1" noChangeAspect="1"/>
+          </p:cNvSpPr>
+          <p:nvPr>
+            <p:ph type="sldImg"/>
+          </p:nvPr>
+        </p:nvSpPr>
+        <p:spPr/>
+      </p:sp>
+      <p:sp>
+        <p:nvSpPr>
+          <p:cNvPr id="3" name="Notes Placeholder 2"/>
+          <p:cNvSpPr>
+            <a:spLocks noGrp="1"/>
+          </p:cNvSpPr>
+          <p:nvPr>
+            <p:ph type="body" idx="1"/>
+          </p:nvPr>
+        </p:nvSpPr>
+        <p:spPr/>
+        <p:txBody>
+          <a:bodyPr/>
+          <a:lstStyle/>
+          <a:p>
+            <a:r>
+              <a:rPr lang="en-CA" dirty="0"/>
+              <a:t>Josh (2min)</a:t>
+            </a:r>
+          </a:p>
+        </p:txBody>
+      </p:sp>
+      <p:sp>
+        <p:nvSpPr>
+          <p:cNvPr id="4" name="Slide Number Placeholder 3"/>
+          <p:cNvSpPr>
+            <a:spLocks noGrp="1"/>
+          </p:cNvSpPr>
+          <p:nvPr>
+            <p:ph type="sldNum" sz="quarter" idx="5"/>
+          </p:nvPr>
+        </p:nvSpPr>
+        <p:spPr/>
+        <p:txBody>
+          <a:bodyPr/>
+          <a:lstStyle/>
+          <a:p>
+            <a:fld id="{BC849E9A-41F7-4779-A581-48A7C374A227}" type="slidenum">
+              <a:rPr lang="en-US" smtClean="0"/>
+              <a:t>10</a:t>
+            </a:fld>
+            <a:endParaRPr lang="en-US" dirty="0"/>
+          </a:p>
+        </p:txBody>
+      </p:sp>
+    </p:spTree>
+    <p:extLst>
+      <p:ext uri="{BB962C8B-B14F-4D97-AF65-F5344CB8AC3E}">
+        <p14:creationId xmlns:p14="http://schemas.microsoft.com/office/powerpoint/2010/main" val="480502299"/>
       </p:ext>
     </p:extLst>
   </p:cSld>
@@ -995,7 +2063,7 @@
           <a:p>
             <a:fld id="{DECF21A4-E71B-4D3A-AF45-E989C23A7BB1}" type="datetimeFigureOut">
               <a:rPr lang="en-US" smtClean="0"/>
-              <a:t>11/30/2019</a:t>
+              <a:t>12/1/2019</a:t>
             </a:fld>
             <a:endParaRPr lang="en-US" dirty="0"/>
           </a:p>
@@ -1193,7 +2261,7 @@
           <a:p>
             <a:fld id="{DECF21A4-E71B-4D3A-AF45-E989C23A7BB1}" type="datetimeFigureOut">
               <a:rPr lang="en-US" smtClean="0"/>
-              <a:t>11/30/2019</a:t>
+              <a:t>12/1/2019</a:t>
             </a:fld>
             <a:endParaRPr lang="en-US" dirty="0"/>
           </a:p>
@@ -1401,7 +2469,7 @@
           <a:p>
             <a:fld id="{DECF21A4-E71B-4D3A-AF45-E989C23A7BB1}" type="datetimeFigureOut">
               <a:rPr lang="en-US" smtClean="0"/>
-              <a:t>11/30/2019</a:t>
+              <a:t>12/1/2019</a:t>
             </a:fld>
             <a:endParaRPr lang="en-US" dirty="0"/>
           </a:p>
@@ -1599,7 +2667,7 @@
           <a:p>
             <a:fld id="{DECF21A4-E71B-4D3A-AF45-E989C23A7BB1}" type="datetimeFigureOut">
               <a:rPr lang="en-US" smtClean="0"/>
-              <a:t>11/30/2019</a:t>
+              <a:t>12/1/2019</a:t>
             </a:fld>
             <a:endParaRPr lang="en-US" dirty="0"/>
           </a:p>
@@ -1874,7 +2942,7 @@
           <a:p>
             <a:fld id="{DECF21A4-E71B-4D3A-AF45-E989C23A7BB1}" type="datetimeFigureOut">
               <a:rPr lang="en-US" smtClean="0"/>
-              <a:t>11/30/2019</a:t>
+              <a:t>12/1/2019</a:t>
             </a:fld>
             <a:endParaRPr lang="en-US" dirty="0"/>
           </a:p>
@@ -2139,7 +3207,7 @@
           <a:p>
             <a:fld id="{DECF21A4-E71B-4D3A-AF45-E989C23A7BB1}" type="datetimeFigureOut">
               <a:rPr lang="en-US" smtClean="0"/>
-              <a:t>11/30/2019</a:t>
+              <a:t>12/1/2019</a:t>
             </a:fld>
             <a:endParaRPr lang="en-US" dirty="0"/>
           </a:p>
@@ -2551,7 +3619,7 @@
           <a:p>
             <a:fld id="{DECF21A4-E71B-4D3A-AF45-E989C23A7BB1}" type="datetimeFigureOut">
               <a:rPr lang="en-US" smtClean="0"/>
-              <a:t>11/30/2019</a:t>
+              <a:t>12/1/2019</a:t>
             </a:fld>
             <a:endParaRPr lang="en-US" dirty="0"/>
           </a:p>
@@ -2692,7 +3760,7 @@
           <a:p>
             <a:fld id="{DECF21A4-E71B-4D3A-AF45-E989C23A7BB1}" type="datetimeFigureOut">
               <a:rPr lang="en-US" smtClean="0"/>
-              <a:t>11/30/2019</a:t>
+              <a:t>12/1/2019</a:t>
             </a:fld>
             <a:endParaRPr lang="en-US" dirty="0"/>
           </a:p>
@@ -2805,7 +3873,7 @@
           <a:p>
             <a:fld id="{DECF21A4-E71B-4D3A-AF45-E989C23A7BB1}" type="datetimeFigureOut">
               <a:rPr lang="en-US" smtClean="0"/>
-              <a:t>11/30/2019</a:t>
+              <a:t>12/1/2019</a:t>
             </a:fld>
             <a:endParaRPr lang="en-US" dirty="0"/>
           </a:p>
@@ -3116,7 +4184,7 @@
           <a:p>
             <a:fld id="{DECF21A4-E71B-4D3A-AF45-E989C23A7BB1}" type="datetimeFigureOut">
               <a:rPr lang="en-US" smtClean="0"/>
-              <a:t>11/30/2019</a:t>
+              <a:t>12/1/2019</a:t>
             </a:fld>
             <a:endParaRPr lang="en-US" dirty="0"/>
           </a:p>
@@ -3408,7 +4476,7 @@
           <a:p>
             <a:fld id="{DECF21A4-E71B-4D3A-AF45-E989C23A7BB1}" type="datetimeFigureOut">
               <a:rPr lang="en-US" smtClean="0"/>
-              <a:t>11/30/2019</a:t>
+              <a:t>12/1/2019</a:t>
             </a:fld>
             <a:endParaRPr lang="en-US" dirty="0"/>
           </a:p>
@@ -3649,7 +4717,7 @@
           <a:p>
             <a:fld id="{DECF21A4-E71B-4D3A-AF45-E989C23A7BB1}" type="datetimeFigureOut">
               <a:rPr lang="en-US" smtClean="0"/>
-              <a:t>11/30/2019</a:t>
+              <a:t>12/1/2019</a:t>
             </a:fld>
             <a:endParaRPr lang="en-US" dirty="0"/>
           </a:p>
@@ -5422,7 +6490,7 @@
           <p:nvPr/>
         </p:nvPicPr>
         <p:blipFill>
-          <a:blip r:embed="rId2">
+          <a:blip r:embed="rId3">
             <a:alphaModFix amt="20000"/>
             <a:extLst>
               <a:ext uri="{28A0092B-C50C-407E-A947-70E740481C1C}">
@@ -5469,7 +6537,7 @@
               <a:rPr lang="en-CA" dirty="0">
                 <a:latin typeface="Britannic Bold" panose="020B0903060703020204" pitchFamily="34" charset="0"/>
               </a:rPr>
-              <a:t>Individual Contributions</a:t>
+              <a:t>Team Workflow</a:t>
             </a:r>
           </a:p>
         </p:txBody>
@@ -5500,10 +6568,972 @@
           <a:bodyPr/>
           <a:lstStyle/>
           <a:p>
+            <a:r>
+              <a:rPr lang="en-CA" dirty="0"/>
+              <a:t>Pull requests through GitHub</a:t>
+            </a:r>
+          </a:p>
+        </p:txBody>
+      </p:sp>
+      <p:pic>
+        <p:nvPicPr>
+          <p:cNvPr id="7" name="Graphic 6" descr="Cheers">
+            <a:extLst>
+              <a:ext uri="{FF2B5EF4-FFF2-40B4-BE49-F238E27FC236}">
+                <a16:creationId xmlns:a16="http://schemas.microsoft.com/office/drawing/2014/main" id="{0AFD0EC5-7913-4588-9D89-195F12731687}"/>
+              </a:ext>
+            </a:extLst>
+          </p:cNvPr>
+          <p:cNvPicPr>
+            <a:picLocks noChangeAspect="1"/>
+          </p:cNvPicPr>
+          <p:nvPr/>
+        </p:nvPicPr>
+        <p:blipFill>
+          <a:blip r:embed="rId4">
+            <a:extLst>
+              <a:ext uri="{28A0092B-C50C-407E-A947-70E740481C1C}">
+                <a14:useLocalDpi xmlns:a14="http://schemas.microsoft.com/office/drawing/2010/main" val="0"/>
+              </a:ext>
+              <a:ext uri="{96DAC541-7B7A-43D3-8B79-37D633B846F1}">
+                <asvg:svgBlip xmlns:asvg="http://schemas.microsoft.com/office/drawing/2016/SVG/main" r:embed="rId5"/>
+              </a:ext>
+            </a:extLst>
+          </a:blip>
+          <a:stretch>
+            <a:fillRect/>
+          </a:stretch>
+        </p:blipFill>
+        <p:spPr>
+          <a:xfrm>
+            <a:off x="1150749" y="4765097"/>
+            <a:ext cx="1790054" cy="1790054"/>
+          </a:xfrm>
+          <a:prstGeom prst="rect">
+            <a:avLst/>
+          </a:prstGeom>
+        </p:spPr>
+      </p:pic>
+      <p:pic>
+        <p:nvPicPr>
+          <p:cNvPr id="11" name="Graphic 10" descr="Group brainstorm">
+            <a:extLst>
+              <a:ext uri="{FF2B5EF4-FFF2-40B4-BE49-F238E27FC236}">
+                <a16:creationId xmlns:a16="http://schemas.microsoft.com/office/drawing/2014/main" id="{6FE323D0-DCDA-43E3-9D81-CAC9F2C4681C}"/>
+              </a:ext>
+            </a:extLst>
+          </p:cNvPr>
+          <p:cNvPicPr>
+            <a:picLocks noChangeAspect="1"/>
+          </p:cNvPicPr>
+          <p:nvPr/>
+        </p:nvPicPr>
+        <p:blipFill>
+          <a:blip r:embed="rId6">
+            <a:extLst>
+              <a:ext uri="{28A0092B-C50C-407E-A947-70E740481C1C}">
+                <a14:useLocalDpi xmlns:a14="http://schemas.microsoft.com/office/drawing/2010/main" val="0"/>
+              </a:ext>
+              <a:ext uri="{96DAC541-7B7A-43D3-8B79-37D633B846F1}">
+                <asvg:svgBlip xmlns:asvg="http://schemas.microsoft.com/office/drawing/2016/SVG/main" r:embed="rId7"/>
+              </a:ext>
+            </a:extLst>
+          </a:blip>
+          <a:stretch>
+            <a:fillRect/>
+          </a:stretch>
+        </p:blipFill>
+        <p:spPr>
+          <a:xfrm>
+            <a:off x="5594889" y="4427532"/>
+            <a:ext cx="2465185" cy="2465185"/>
+          </a:xfrm>
+          <a:prstGeom prst="rect">
+            <a:avLst/>
+          </a:prstGeom>
+        </p:spPr>
+      </p:pic>
+      <p:pic>
+        <p:nvPicPr>
+          <p:cNvPr id="15" name="Picture 14" descr="A picture containing computer&#10;&#10;Description automatically generated">
+            <a:extLst>
+              <a:ext uri="{FF2B5EF4-FFF2-40B4-BE49-F238E27FC236}">
+                <a16:creationId xmlns:a16="http://schemas.microsoft.com/office/drawing/2014/main" id="{ECFBC2A4-6F14-4FC7-AE37-158FC4E00735}"/>
+              </a:ext>
+            </a:extLst>
+          </p:cNvPr>
+          <p:cNvPicPr>
+            <a:picLocks noChangeAspect="1"/>
+          </p:cNvPicPr>
+          <p:nvPr/>
+        </p:nvPicPr>
+        <p:blipFill>
+          <a:blip r:embed="rId8">
+            <a:extLst>
+              <a:ext uri="{28A0092B-C50C-407E-A947-70E740481C1C}">
+                <a14:useLocalDpi xmlns:a14="http://schemas.microsoft.com/office/drawing/2010/main" val="0"/>
+              </a:ext>
+            </a:extLst>
+          </a:blip>
+          <a:stretch>
+            <a:fillRect/>
+          </a:stretch>
+        </p:blipFill>
+        <p:spPr>
+          <a:xfrm>
+            <a:off x="7315175" y="185923"/>
+            <a:ext cx="1572235" cy="1572235"/>
+          </a:xfrm>
+          <a:prstGeom prst="rect">
+            <a:avLst/>
+          </a:prstGeom>
+        </p:spPr>
+      </p:pic>
+      <p:pic>
+        <p:nvPicPr>
+          <p:cNvPr id="3" name="Picture 2">
+            <a:extLst>
+              <a:ext uri="{FF2B5EF4-FFF2-40B4-BE49-F238E27FC236}">
+                <a16:creationId xmlns:a16="http://schemas.microsoft.com/office/drawing/2014/main" id="{20DFE17C-F9DD-4A19-BC9E-36DDEBB398DF}"/>
+              </a:ext>
+            </a:extLst>
+          </p:cNvPr>
+          <p:cNvPicPr>
+            <a:picLocks noChangeAspect="1"/>
+          </p:cNvPicPr>
+          <p:nvPr/>
+        </p:nvPicPr>
+        <p:blipFill>
+          <a:blip r:embed="rId9"/>
+          <a:stretch>
+            <a:fillRect/>
+          </a:stretch>
+        </p:blipFill>
+        <p:spPr>
+          <a:xfrm>
+            <a:off x="1933702" y="2624328"/>
+            <a:ext cx="4446396" cy="1864719"/>
+          </a:xfrm>
+          <a:prstGeom prst="rect">
+            <a:avLst/>
+          </a:prstGeom>
+          <a:ln>
+            <a:noFill/>
+          </a:ln>
+          <a:effectLst>
+            <a:outerShdw blurRad="292100" dist="139700" dir="2700000" algn="tl" rotWithShape="0">
+              <a:srgbClr val="333333">
+                <a:alpha val="65000"/>
+              </a:srgbClr>
+            </a:outerShdw>
+          </a:effectLst>
+        </p:spPr>
+      </p:pic>
+    </p:spTree>
+    <p:extLst>
+      <p:ext uri="{BB962C8B-B14F-4D97-AF65-F5344CB8AC3E}">
+        <p14:creationId xmlns:p14="http://schemas.microsoft.com/office/powerpoint/2010/main" val="2188281817"/>
+      </p:ext>
+    </p:extLst>
+  </p:cSld>
+  <p:clrMapOvr>
+    <a:masterClrMapping/>
+  </p:clrMapOvr>
+  <mc:AlternateContent xmlns:mc="http://schemas.openxmlformats.org/markup-compatibility/2006">
+    <mc:Choice xmlns:p159="http://schemas.microsoft.com/office/powerpoint/2015/09/main" Requires="p159">
+      <p:transition xmlns:p14="http://schemas.microsoft.com/office/powerpoint/2010/main" spd="slow" p14:dur="2000">
+        <p159:morph option="byObject"/>
+      </p:transition>
+    </mc:Choice>
+    <mc:Fallback>
+      <p:transition spd="slow">
+        <p:fade/>
+      </p:transition>
+    </mc:Fallback>
+  </mc:AlternateContent>
+  <p:timing>
+    <p:tnLst>
+      <p:par>
+        <p:cTn id="1" dur="indefinite" restart="never" nodeType="tmRoot">
+          <p:childTnLst>
+            <p:seq concurrent="1" nextAc="seek">
+              <p:cTn id="2" dur="indefinite" nodeType="mainSeq">
+                <p:childTnLst>
+                  <p:par>
+                    <p:cTn id="3" fill="hold">
+                      <p:stCondLst>
+                        <p:cond delay="indefinite"/>
+                        <p:cond evt="onBegin" delay="0">
+                          <p:tn val="2"/>
+                        </p:cond>
+                      </p:stCondLst>
+                      <p:childTnLst>
+                        <p:par>
+                          <p:cTn id="4" fill="hold">
+                            <p:stCondLst>
+                              <p:cond delay="0"/>
+                            </p:stCondLst>
+                            <p:childTnLst>
+                              <p:par>
+                                <p:cTn id="5" presetID="26" presetClass="emph" presetSubtype="0" fill="hold" nodeType="withEffect">
+                                  <p:stCondLst>
+                                    <p:cond delay="500"/>
+                                  </p:stCondLst>
+                                  <p:childTnLst>
+                                    <p:animEffect transition="out" filter="fade">
+                                      <p:cBhvr>
+                                        <p:cTn id="6" dur="500" tmFilter="0, 0; .2, .5; .8, .5; 1, 0"/>
+                                        <p:tgtEl>
+                                          <p:spTgt spid="11"/>
+                                        </p:tgtEl>
+                                      </p:cBhvr>
+                                    </p:animEffect>
+                                    <p:animScale>
+                                      <p:cBhvr>
+                                        <p:cTn id="7" dur="250" autoRev="1" fill="hold"/>
+                                        <p:tgtEl>
+                                          <p:spTgt spid="11"/>
+                                        </p:tgtEl>
+                                      </p:cBhvr>
+                                      <p:by x="105000" y="105000"/>
+                                    </p:animScale>
+                                  </p:childTnLst>
+                                </p:cTn>
+                              </p:par>
+                            </p:childTnLst>
+                          </p:cTn>
+                        </p:par>
+                      </p:childTnLst>
+                    </p:cTn>
+                  </p:par>
+                </p:childTnLst>
+              </p:cTn>
+              <p:prevCondLst>
+                <p:cond evt="onPrev" delay="0">
+                  <p:tgtEl>
+                    <p:sldTgt/>
+                  </p:tgtEl>
+                </p:cond>
+              </p:prevCondLst>
+              <p:nextCondLst>
+                <p:cond evt="onNext" delay="0">
+                  <p:tgtEl>
+                    <p:sldTgt/>
+                  </p:tgtEl>
+                </p:cond>
+              </p:nextCondLst>
+            </p:seq>
+          </p:childTnLst>
+        </p:cTn>
+      </p:par>
+    </p:tnLst>
+  </p:timing>
+</p:sld>
+</file>
+
+<file path=ppt/slides/slide11.xml><?xml version="1.0" encoding="utf-8"?>
+<p:sld xmlns:a="http://schemas.openxmlformats.org/drawingml/2006/main" xmlns:r="http://schemas.openxmlformats.org/officeDocument/2006/relationships" xmlns:p="http://schemas.openxmlformats.org/presentationml/2006/main">
+  <p:cSld>
+    <p:bg>
+      <p:bgPr>
+        <a:gradFill>
+          <a:gsLst>
+            <a:gs pos="0">
+              <a:schemeClr val="accent1">
+                <a:lumMod val="5000"/>
+                <a:lumOff val="95000"/>
+              </a:schemeClr>
+            </a:gs>
+            <a:gs pos="74000">
+              <a:srgbClr val="92D050"/>
+            </a:gs>
+            <a:gs pos="83000">
+              <a:srgbClr val="92D050"/>
+            </a:gs>
+            <a:gs pos="100000">
+              <a:srgbClr val="82C836"/>
+            </a:gs>
+          </a:gsLst>
+          <a:lin ang="5400000" scaled="1"/>
+        </a:gradFill>
+        <a:effectLst/>
+      </p:bgPr>
+    </p:bg>
+    <p:spTree>
+      <p:nvGrpSpPr>
+        <p:cNvPr id="1" name=""/>
+        <p:cNvGrpSpPr/>
+        <p:nvPr/>
+      </p:nvGrpSpPr>
+      <p:grpSpPr>
+        <a:xfrm>
+          <a:off x="0" y="0"/>
+          <a:ext cx="0" cy="0"/>
+          <a:chOff x="0" y="0"/>
+          <a:chExt cx="0" cy="0"/>
+        </a:xfrm>
+      </p:grpSpPr>
+      <p:pic>
+        <p:nvPicPr>
+          <p:cNvPr id="4" name="Picture 3" descr="A close up of a logo&#10;&#10;Description automatically generated">
+            <a:extLst>
+              <a:ext uri="{FF2B5EF4-FFF2-40B4-BE49-F238E27FC236}">
+                <a16:creationId xmlns:a16="http://schemas.microsoft.com/office/drawing/2014/main" id="{A101321E-B77C-4089-B439-BC624610E501}"/>
+              </a:ext>
+            </a:extLst>
+          </p:cNvPr>
+          <p:cNvPicPr>
+            <a:picLocks noChangeAspect="1"/>
+          </p:cNvPicPr>
+          <p:nvPr/>
+        </p:nvPicPr>
+        <p:blipFill>
+          <a:blip r:embed="rId3">
+            <a:alphaModFix amt="20000"/>
+            <a:extLst>
+              <a:ext uri="{28A0092B-C50C-407E-A947-70E740481C1C}">
+                <a14:useLocalDpi xmlns:a14="http://schemas.microsoft.com/office/drawing/2010/main" val="0"/>
+              </a:ext>
+            </a:extLst>
+          </a:blip>
+          <a:stretch>
+            <a:fillRect/>
+          </a:stretch>
+        </p:blipFill>
+        <p:spPr>
+          <a:xfrm>
+            <a:off x="694490" y="-240225"/>
+            <a:ext cx="7886700" cy="7236047"/>
+          </a:xfrm>
+          <a:prstGeom prst="rect">
+            <a:avLst/>
+          </a:prstGeom>
+        </p:spPr>
+      </p:pic>
+      <p:sp>
+        <p:nvSpPr>
+          <p:cNvPr id="2" name="Title 1">
+            <a:extLst>
+              <a:ext uri="{FF2B5EF4-FFF2-40B4-BE49-F238E27FC236}">
+                <a16:creationId xmlns:a16="http://schemas.microsoft.com/office/drawing/2014/main" id="{BFA378F2-7B95-4CF9-B3E3-BFBFD7218AC4}"/>
+              </a:ext>
+            </a:extLst>
+          </p:cNvPr>
+          <p:cNvSpPr>
+            <a:spLocks noGrp="1"/>
+          </p:cNvSpPr>
+          <p:nvPr>
+            <p:ph type="title"/>
+          </p:nvPr>
+        </p:nvSpPr>
+        <p:spPr/>
+        <p:txBody>
+          <a:bodyPr/>
+          <a:lstStyle/>
+          <a:p>
+            <a:r>
+              <a:rPr lang="en-CA" dirty="0">
+                <a:latin typeface="Britannic Bold" panose="020B0903060703020204" pitchFamily="34" charset="0"/>
+              </a:rPr>
+              <a:t>Team Workflow</a:t>
+            </a:r>
+          </a:p>
+        </p:txBody>
+      </p:sp>
+      <p:sp>
+        <p:nvSpPr>
+          <p:cNvPr id="5" name="Content Placeholder 4">
+            <a:extLst>
+              <a:ext uri="{FF2B5EF4-FFF2-40B4-BE49-F238E27FC236}">
+                <a16:creationId xmlns:a16="http://schemas.microsoft.com/office/drawing/2014/main" id="{ACA5D209-A4E9-4FAE-BC74-26F4F18ADEA3}"/>
+              </a:ext>
+            </a:extLst>
+          </p:cNvPr>
+          <p:cNvSpPr>
+            <a:spLocks noGrp="1"/>
+          </p:cNvSpPr>
+          <p:nvPr>
+            <p:ph idx="1"/>
+          </p:nvPr>
+        </p:nvSpPr>
+        <p:spPr>
+          <a:xfrm>
+            <a:off x="628650" y="1825625"/>
+            <a:ext cx="7886700" cy="4501558"/>
+          </a:xfrm>
+        </p:spPr>
+        <p:txBody>
+          <a:bodyPr/>
+          <a:lstStyle/>
+          <a:p>
+            <a:r>
+              <a:rPr lang="en-CA" dirty="0"/>
+              <a:t>Agile scrums bi-weekly</a:t>
+            </a:r>
+          </a:p>
+        </p:txBody>
+      </p:sp>
+      <p:pic>
+        <p:nvPicPr>
+          <p:cNvPr id="7" name="Graphic 6" descr="Cheers">
+            <a:extLst>
+              <a:ext uri="{FF2B5EF4-FFF2-40B4-BE49-F238E27FC236}">
+                <a16:creationId xmlns:a16="http://schemas.microsoft.com/office/drawing/2014/main" id="{0AFD0EC5-7913-4588-9D89-195F12731687}"/>
+              </a:ext>
+            </a:extLst>
+          </p:cNvPr>
+          <p:cNvPicPr>
+            <a:picLocks noChangeAspect="1"/>
+          </p:cNvPicPr>
+          <p:nvPr/>
+        </p:nvPicPr>
+        <p:blipFill>
+          <a:blip r:embed="rId4">
+            <a:extLst>
+              <a:ext uri="{28A0092B-C50C-407E-A947-70E740481C1C}">
+                <a14:useLocalDpi xmlns:a14="http://schemas.microsoft.com/office/drawing/2010/main" val="0"/>
+              </a:ext>
+              <a:ext uri="{96DAC541-7B7A-43D3-8B79-37D633B846F1}">
+                <asvg:svgBlip xmlns:asvg="http://schemas.microsoft.com/office/drawing/2016/SVG/main" r:embed="rId5"/>
+              </a:ext>
+            </a:extLst>
+          </a:blip>
+          <a:stretch>
+            <a:fillRect/>
+          </a:stretch>
+        </p:blipFill>
+        <p:spPr>
+          <a:xfrm>
+            <a:off x="1150749" y="4765097"/>
+            <a:ext cx="1790054" cy="1790054"/>
+          </a:xfrm>
+          <a:prstGeom prst="rect">
+            <a:avLst/>
+          </a:prstGeom>
+        </p:spPr>
+      </p:pic>
+      <p:pic>
+        <p:nvPicPr>
+          <p:cNvPr id="11" name="Graphic 10" descr="Group brainstorm">
+            <a:extLst>
+              <a:ext uri="{FF2B5EF4-FFF2-40B4-BE49-F238E27FC236}">
+                <a16:creationId xmlns:a16="http://schemas.microsoft.com/office/drawing/2014/main" id="{6FE323D0-DCDA-43E3-9D81-CAC9F2C4681C}"/>
+              </a:ext>
+            </a:extLst>
+          </p:cNvPr>
+          <p:cNvPicPr>
+            <a:picLocks noChangeAspect="1"/>
+          </p:cNvPicPr>
+          <p:nvPr/>
+        </p:nvPicPr>
+        <p:blipFill>
+          <a:blip r:embed="rId6">
+            <a:extLst>
+              <a:ext uri="{28A0092B-C50C-407E-A947-70E740481C1C}">
+                <a14:useLocalDpi xmlns:a14="http://schemas.microsoft.com/office/drawing/2010/main" val="0"/>
+              </a:ext>
+              <a:ext uri="{96DAC541-7B7A-43D3-8B79-37D633B846F1}">
+                <asvg:svgBlip xmlns:asvg="http://schemas.microsoft.com/office/drawing/2016/SVG/main" r:embed="rId7"/>
+              </a:ext>
+            </a:extLst>
+          </a:blip>
+          <a:stretch>
+            <a:fillRect/>
+          </a:stretch>
+        </p:blipFill>
+        <p:spPr>
+          <a:xfrm>
+            <a:off x="5594889" y="4427532"/>
+            <a:ext cx="2465185" cy="2465185"/>
+          </a:xfrm>
+          <a:prstGeom prst="rect">
+            <a:avLst/>
+          </a:prstGeom>
+        </p:spPr>
+      </p:pic>
+      <p:pic>
+        <p:nvPicPr>
+          <p:cNvPr id="15" name="Picture 14" descr="A picture containing computer&#10;&#10;Description automatically generated">
+            <a:extLst>
+              <a:ext uri="{FF2B5EF4-FFF2-40B4-BE49-F238E27FC236}">
+                <a16:creationId xmlns:a16="http://schemas.microsoft.com/office/drawing/2014/main" id="{ECFBC2A4-6F14-4FC7-AE37-158FC4E00735}"/>
+              </a:ext>
+            </a:extLst>
+          </p:cNvPr>
+          <p:cNvPicPr>
+            <a:picLocks noChangeAspect="1"/>
+          </p:cNvPicPr>
+          <p:nvPr/>
+        </p:nvPicPr>
+        <p:blipFill>
+          <a:blip r:embed="rId8">
+            <a:extLst>
+              <a:ext uri="{28A0092B-C50C-407E-A947-70E740481C1C}">
+                <a14:useLocalDpi xmlns:a14="http://schemas.microsoft.com/office/drawing/2010/main" val="0"/>
+              </a:ext>
+            </a:extLst>
+          </a:blip>
+          <a:stretch>
+            <a:fillRect/>
+          </a:stretch>
+        </p:blipFill>
+        <p:spPr>
+          <a:xfrm>
+            <a:off x="7315175" y="185923"/>
+            <a:ext cx="1572235" cy="1572235"/>
+          </a:xfrm>
+          <a:prstGeom prst="rect">
+            <a:avLst/>
+          </a:prstGeom>
+        </p:spPr>
+      </p:pic>
+      <p:pic>
+        <p:nvPicPr>
+          <p:cNvPr id="6" name="Picture 5" descr="A picture containing device, game&#10;&#10;Description automatically generated">
+            <a:extLst>
+              <a:ext uri="{FF2B5EF4-FFF2-40B4-BE49-F238E27FC236}">
+                <a16:creationId xmlns:a16="http://schemas.microsoft.com/office/drawing/2014/main" id="{3C78F296-1B4F-4B6C-944A-86E80F191EF2}"/>
+              </a:ext>
+            </a:extLst>
+          </p:cNvPr>
+          <p:cNvPicPr>
+            <a:picLocks noChangeAspect="1"/>
+          </p:cNvPicPr>
+          <p:nvPr/>
+        </p:nvPicPr>
+        <p:blipFill>
+          <a:blip r:embed="rId9">
+            <a:extLst>
+              <a:ext uri="{BEBA8EAE-BF5A-486C-A8C5-ECC9F3942E4B}">
+                <a14:imgProps xmlns:a14="http://schemas.microsoft.com/office/drawing/2010/main">
+                  <a14:imgLayer r:embed="rId10">
+                    <a14:imgEffect>
+                      <a14:backgroundRemoval t="8116" b="91304" l="10000" r="90000">
+                        <a14:foregroundMark x1="66809" y1="32464" x2="60638" y2="27536"/>
+                        <a14:foregroundMark x1="46170" y1="18261" x2="35106" y2="26667"/>
+                        <a14:foregroundMark x1="35106" y1="26667" x2="34255" y2="26667"/>
+                        <a14:foregroundMark x1="29574" y1="35942" x2="26383" y2="53043"/>
+                        <a14:foregroundMark x1="26383" y1="53043" x2="26170" y2="53333"/>
+                        <a14:foregroundMark x1="31489" y1="71014" x2="37234" y2="78261"/>
+                        <a14:foregroundMark x1="53617" y1="82029" x2="63191" y2="77681"/>
+                        <a14:foregroundMark x1="54681" y1="47246" x2="44255" y2="41159"/>
+                        <a14:foregroundMark x1="44255" y1="41159" x2="42553" y2="57391"/>
+                        <a14:foregroundMark x1="42553" y1="57391" x2="52553" y2="62609"/>
+                        <a14:foregroundMark x1="52553" y1="62609" x2="56383" y2="56812"/>
+                        <a14:foregroundMark x1="50851" y1="39420" x2="58298" y2="53043"/>
+                        <a14:foregroundMark x1="58298" y1="53043" x2="51277" y2="64638"/>
+                        <a14:foregroundMark x1="51277" y1="64638" x2="51702" y2="48116"/>
+                        <a14:foregroundMark x1="51702" y1="48116" x2="57660" y2="43188"/>
+                        <a14:foregroundMark x1="60638" y1="42319" x2="59149" y2="58841"/>
+                        <a14:foregroundMark x1="59149" y1="58841" x2="49149" y2="65217"/>
+                        <a14:foregroundMark x1="49149" y1="65217" x2="38085" y2="59420"/>
+                        <a14:foregroundMark x1="38085" y1="59420" x2="37447" y2="43768"/>
+                        <a14:foregroundMark x1="37447" y1="43768" x2="47234" y2="38261"/>
+                        <a14:foregroundMark x1="47234" y1="38261" x2="57447" y2="43768"/>
+                        <a14:foregroundMark x1="57447" y1="43768" x2="59149" y2="45797"/>
+                        <a14:foregroundMark x1="60213" y1="57681" x2="49787" y2="60870"/>
+                        <a14:foregroundMark x1="49787" y1="60870" x2="40851" y2="55072"/>
+                        <a14:foregroundMark x1="47447" y1="35072" x2="58298" y2="38261"/>
+                        <a14:foregroundMark x1="63617" y1="44348" x2="63617" y2="59130"/>
+                        <a14:foregroundMark x1="56809" y1="63478" x2="49787" y2="68116"/>
+                        <a14:foregroundMark x1="42979" y1="66377" x2="34468" y2="57101"/>
+                        <a14:foregroundMark x1="34468" y1="57101" x2="36170" y2="42029"/>
+                        <a14:foregroundMark x1="36170" y1="42029" x2="40000" y2="40000"/>
+                        <a14:foregroundMark x1="45319" y1="44348" x2="48298" y2="60870"/>
+                        <a14:foregroundMark x1="48298" y1="60870" x2="59149" y2="64928"/>
+                        <a14:foregroundMark x1="59149" y1="64928" x2="65319" y2="52754"/>
+                        <a14:foregroundMark x1="65319" y1="52754" x2="62128" y2="35072"/>
+                        <a14:foregroundMark x1="62128" y1="35072" x2="49787" y2="30725"/>
+                        <a14:foregroundMark x1="49787" y1="30725" x2="48511" y2="31594"/>
+                        <a14:foregroundMark x1="42979" y1="32174" x2="47234" y2="30435"/>
+                        <a14:foregroundMark x1="46383" y1="32464" x2="40638" y2="37391"/>
+                        <a14:foregroundMark x1="46170" y1="65507" x2="47234" y2="69275"/>
+                        <a14:foregroundMark x1="24894" y1="48696" x2="23191" y2="41739"/>
+                        <a14:foregroundMark x1="24681" y1="44638" x2="22340" y2="47246"/>
+                        <a14:foregroundMark x1="34894" y1="72754" x2="37660" y2="80870"/>
+                        <a14:foregroundMark x1="54043" y1="64058" x2="59149" y2="71014"/>
+                        <a14:foregroundMark x1="77872" y1="52174" x2="77872" y2="51014"/>
+                        <a14:foregroundMark x1="66809" y1="22319" x2="63830" y2="23478"/>
+                        <a14:foregroundMark x1="35106" y1="76522" x2="40000" y2="78841"/>
+                        <a14:foregroundMark x1="31277" y1="57101" x2="28085" y2="61159"/>
+                        <a14:foregroundMark x1="26596" y1="57391" x2="29149" y2="59710"/>
+                        <a14:foregroundMark x1="29787" y1="60580" x2="23830" y2="69855"/>
+                        <a14:foregroundMark x1="48936" y1="88986" x2="50638" y2="73623"/>
+                        <a14:foregroundMark x1="50638" y1="73623" x2="50851" y2="73333"/>
+                        <a14:foregroundMark x1="45532" y1="78841" x2="51064" y2="88696"/>
+                        <a14:foregroundMark x1="50851" y1="91594" x2="45106" y2="84638"/>
+                        <a14:foregroundMark x1="78511" y1="49565" x2="78085" y2="60290"/>
+                        <a14:foregroundMark x1="62766" y1="19420" x2="62128" y2="26377"/>
+                        <a14:foregroundMark x1="53830" y1="17971" x2="54043" y2="18841"/>
+                        <a14:foregroundMark x1="57660" y1="19420" x2="57872" y2="20000"/>
+                        <a14:foregroundMark x1="54681" y1="15362" x2="52340" y2="13913"/>
+                        <a14:foregroundMark x1="51489" y1="11594" x2="52553" y2="11884"/>
+                        <a14:foregroundMark x1="71489" y1="39710" x2="75745" y2="48986"/>
+                        <a14:foregroundMark x1="74468" y1="39710" x2="75106" y2="40290"/>
+                        <a14:foregroundMark x1="74681" y1="40290" x2="69362" y2="64928"/>
+                        <a14:foregroundMark x1="67021" y1="71304" x2="70213" y2="76522"/>
+                        <a14:foregroundMark x1="72340" y1="69565" x2="71277" y2="73333"/>
+                        <a14:foregroundMark x1="75106" y1="71304" x2="75319" y2="71014"/>
+                        <a14:foregroundMark x1="75319" y1="70145" x2="64468" y2="66957"/>
+                        <a14:foregroundMark x1="64468" y1="66957" x2="66596" y2="62899"/>
+                        <a14:foregroundMark x1="76596" y1="70145" x2="76596" y2="70145"/>
+                        <a14:foregroundMark x1="24043" y1="70435" x2="24043" y2="70435"/>
+                        <a14:foregroundMark x1="33830" y1="36232" x2="24468" y2="29275"/>
+                        <a14:foregroundMark x1="24468" y1="29275" x2="22340" y2="28986"/>
+                        <a14:foregroundMark x1="33830" y1="34203" x2="27021" y2="26667"/>
+                        <a14:foregroundMark x1="54043" y1="11884" x2="49787" y2="8116"/>
+                        <a14:foregroundMark x1="74894" y1="38841" x2="76809" y2="29565"/>
+                        <a14:backgroundMark x1="8511" y1="21739" x2="8511" y2="21739"/>
+                        <a14:backgroundMark x1="18936" y1="87246" x2="7234" y2="53333"/>
+                        <a14:backgroundMark x1="7234" y1="53333" x2="8723" y2="35652"/>
+                        <a14:backgroundMark x1="8723" y1="35652" x2="17660" y2="13043"/>
+                        <a14:backgroundMark x1="15957" y1="15072" x2="16383" y2="57101"/>
+                      </a14:backgroundRemoval>
+                    </a14:imgEffect>
+                  </a14:imgLayer>
+                </a14:imgProps>
+              </a:ext>
+              <a:ext uri="{28A0092B-C50C-407E-A947-70E740481C1C}">
+                <a14:useLocalDpi xmlns:a14="http://schemas.microsoft.com/office/drawing/2010/main" val="0"/>
+              </a:ext>
+            </a:extLst>
+          </a:blip>
+          <a:stretch>
+            <a:fillRect/>
+          </a:stretch>
+        </p:blipFill>
+        <p:spPr>
+          <a:xfrm>
+            <a:off x="2832852" y="2403923"/>
+            <a:ext cx="3609975" cy="2649875"/>
+          </a:xfrm>
+          <a:prstGeom prst="rect">
+            <a:avLst/>
+          </a:prstGeom>
+        </p:spPr>
+      </p:pic>
+    </p:spTree>
+    <p:extLst>
+      <p:ext uri="{BB962C8B-B14F-4D97-AF65-F5344CB8AC3E}">
+        <p14:creationId xmlns:p14="http://schemas.microsoft.com/office/powerpoint/2010/main" val="3856155402"/>
+      </p:ext>
+    </p:extLst>
+  </p:cSld>
+  <p:clrMapOvr>
+    <a:masterClrMapping/>
+  </p:clrMapOvr>
+  <p:timing>
+    <p:tnLst>
+      <p:par>
+        <p:cTn id="1" dur="indefinite" restart="never" nodeType="tmRoot">
+          <p:childTnLst>
+            <p:seq concurrent="1" nextAc="seek">
+              <p:cTn id="2" dur="indefinite" nodeType="mainSeq">
+                <p:childTnLst>
+                  <p:par>
+                    <p:cTn id="3" fill="hold">
+                      <p:stCondLst>
+                        <p:cond delay="indefinite"/>
+                        <p:cond evt="onBegin" delay="0">
+                          <p:tn val="2"/>
+                        </p:cond>
+                      </p:stCondLst>
+                      <p:childTnLst>
+                        <p:par>
+                          <p:cTn id="4" fill="hold">
+                            <p:stCondLst>
+                              <p:cond delay="0"/>
+                            </p:stCondLst>
+                            <p:childTnLst>
+                              <p:par>
+                                <p:cTn id="5" presetID="8" presetClass="emph" presetSubtype="0" fill="hold" nodeType="withEffect">
+                                  <p:stCondLst>
+                                    <p:cond delay="1500"/>
+                                  </p:stCondLst>
+                                  <p:childTnLst>
+                                    <p:animRot by="21600000">
+                                      <p:cBhvr>
+                                        <p:cTn id="6" dur="2000" fill="hold"/>
+                                        <p:tgtEl>
+                                          <p:spTgt spid="6"/>
+                                        </p:tgtEl>
+                                        <p:attrNameLst>
+                                          <p:attrName>r</p:attrName>
+                                        </p:attrNameLst>
+                                      </p:cBhvr>
+                                    </p:animRot>
+                                  </p:childTnLst>
+                                </p:cTn>
+                              </p:par>
+                            </p:childTnLst>
+                          </p:cTn>
+                        </p:par>
+                      </p:childTnLst>
+                    </p:cTn>
+                  </p:par>
+                </p:childTnLst>
+              </p:cTn>
+              <p:prevCondLst>
+                <p:cond evt="onPrev" delay="0">
+                  <p:tgtEl>
+                    <p:sldTgt/>
+                  </p:tgtEl>
+                </p:cond>
+              </p:prevCondLst>
+              <p:nextCondLst>
+                <p:cond evt="onNext" delay="0">
+                  <p:tgtEl>
+                    <p:sldTgt/>
+                  </p:tgtEl>
+                </p:cond>
+              </p:nextCondLst>
+            </p:seq>
+          </p:childTnLst>
+        </p:cTn>
+      </p:par>
+    </p:tnLst>
+  </p:timing>
+</p:sld>
+</file>
+
+<file path=ppt/slides/slide12.xml><?xml version="1.0" encoding="utf-8"?>
+<p:sld xmlns:a="http://schemas.openxmlformats.org/drawingml/2006/main" xmlns:r="http://schemas.openxmlformats.org/officeDocument/2006/relationships" xmlns:p="http://schemas.openxmlformats.org/presentationml/2006/main">
+  <p:cSld>
+    <p:bg>
+      <p:bgPr>
+        <a:gradFill>
+          <a:gsLst>
+            <a:gs pos="0">
+              <a:schemeClr val="accent1">
+                <a:lumMod val="5000"/>
+                <a:lumOff val="95000"/>
+              </a:schemeClr>
+            </a:gs>
+            <a:gs pos="74000">
+              <a:srgbClr val="92D050"/>
+            </a:gs>
+            <a:gs pos="83000">
+              <a:srgbClr val="92D050"/>
+            </a:gs>
+            <a:gs pos="100000">
+              <a:srgbClr val="82C836"/>
+            </a:gs>
+          </a:gsLst>
+          <a:lin ang="5400000" scaled="1"/>
+        </a:gradFill>
+        <a:effectLst/>
+      </p:bgPr>
+    </p:bg>
+    <p:spTree>
+      <p:nvGrpSpPr>
+        <p:cNvPr id="1" name=""/>
+        <p:cNvGrpSpPr/>
+        <p:nvPr/>
+      </p:nvGrpSpPr>
+      <p:grpSpPr>
+        <a:xfrm>
+          <a:off x="0" y="0"/>
+          <a:ext cx="0" cy="0"/>
+          <a:chOff x="0" y="0"/>
+          <a:chExt cx="0" cy="0"/>
+        </a:xfrm>
+      </p:grpSpPr>
+      <p:pic>
+        <p:nvPicPr>
+          <p:cNvPr id="4" name="Picture 3" descr="A close up of a logo&#10;&#10;Description automatically generated">
+            <a:extLst>
+              <a:ext uri="{FF2B5EF4-FFF2-40B4-BE49-F238E27FC236}">
+                <a16:creationId xmlns:a16="http://schemas.microsoft.com/office/drawing/2014/main" id="{A101321E-B77C-4089-B439-BC624610E501}"/>
+              </a:ext>
+            </a:extLst>
+          </p:cNvPr>
+          <p:cNvPicPr>
+            <a:picLocks noChangeAspect="1"/>
+          </p:cNvPicPr>
+          <p:nvPr/>
+        </p:nvPicPr>
+        <p:blipFill>
+          <a:blip r:embed="rId3">
+            <a:alphaModFix amt="20000"/>
+            <a:extLst>
+              <a:ext uri="{28A0092B-C50C-407E-A947-70E740481C1C}">
+                <a14:useLocalDpi xmlns:a14="http://schemas.microsoft.com/office/drawing/2010/main" val="0"/>
+              </a:ext>
+            </a:extLst>
+          </a:blip>
+          <a:stretch>
+            <a:fillRect/>
+          </a:stretch>
+        </p:blipFill>
+        <p:spPr>
+          <a:xfrm>
+            <a:off x="676700" y="-293595"/>
+            <a:ext cx="7886700" cy="7236047"/>
+          </a:xfrm>
+          <a:prstGeom prst="rect">
+            <a:avLst/>
+          </a:prstGeom>
+        </p:spPr>
+      </p:pic>
+      <p:sp>
+        <p:nvSpPr>
+          <p:cNvPr id="2" name="Title 1">
+            <a:extLst>
+              <a:ext uri="{FF2B5EF4-FFF2-40B4-BE49-F238E27FC236}">
+                <a16:creationId xmlns:a16="http://schemas.microsoft.com/office/drawing/2014/main" id="{BFA378F2-7B95-4CF9-B3E3-BFBFD7218AC4}"/>
+              </a:ext>
+            </a:extLst>
+          </p:cNvPr>
+          <p:cNvSpPr>
+            <a:spLocks noGrp="1"/>
+          </p:cNvSpPr>
+          <p:nvPr>
+            <p:ph type="title"/>
+          </p:nvPr>
+        </p:nvSpPr>
+        <p:spPr/>
+        <p:txBody>
+          <a:bodyPr/>
+          <a:lstStyle/>
+          <a:p>
+            <a:r>
+              <a:rPr lang="en-CA" dirty="0">
+                <a:latin typeface="Britannic Bold" panose="020B0903060703020204" pitchFamily="34" charset="0"/>
+              </a:rPr>
+              <a:t>Individual Contributions</a:t>
+            </a:r>
+          </a:p>
+        </p:txBody>
+      </p:sp>
+      <p:sp>
+        <p:nvSpPr>
+          <p:cNvPr id="5" name="Content Placeholder 4">
+            <a:extLst>
+              <a:ext uri="{FF2B5EF4-FFF2-40B4-BE49-F238E27FC236}">
+                <a16:creationId xmlns:a16="http://schemas.microsoft.com/office/drawing/2014/main" id="{ACA5D209-A4E9-4FAE-BC74-26F4F18ADEA3}"/>
+              </a:ext>
+            </a:extLst>
+          </p:cNvPr>
+          <p:cNvSpPr>
+            <a:spLocks noGrp="1"/>
+          </p:cNvSpPr>
+          <p:nvPr>
+            <p:ph idx="1"/>
+          </p:nvPr>
+        </p:nvSpPr>
+        <p:spPr>
+          <a:xfrm>
+            <a:off x="628650" y="1825625"/>
+            <a:ext cx="7886700" cy="4501558"/>
+          </a:xfrm>
+        </p:spPr>
+        <p:txBody>
+          <a:bodyPr vert="horz" lIns="91440" tIns="45720" rIns="91440" bIns="45720" rtlCol="0" anchor="t">
+            <a:normAutofit/>
+          </a:bodyPr>
+          <a:lstStyle/>
+          <a:p>
+            <a:r>
+              <a:rPr lang="en-CA" dirty="0"/>
+              <a:t>Arian: Calendar view, add goal button on task view</a:t>
+            </a:r>
+            <a:endParaRPr lang="en-CA" dirty="0">
+              <a:cs typeface="Calibri"/>
+            </a:endParaRPr>
+          </a:p>
+          <a:p>
+            <a:r>
+              <a:rPr lang="en-CA" dirty="0"/>
+              <a:t>Victor: Backend APIs, Performance View, Course Dashboard</a:t>
+            </a:r>
+            <a:endParaRPr lang="en-CA" dirty="0">
+              <a:cs typeface="Calibri"/>
+            </a:endParaRPr>
+          </a:p>
+          <a:p>
+            <a:r>
+              <a:rPr lang="en-CA" dirty="0"/>
+              <a:t>Brandon, Robert: Goal pages</a:t>
+            </a:r>
+            <a:r>
+              <a:rPr lang="en-CA"/>
+              <a:t> (Adding goals, listing goals, etc.)</a:t>
+            </a:r>
+            <a:endParaRPr lang="en-CA" dirty="0">
+              <a:cs typeface="Calibri"/>
+            </a:endParaRPr>
+          </a:p>
+          <a:p>
+            <a:r>
+              <a:rPr lang="en-CA" dirty="0"/>
+              <a:t>Nikita: </a:t>
+            </a:r>
+            <a:r>
+              <a:rPr lang="en-CA" dirty="0">
+                <a:cs typeface="Calibri"/>
+              </a:rPr>
+              <a:t>Bottom Navigation, Notifications</a:t>
+            </a:r>
             <a:endParaRPr lang="en-CA" dirty="0"/>
           </a:p>
-        </p:txBody>
-      </p:sp>
+          <a:p>
+            <a:r>
+              <a:rPr lang="en-CA" dirty="0">
+                <a:cs typeface="Calibri"/>
+              </a:rPr>
+              <a:t>Michael: Teacher view</a:t>
+            </a:r>
+            <a:endParaRPr lang="en-CA" dirty="0"/>
+          </a:p>
+          <a:p>
+            <a:r>
+              <a:rPr lang="en-CA" dirty="0">
+                <a:cs typeface="Calibri"/>
+              </a:rPr>
+              <a:t>Josh: Flutter/Firebase and Codebase setup, Login Page, Google Auth </a:t>
+            </a:r>
+          </a:p>
+        </p:txBody>
+      </p:sp>
+      <p:pic>
+        <p:nvPicPr>
+          <p:cNvPr id="17" name="Graphic 16" descr="Cycle with people">
+            <a:extLst>
+              <a:ext uri="{FF2B5EF4-FFF2-40B4-BE49-F238E27FC236}">
+                <a16:creationId xmlns:a16="http://schemas.microsoft.com/office/drawing/2014/main" id="{65522B81-306C-4CA5-8E0B-58E98F16D9DA}"/>
+              </a:ext>
+            </a:extLst>
+          </p:cNvPr>
+          <p:cNvPicPr>
+            <a:picLocks noChangeAspect="1"/>
+          </p:cNvPicPr>
+          <p:nvPr/>
+        </p:nvPicPr>
+        <p:blipFill>
+          <a:blip r:embed="rId4">
+            <a:extLst>
+              <a:ext uri="{28A0092B-C50C-407E-A947-70E740481C1C}">
+                <a14:useLocalDpi xmlns:a14="http://schemas.microsoft.com/office/drawing/2010/main" val="0"/>
+              </a:ext>
+              <a:ext uri="{96DAC541-7B7A-43D3-8B79-37D633B846F1}">
+                <asvg:svgBlip xmlns:asvg="http://schemas.microsoft.com/office/drawing/2016/SVG/main" r:embed="rId5"/>
+              </a:ext>
+            </a:extLst>
+          </a:blip>
+          <a:stretch>
+            <a:fillRect/>
+          </a:stretch>
+        </p:blipFill>
+        <p:spPr>
+          <a:xfrm>
+            <a:off x="3497580" y="4326949"/>
+            <a:ext cx="2279208" cy="2279208"/>
+          </a:xfrm>
+          <a:prstGeom prst="rect">
+            <a:avLst/>
+          </a:prstGeom>
+        </p:spPr>
+      </p:pic>
     </p:spTree>
     <p:extLst>
       <p:ext uri="{BB962C8B-B14F-4D97-AF65-F5344CB8AC3E}">
@@ -5514,10 +7544,13 @@
   <p:clrMapOvr>
     <a:masterClrMapping/>
   </p:clrMapOvr>
+  <p:transition spd="slow">
+    <p:push dir="d"/>
+  </p:transition>
 </p:sld>
 </file>
 
-<file path=ppt/slides/slide11.xml><?xml version="1.0" encoding="utf-8"?>
+<file path=ppt/slides/slide13.xml><?xml version="1.0" encoding="utf-8"?>
 <p:sld xmlns:a="http://schemas.openxmlformats.org/drawingml/2006/main" xmlns:r="http://schemas.openxmlformats.org/officeDocument/2006/relationships" xmlns:p="http://schemas.openxmlformats.org/presentationml/2006/main">
   <p:cSld>
     <p:bg>
@@ -6057,6 +8090,18 @@
   <p:clrMapOvr>
     <a:masterClrMapping/>
   </p:clrMapOvr>
+  <mc:AlternateContent xmlns:mc="http://schemas.openxmlformats.org/markup-compatibility/2006">
+    <mc:Choice xmlns:p15="http://schemas.microsoft.com/office/powerpoint/2012/main" Requires="p15">
+      <p:transition xmlns:p14="http://schemas.microsoft.com/office/powerpoint/2010/main" spd="slow" p14:dur="2000">
+        <p15:prstTrans prst="drape"/>
+      </p:transition>
+    </mc:Choice>
+    <mc:Fallback>
+      <p:transition spd="slow">
+        <p:fade/>
+      </p:transition>
+    </mc:Fallback>
+  </mc:AlternateContent>
   <p:timing>
     <p:tnLst>
       <p:par>
@@ -6069,6 +8114,9 @@
                     <p:cTn id="3" fill="hold">
                       <p:stCondLst>
                         <p:cond delay="indefinite"/>
+                        <p:cond evt="onBegin" delay="0">
+                          <p:tn val="2"/>
+                        </p:cond>
                       </p:stCondLst>
                       <p:childTnLst>
                         <p:par>
@@ -6078,9 +8126,9 @@
                             </p:stCondLst>
                             <p:childTnLst>
                               <p:par>
-                                <p:cTn id="5" presetID="16" presetClass="entr" presetSubtype="21" fill="hold" nodeType="clickEffect">
+                                <p:cTn id="5" presetID="2" presetClass="entr" presetSubtype="8" fill="hold" nodeType="withEffect">
                                   <p:stCondLst>
-                                    <p:cond delay="0"/>
+                                    <p:cond delay="250"/>
                                   </p:stCondLst>
                                   <p:childTnLst>
                                     <p:set>
@@ -6101,44 +8149,137 @@
                                         <p:strVal val="visible"/>
                                       </p:to>
                                     </p:set>
-                                    <p:animEffect transition="in" filter="barn(inVertical)">
-                                      <p:cBhvr>
-                                        <p:cTn id="7" dur="500"/>
+                                    <p:anim calcmode="lin" valueType="num">
+                                      <p:cBhvr additive="base">
+                                        <p:cTn id="7" dur="500" fill="hold"/>
                                         <p:tgtEl>
                                           <p:spTgt spid="11"/>
                                         </p:tgtEl>
+                                        <p:attrNameLst>
+                                          <p:attrName>ppt_x</p:attrName>
+                                        </p:attrNameLst>
                                       </p:cBhvr>
-                                    </p:animEffect>
+                                      <p:tavLst>
+                                        <p:tav tm="0">
+                                          <p:val>
+                                            <p:strVal val="0-#ppt_w/2"/>
+                                          </p:val>
+                                        </p:tav>
+                                        <p:tav tm="100000">
+                                          <p:val>
+                                            <p:strVal val="#ppt_x"/>
+                                          </p:val>
+                                        </p:tav>
+                                      </p:tavLst>
+                                    </p:anim>
+                                    <p:anim calcmode="lin" valueType="num">
+                                      <p:cBhvr additive="base">
+                                        <p:cTn id="8" dur="500" fill="hold"/>
+                                        <p:tgtEl>
+                                          <p:spTgt spid="11"/>
+                                        </p:tgtEl>
+                                        <p:attrNameLst>
+                                          <p:attrName>ppt_y</p:attrName>
+                                        </p:attrNameLst>
+                                      </p:cBhvr>
+                                      <p:tavLst>
+                                        <p:tav tm="0">
+                                          <p:val>
+                                            <p:strVal val="#ppt_y"/>
+                                          </p:val>
+                                        </p:tav>
+                                        <p:tav tm="100000">
+                                          <p:val>
+                                            <p:strVal val="#ppt_y"/>
+                                          </p:val>
+                                        </p:tav>
+                                      </p:tavLst>
+                                    </p:anim>
                                   </p:childTnLst>
                                 </p:cTn>
                               </p:par>
-                            </p:childTnLst>
-                          </p:cTn>
-                        </p:par>
-                      </p:childTnLst>
-                    </p:cTn>
-                  </p:par>
-                  <p:par>
-                    <p:cTn id="8" fill="hold">
-                      <p:stCondLst>
-                        <p:cond delay="indefinite"/>
-                      </p:stCondLst>
-                      <p:childTnLst>
-                        <p:par>
-                          <p:cTn id="9" fill="hold">
-                            <p:stCondLst>
-                              <p:cond delay="0"/>
-                            </p:stCondLst>
-                            <p:childTnLst>
                               <p:par>
-                                <p:cTn id="10" presetID="16" presetClass="entr" presetSubtype="21" fill="hold" nodeType="clickEffect">
+                                <p:cTn id="9" presetID="2" presetClass="entr" presetSubtype="8" fill="hold" nodeType="withEffect">
                                   <p:stCondLst>
-                                    <p:cond delay="0"/>
+                                    <p:cond delay="250"/>
                                   </p:stCondLst>
                                   <p:childTnLst>
                                     <p:set>
                                       <p:cBhvr>
-                                        <p:cTn id="11" dur="1" fill="hold">
+                                        <p:cTn id="10" dur="1" fill="hold">
+                                          <p:stCondLst>
+                                            <p:cond delay="0"/>
+                                          </p:stCondLst>
+                                        </p:cTn>
+                                        <p:tgtEl>
+                                          <p:spTgt spid="13"/>
+                                        </p:tgtEl>
+                                        <p:attrNameLst>
+                                          <p:attrName>style.visibility</p:attrName>
+                                        </p:attrNameLst>
+                                      </p:cBhvr>
+                                      <p:to>
+                                        <p:strVal val="visible"/>
+                                      </p:to>
+                                    </p:set>
+                                    <p:anim calcmode="lin" valueType="num">
+                                      <p:cBhvr additive="base">
+                                        <p:cTn id="11" dur="500" fill="hold"/>
+                                        <p:tgtEl>
+                                          <p:spTgt spid="13"/>
+                                        </p:tgtEl>
+                                        <p:attrNameLst>
+                                          <p:attrName>ppt_x</p:attrName>
+                                        </p:attrNameLst>
+                                      </p:cBhvr>
+                                      <p:tavLst>
+                                        <p:tav tm="0">
+                                          <p:val>
+                                            <p:strVal val="0-#ppt_w/2"/>
+                                          </p:val>
+                                        </p:tav>
+                                        <p:tav tm="100000">
+                                          <p:val>
+                                            <p:strVal val="#ppt_x"/>
+                                          </p:val>
+                                        </p:tav>
+                                      </p:tavLst>
+                                    </p:anim>
+                                    <p:anim calcmode="lin" valueType="num">
+                                      <p:cBhvr additive="base">
+                                        <p:cTn id="12" dur="500" fill="hold"/>
+                                        <p:tgtEl>
+                                          <p:spTgt spid="13"/>
+                                        </p:tgtEl>
+                                        <p:attrNameLst>
+                                          <p:attrName>ppt_y</p:attrName>
+                                        </p:attrNameLst>
+                                      </p:cBhvr>
+                                      <p:tavLst>
+                                        <p:tav tm="0">
+                                          <p:val>
+                                            <p:strVal val="#ppt_y"/>
+                                          </p:val>
+                                        </p:tav>
+                                        <p:tav tm="100000">
+                                          <p:val>
+                                            <p:strVal val="#ppt_y"/>
+                                          </p:val>
+                                        </p:tav>
+                                      </p:tavLst>
+                                    </p:anim>
+                                  </p:childTnLst>
+                                </p:cTn>
+                              </p:par>
+                              <p:par>
+                                <p:cTn id="13" presetID="2" presetClass="entr" presetSubtype="8" fill="hold" nodeType="withEffect">
+                                  <p:stCondLst>
+                                    <p:cond delay="250"/>
+                                  </p:stCondLst>
+                                  <p:childTnLst>
+                                    <p:set>
+                                      <p:cBhvr>
+                                        <p:cTn id="14" dur="1" fill="hold">
                                           <p:stCondLst>
                                             <p:cond delay="0"/>
                                           </p:stCondLst>
@@ -6154,44 +8295,64 @@
                                         <p:strVal val="visible"/>
                                       </p:to>
                                     </p:set>
-                                    <p:animEffect transition="in" filter="barn(inVertical)">
-                                      <p:cBhvr>
-                                        <p:cTn id="12" dur="500"/>
+                                    <p:anim calcmode="lin" valueType="num">
+                                      <p:cBhvr additive="base">
+                                        <p:cTn id="15" dur="500" fill="hold"/>
                                         <p:tgtEl>
                                           <p:spTgt spid="7"/>
                                         </p:tgtEl>
+                                        <p:attrNameLst>
+                                          <p:attrName>ppt_x</p:attrName>
+                                        </p:attrNameLst>
                                       </p:cBhvr>
-                                    </p:animEffect>
+                                      <p:tavLst>
+                                        <p:tav tm="0">
+                                          <p:val>
+                                            <p:strVal val="0-#ppt_w/2"/>
+                                          </p:val>
+                                        </p:tav>
+                                        <p:tav tm="100000">
+                                          <p:val>
+                                            <p:strVal val="#ppt_x"/>
+                                          </p:val>
+                                        </p:tav>
+                                      </p:tavLst>
+                                    </p:anim>
+                                    <p:anim calcmode="lin" valueType="num">
+                                      <p:cBhvr additive="base">
+                                        <p:cTn id="16" dur="500" fill="hold"/>
+                                        <p:tgtEl>
+                                          <p:spTgt spid="7"/>
+                                        </p:tgtEl>
+                                        <p:attrNameLst>
+                                          <p:attrName>ppt_y</p:attrName>
+                                        </p:attrNameLst>
+                                      </p:cBhvr>
+                                      <p:tavLst>
+                                        <p:tav tm="0">
+                                          <p:val>
+                                            <p:strVal val="#ppt_y"/>
+                                          </p:val>
+                                        </p:tav>
+                                        <p:tav tm="100000">
+                                          <p:val>
+                                            <p:strVal val="#ppt_y"/>
+                                          </p:val>
+                                        </p:tav>
+                                      </p:tavLst>
+                                    </p:anim>
                                   </p:childTnLst>
                                 </p:cTn>
                               </p:par>
-                            </p:childTnLst>
-                          </p:cTn>
-                        </p:par>
-                      </p:childTnLst>
-                    </p:cTn>
-                  </p:par>
-                  <p:par>
-                    <p:cTn id="13" fill="hold">
-                      <p:stCondLst>
-                        <p:cond delay="indefinite"/>
-                      </p:stCondLst>
-                      <p:childTnLst>
-                        <p:par>
-                          <p:cTn id="14" fill="hold">
-                            <p:stCondLst>
-                              <p:cond delay="0"/>
-                            </p:stCondLst>
-                            <p:childTnLst>
                               <p:par>
-                                <p:cTn id="15" presetID="16" presetClass="entr" presetSubtype="21" fill="hold" nodeType="clickEffect">
+                                <p:cTn id="17" presetID="2" presetClass="entr" presetSubtype="8" fill="hold" nodeType="withEffect">
                                   <p:stCondLst>
-                                    <p:cond delay="0"/>
+                                    <p:cond delay="250"/>
                                   </p:stCondLst>
                                   <p:childTnLst>
                                     <p:set>
                                       <p:cBhvr>
-                                        <p:cTn id="16" dur="1" fill="hold">
+                                        <p:cTn id="18" dur="1" fill="hold">
                                           <p:stCondLst>
                                             <p:cond delay="0"/>
                                           </p:stCondLst>
@@ -6207,14 +8368,52 @@
                                         <p:strVal val="visible"/>
                                       </p:to>
                                     </p:set>
-                                    <p:animEffect transition="in" filter="barn(inVertical)">
-                                      <p:cBhvr>
-                                        <p:cTn id="17" dur="500"/>
+                                    <p:anim calcmode="lin" valueType="num">
+                                      <p:cBhvr additive="base">
+                                        <p:cTn id="19" dur="500" fill="hold"/>
                                         <p:tgtEl>
                                           <p:spTgt spid="9"/>
                                         </p:tgtEl>
+                                        <p:attrNameLst>
+                                          <p:attrName>ppt_x</p:attrName>
+                                        </p:attrNameLst>
                                       </p:cBhvr>
-                                    </p:animEffect>
+                                      <p:tavLst>
+                                        <p:tav tm="0">
+                                          <p:val>
+                                            <p:strVal val="0-#ppt_w/2"/>
+                                          </p:val>
+                                        </p:tav>
+                                        <p:tav tm="100000">
+                                          <p:val>
+                                            <p:strVal val="#ppt_x"/>
+                                          </p:val>
+                                        </p:tav>
+                                      </p:tavLst>
+                                    </p:anim>
+                                    <p:anim calcmode="lin" valueType="num">
+                                      <p:cBhvr additive="base">
+                                        <p:cTn id="20" dur="500" fill="hold"/>
+                                        <p:tgtEl>
+                                          <p:spTgt spid="9"/>
+                                        </p:tgtEl>
+                                        <p:attrNameLst>
+                                          <p:attrName>ppt_y</p:attrName>
+                                        </p:attrNameLst>
+                                      </p:cBhvr>
+                                      <p:tavLst>
+                                        <p:tav tm="0">
+                                          <p:val>
+                                            <p:strVal val="#ppt_y"/>
+                                          </p:val>
+                                        </p:tav>
+                                        <p:tav tm="100000">
+                                          <p:val>
+                                            <p:strVal val="#ppt_y"/>
+                                          </p:val>
+                                        </p:tav>
+                                      </p:tavLst>
+                                    </p:anim>
                                   </p:childTnLst>
                                 </p:cTn>
                               </p:par>
@@ -6306,7 +8505,7 @@
           <p:nvPr/>
         </p:nvPicPr>
         <p:blipFill>
-          <a:blip r:embed="rId2">
+          <a:blip r:embed="rId3">
             <a:alphaModFix amt="20000"/>
             <a:extLst>
               <a:ext uri="{28A0092B-C50C-407E-A947-70E740481C1C}">
@@ -6390,6 +8589,12 @@
               <a:t>Goal to replace paper agenda</a:t>
             </a:r>
           </a:p>
+          <a:p>
+            <a:r>
+              <a:rPr lang="en-CA" dirty="0"/>
+              <a:t>Integrate Google Classroom</a:t>
+            </a:r>
+          </a:p>
         </p:txBody>
       </p:sp>
       <p:pic>
@@ -6407,13 +8612,13 @@
           <p:nvPr/>
         </p:nvPicPr>
         <p:blipFill>
-          <a:blip r:embed="rId3">
+          <a:blip r:embed="rId4">
             <a:extLst>
               <a:ext uri="{28A0092B-C50C-407E-A947-70E740481C1C}">
                 <a14:useLocalDpi xmlns:a14="http://schemas.microsoft.com/office/drawing/2010/main" val="0"/>
               </a:ext>
               <a:ext uri="{96DAC541-7B7A-43D3-8B79-37D633B846F1}">
-                <asvg:svgBlip xmlns:asvg="http://schemas.microsoft.com/office/drawing/2016/SVG/main" r:embed="rId4"/>
+                <asvg:svgBlip xmlns:asvg="http://schemas.microsoft.com/office/drawing/2016/SVG/main" r:embed="rId5"/>
               </a:ext>
             </a:extLst>
           </a:blip>
@@ -6425,6 +8630,45 @@
           <a:xfrm>
             <a:off x="7819850" y="497322"/>
             <a:ext cx="914400" cy="914400"/>
+          </a:xfrm>
+          <a:prstGeom prst="rect">
+            <a:avLst/>
+          </a:prstGeom>
+        </p:spPr>
+      </p:pic>
+      <p:pic>
+        <p:nvPicPr>
+          <p:cNvPr id="6" name="Graphic 5" descr="Open book">
+            <a:extLst>
+              <a:ext uri="{FF2B5EF4-FFF2-40B4-BE49-F238E27FC236}">
+                <a16:creationId xmlns:a16="http://schemas.microsoft.com/office/drawing/2014/main" id="{77D97C0A-1D96-445C-B04F-F7F3BEFF80D1}"/>
+              </a:ext>
+            </a:extLst>
+          </p:cNvPr>
+          <p:cNvPicPr>
+            <a:picLocks noChangeAspect="1"/>
+          </p:cNvPicPr>
+          <p:nvPr/>
+        </p:nvPicPr>
+        <p:blipFill>
+          <a:blip r:embed="rId6">
+            <a:extLst>
+              <a:ext uri="{28A0092B-C50C-407E-A947-70E740481C1C}">
+                <a14:useLocalDpi xmlns:a14="http://schemas.microsoft.com/office/drawing/2010/main" val="0"/>
+              </a:ext>
+              <a:ext uri="{96DAC541-7B7A-43D3-8B79-37D633B846F1}">
+                <asvg:svgBlip xmlns:asvg="http://schemas.microsoft.com/office/drawing/2016/SVG/main" r:embed="rId7"/>
+              </a:ext>
+            </a:extLst>
+          </a:blip>
+          <a:stretch>
+            <a:fillRect/>
+          </a:stretch>
+        </p:blipFill>
+        <p:spPr>
+          <a:xfrm>
+            <a:off x="2912364" y="2967419"/>
+            <a:ext cx="3209544" cy="3209544"/>
           </a:xfrm>
           <a:prstGeom prst="rect">
             <a:avLst/>
@@ -6441,6 +8685,164 @@
   <p:clrMapOvr>
     <a:masterClrMapping/>
   </p:clrMapOvr>
+  <p:transition spd="slow">
+    <p:push dir="u"/>
+  </p:transition>
+  <p:timing>
+    <p:tnLst>
+      <p:par>
+        <p:cTn id="1" dur="indefinite" restart="never" nodeType="tmRoot">
+          <p:childTnLst>
+            <p:seq concurrent="1" nextAc="seek">
+              <p:cTn id="2" dur="indefinite" nodeType="mainSeq">
+                <p:childTnLst>
+                  <p:par>
+                    <p:cTn id="3" fill="hold">
+                      <p:stCondLst>
+                        <p:cond delay="indefinite"/>
+                        <p:cond evt="onBegin" delay="0">
+                          <p:tn val="2"/>
+                        </p:cond>
+                      </p:stCondLst>
+                      <p:childTnLst>
+                        <p:par>
+                          <p:cTn id="4" fill="hold">
+                            <p:stCondLst>
+                              <p:cond delay="0"/>
+                            </p:stCondLst>
+                            <p:childTnLst>
+                              <p:par>
+                                <p:cTn id="5" presetID="31" presetClass="entr" presetSubtype="0" fill="hold" nodeType="withEffect">
+                                  <p:stCondLst>
+                                    <p:cond delay="0"/>
+                                  </p:stCondLst>
+                                  <p:childTnLst>
+                                    <p:set>
+                                      <p:cBhvr>
+                                        <p:cTn id="6" dur="1" fill="hold">
+                                          <p:stCondLst>
+                                            <p:cond delay="0"/>
+                                          </p:stCondLst>
+                                        </p:cTn>
+                                        <p:tgtEl>
+                                          <p:spTgt spid="6"/>
+                                        </p:tgtEl>
+                                        <p:attrNameLst>
+                                          <p:attrName>style.visibility</p:attrName>
+                                        </p:attrNameLst>
+                                      </p:cBhvr>
+                                      <p:to>
+                                        <p:strVal val="visible"/>
+                                      </p:to>
+                                    </p:set>
+                                    <p:anim calcmode="lin" valueType="num">
+                                      <p:cBhvr>
+                                        <p:cTn id="7" dur="1000" fill="hold"/>
+                                        <p:tgtEl>
+                                          <p:spTgt spid="6"/>
+                                        </p:tgtEl>
+                                        <p:attrNameLst>
+                                          <p:attrName>ppt_w</p:attrName>
+                                        </p:attrNameLst>
+                                      </p:cBhvr>
+                                      <p:tavLst>
+                                        <p:tav tm="0">
+                                          <p:val>
+                                            <p:fltVal val="0"/>
+                                          </p:val>
+                                        </p:tav>
+                                        <p:tav tm="100000">
+                                          <p:val>
+                                            <p:strVal val="#ppt_w"/>
+                                          </p:val>
+                                        </p:tav>
+                                      </p:tavLst>
+                                    </p:anim>
+                                    <p:anim calcmode="lin" valueType="num">
+                                      <p:cBhvr>
+                                        <p:cTn id="8" dur="1000" fill="hold"/>
+                                        <p:tgtEl>
+                                          <p:spTgt spid="6"/>
+                                        </p:tgtEl>
+                                        <p:attrNameLst>
+                                          <p:attrName>ppt_h</p:attrName>
+                                        </p:attrNameLst>
+                                      </p:cBhvr>
+                                      <p:tavLst>
+                                        <p:tav tm="0">
+                                          <p:val>
+                                            <p:fltVal val="0"/>
+                                          </p:val>
+                                        </p:tav>
+                                        <p:tav tm="100000">
+                                          <p:val>
+                                            <p:strVal val="#ppt_h"/>
+                                          </p:val>
+                                        </p:tav>
+                                      </p:tavLst>
+                                    </p:anim>
+                                    <p:anim calcmode="lin" valueType="num">
+                                      <p:cBhvr>
+                                        <p:cTn id="9" dur="1000" fill="hold"/>
+                                        <p:tgtEl>
+                                          <p:spTgt spid="6"/>
+                                        </p:tgtEl>
+                                        <p:attrNameLst>
+                                          <p:attrName>style.rotation</p:attrName>
+                                        </p:attrNameLst>
+                                      </p:cBhvr>
+                                      <p:tavLst>
+                                        <p:tav tm="0">
+                                          <p:val>
+                                            <p:fltVal val="90"/>
+                                          </p:val>
+                                        </p:tav>
+                                        <p:tav tm="100000">
+                                          <p:val>
+                                            <p:fltVal val="0"/>
+                                          </p:val>
+                                        </p:tav>
+                                      </p:tavLst>
+                                    </p:anim>
+                                    <p:animEffect transition="in" filter="fade">
+                                      <p:cBhvr>
+                                        <p:cTn id="10" dur="1000"/>
+                                        <p:tgtEl>
+                                          <p:spTgt spid="6"/>
+                                        </p:tgtEl>
+                                      </p:cBhvr>
+                                    </p:animEffect>
+                                  </p:childTnLst>
+                                </p:cTn>
+                              </p:par>
+                            </p:childTnLst>
+                          </p:cTn>
+                        </p:par>
+                      </p:childTnLst>
+                    </p:cTn>
+                  </p:par>
+                </p:childTnLst>
+              </p:cTn>
+              <p:prevCondLst>
+                <p:cond evt="onPrev" delay="0">
+                  <p:tgtEl>
+                    <p:sldTgt/>
+                  </p:tgtEl>
+                </p:cond>
+              </p:prevCondLst>
+              <p:nextCondLst>
+                <p:cond evt="onNext" delay="0">
+                  <p:tgtEl>
+                    <p:sldTgt/>
+                  </p:tgtEl>
+                </p:cond>
+              </p:nextCondLst>
+            </p:seq>
+          </p:childTnLst>
+        </p:cTn>
+      </p:par>
+    </p:tnLst>
+  </p:timing>
 </p:sld>
 </file>
 
@@ -6501,7 +8903,7 @@
           <p:nvPr/>
         </p:nvPicPr>
         <p:blipFill>
-          <a:blip r:embed="rId2">
+          <a:blip r:embed="rId3">
             <a:alphaModFix amt="20000"/>
             <a:extLst>
               <a:ext uri="{28A0092B-C50C-407E-A947-70E740481C1C}">
@@ -6602,13 +9004,13 @@
           <p:nvPr/>
         </p:nvPicPr>
         <p:blipFill>
-          <a:blip r:embed="rId3">
+          <a:blip r:embed="rId4">
             <a:extLst>
               <a:ext uri="{28A0092B-C50C-407E-A947-70E740481C1C}">
                 <a14:useLocalDpi xmlns:a14="http://schemas.microsoft.com/office/drawing/2010/main" val="0"/>
               </a:ext>
               <a:ext uri="{96DAC541-7B7A-43D3-8B79-37D633B846F1}">
-                <asvg:svgBlip xmlns:asvg="http://schemas.microsoft.com/office/drawing/2016/SVG/main" r:embed="rId4"/>
+                <asvg:svgBlip xmlns:asvg="http://schemas.microsoft.com/office/drawing/2016/SVG/main" r:embed="rId5"/>
               </a:ext>
             </a:extLst>
           </a:blip>
@@ -6618,8 +9020,47 @@
         </p:blipFill>
         <p:spPr>
           <a:xfrm>
-            <a:off x="7714281" y="5477908"/>
-            <a:ext cx="1291189" cy="1291189"/>
+            <a:off x="5159048" y="3236970"/>
+            <a:ext cx="2988256" cy="2988256"/>
+          </a:xfrm>
+          <a:prstGeom prst="rect">
+            <a:avLst/>
+          </a:prstGeom>
+        </p:spPr>
+      </p:pic>
+      <p:pic>
+        <p:nvPicPr>
+          <p:cNvPr id="7" name="Graphic 6" descr="Classroom">
+            <a:extLst>
+              <a:ext uri="{FF2B5EF4-FFF2-40B4-BE49-F238E27FC236}">
+                <a16:creationId xmlns:a16="http://schemas.microsoft.com/office/drawing/2014/main" id="{F193BA68-A5D0-43E9-9D16-9BFE3FD7DA65}"/>
+              </a:ext>
+            </a:extLst>
+          </p:cNvPr>
+          <p:cNvPicPr>
+            <a:picLocks noChangeAspect="1"/>
+          </p:cNvPicPr>
+          <p:nvPr/>
+        </p:nvPicPr>
+        <p:blipFill>
+          <a:blip r:embed="rId6">
+            <a:extLst>
+              <a:ext uri="{28A0092B-C50C-407E-A947-70E740481C1C}">
+                <a14:useLocalDpi xmlns:a14="http://schemas.microsoft.com/office/drawing/2010/main" val="0"/>
+              </a:ext>
+              <a:ext uri="{96DAC541-7B7A-43D3-8B79-37D633B846F1}">
+                <asvg:svgBlip xmlns:asvg="http://schemas.microsoft.com/office/drawing/2016/SVG/main" r:embed="rId7"/>
+              </a:ext>
+            </a:extLst>
+          </a:blip>
+          <a:stretch>
+            <a:fillRect/>
+          </a:stretch>
+        </p:blipFill>
+        <p:spPr>
+          <a:xfrm>
+            <a:off x="1028700" y="3067812"/>
+            <a:ext cx="3405218" cy="3405218"/>
           </a:xfrm>
           <a:prstGeom prst="rect">
             <a:avLst/>
@@ -6636,6 +9077,9 @@
   <p:clrMapOvr>
     <a:masterClrMapping/>
   </p:clrMapOvr>
+  <p:transition spd="slow">
+    <p:wipe/>
+  </p:transition>
 </p:sld>
 </file>
 
@@ -6696,7 +9140,7 @@
           <p:nvPr/>
         </p:nvPicPr>
         <p:blipFill>
-          <a:blip r:embed="rId2">
+          <a:blip r:embed="rId3">
             <a:alphaModFix amt="20000"/>
             <a:extLst>
               <a:ext uri="{28A0092B-C50C-407E-A947-70E740481C1C}">
@@ -6765,13 +9209,13 @@
           </p:nvPr>
         </p:nvPicPr>
         <p:blipFill>
-          <a:blip r:embed="rId3">
+          <a:blip r:embed="rId4">
             <a:extLst>
               <a:ext uri="{28A0092B-C50C-407E-A947-70E740481C1C}">
                 <a14:useLocalDpi xmlns:a14="http://schemas.microsoft.com/office/drawing/2010/main" val="0"/>
               </a:ext>
               <a:ext uri="{96DAC541-7B7A-43D3-8B79-37D633B846F1}">
-                <asvg:svgBlip xmlns:asvg="http://schemas.microsoft.com/office/drawing/2016/SVG/main" r:embed="rId4"/>
+                <asvg:svgBlip xmlns:asvg="http://schemas.microsoft.com/office/drawing/2016/SVG/main" r:embed="rId5"/>
               </a:ext>
             </a:extLst>
           </a:blip>
@@ -6796,6 +9240,18 @@
   <p:clrMapOvr>
     <a:masterClrMapping/>
   </p:clrMapOvr>
+  <mc:AlternateContent xmlns:mc="http://schemas.openxmlformats.org/markup-compatibility/2006" xmlns:p15="http://schemas.microsoft.com/office/powerpoint/2012/main">
+    <mc:Choice Requires="p15">
+      <p:transition xmlns:p14="http://schemas.microsoft.com/office/powerpoint/2010/main" spd="slow" p14:dur="1250">
+        <p15:prstTrans prst="pageCurlDouble"/>
+      </p:transition>
+    </mc:Choice>
+    <mc:Fallback xmlns="">
+      <p:transition spd="slow">
+        <p:fade/>
+      </p:transition>
+    </mc:Fallback>
+  </mc:AlternateContent>
 </p:sld>
 </file>
 
@@ -6856,7 +9312,7 @@
           <p:nvPr/>
         </p:nvPicPr>
         <p:blipFill>
-          <a:blip r:embed="rId2">
+          <a:blip r:embed="rId3">
             <a:alphaModFix amt="20000"/>
             <a:extLst>
               <a:ext uri="{28A0092B-C50C-407E-A947-70E740481C1C}">
@@ -6925,13 +9381,13 @@
           </p:nvPr>
         </p:nvPicPr>
         <p:blipFill>
-          <a:blip r:embed="rId3">
+          <a:blip r:embed="rId4">
             <a:extLst>
               <a:ext uri="{28A0092B-C50C-407E-A947-70E740481C1C}">
                 <a14:useLocalDpi xmlns:a14="http://schemas.microsoft.com/office/drawing/2010/main" val="0"/>
               </a:ext>
               <a:ext uri="{96DAC541-7B7A-43D3-8B79-37D633B846F1}">
-                <asvg:svgBlip xmlns:asvg="http://schemas.microsoft.com/office/drawing/2016/SVG/main" r:embed="rId4"/>
+                <asvg:svgBlip xmlns:asvg="http://schemas.microsoft.com/office/drawing/2016/SVG/main" r:embed="rId5"/>
               </a:ext>
             </a:extLst>
           </a:blip>
@@ -6961,13 +9417,13 @@
           <p:nvPr/>
         </p:nvPicPr>
         <p:blipFill>
-          <a:blip r:embed="rId5">
+          <a:blip r:embed="rId6">
             <a:extLst>
               <a:ext uri="{28A0092B-C50C-407E-A947-70E740481C1C}">
                 <a14:useLocalDpi xmlns:a14="http://schemas.microsoft.com/office/drawing/2010/main" val="0"/>
               </a:ext>
               <a:ext uri="{96DAC541-7B7A-43D3-8B79-37D633B846F1}">
-                <asvg:svgBlip xmlns:asvg="http://schemas.microsoft.com/office/drawing/2016/SVG/main" r:embed="rId6"/>
+                <asvg:svgBlip xmlns:asvg="http://schemas.microsoft.com/office/drawing/2016/SVG/main" r:embed="rId7"/>
               </a:ext>
             </a:extLst>
           </a:blip>
@@ -6985,6 +9441,217 @@
           </a:prstGeom>
         </p:spPr>
       </p:pic>
+      <p:sp>
+        <p:nvSpPr>
+          <p:cNvPr id="6" name="Content Placeholder 4">
+            <a:extLst>
+              <a:ext uri="{FF2B5EF4-FFF2-40B4-BE49-F238E27FC236}">
+                <a16:creationId xmlns:a16="http://schemas.microsoft.com/office/drawing/2014/main" id="{A3460A74-46C1-4160-B44E-3DD58ACB55E7}"/>
+              </a:ext>
+            </a:extLst>
+          </p:cNvPr>
+          <p:cNvSpPr txBox="1">
+            <a:spLocks/>
+          </p:cNvSpPr>
+          <p:nvPr/>
+        </p:nvSpPr>
+        <p:spPr>
+          <a:xfrm>
+            <a:off x="628650" y="1825625"/>
+            <a:ext cx="7886700" cy="4501558"/>
+          </a:xfrm>
+          <a:prstGeom prst="rect">
+            <a:avLst/>
+          </a:prstGeom>
+        </p:spPr>
+        <p:txBody>
+          <a:bodyPr vert="horz" lIns="91440" tIns="45720" rIns="91440" bIns="45720" rtlCol="0">
+            <a:normAutofit/>
+          </a:bodyPr>
+          <a:lstStyle>
+            <a:lvl1pPr marL="171450" indent="-171450" algn="l" defTabSz="685800" rtl="0" eaLnBrk="1" latinLnBrk="0" hangingPunct="1">
+              <a:lnSpc>
+                <a:spcPct val="90000"/>
+              </a:lnSpc>
+              <a:spcBef>
+                <a:spcPts val="750"/>
+              </a:spcBef>
+              <a:buFont typeface="Arial" panose="020B0604020202020204" pitchFamily="34" charset="0"/>
+              <a:buChar char="•"/>
+              <a:defRPr sz="2100" kern="1200">
+                <a:solidFill>
+                  <a:schemeClr val="tx1"/>
+                </a:solidFill>
+                <a:latin typeface="+mn-lt"/>
+                <a:ea typeface="+mn-ea"/>
+                <a:cs typeface="+mn-cs"/>
+              </a:defRPr>
+            </a:lvl1pPr>
+            <a:lvl2pPr marL="514350" indent="-171450" algn="l" defTabSz="685800" rtl="0" eaLnBrk="1" latinLnBrk="0" hangingPunct="1">
+              <a:lnSpc>
+                <a:spcPct val="90000"/>
+              </a:lnSpc>
+              <a:spcBef>
+                <a:spcPts val="375"/>
+              </a:spcBef>
+              <a:buFont typeface="Arial" panose="020B0604020202020204" pitchFamily="34" charset="0"/>
+              <a:buChar char="•"/>
+              <a:defRPr sz="1800" kern="1200">
+                <a:solidFill>
+                  <a:schemeClr val="tx1"/>
+                </a:solidFill>
+                <a:latin typeface="+mn-lt"/>
+                <a:ea typeface="+mn-ea"/>
+                <a:cs typeface="+mn-cs"/>
+              </a:defRPr>
+            </a:lvl2pPr>
+            <a:lvl3pPr marL="857250" indent="-171450" algn="l" defTabSz="685800" rtl="0" eaLnBrk="1" latinLnBrk="0" hangingPunct="1">
+              <a:lnSpc>
+                <a:spcPct val="90000"/>
+              </a:lnSpc>
+              <a:spcBef>
+                <a:spcPts val="375"/>
+              </a:spcBef>
+              <a:buFont typeface="Arial" panose="020B0604020202020204" pitchFamily="34" charset="0"/>
+              <a:buChar char="•"/>
+              <a:defRPr sz="1500" kern="1200">
+                <a:solidFill>
+                  <a:schemeClr val="tx1"/>
+                </a:solidFill>
+                <a:latin typeface="+mn-lt"/>
+                <a:ea typeface="+mn-ea"/>
+                <a:cs typeface="+mn-cs"/>
+              </a:defRPr>
+            </a:lvl3pPr>
+            <a:lvl4pPr marL="1200150" indent="-171450" algn="l" defTabSz="685800" rtl="0" eaLnBrk="1" latinLnBrk="0" hangingPunct="1">
+              <a:lnSpc>
+                <a:spcPct val="90000"/>
+              </a:lnSpc>
+              <a:spcBef>
+                <a:spcPts val="375"/>
+              </a:spcBef>
+              <a:buFont typeface="Arial" panose="020B0604020202020204" pitchFamily="34" charset="0"/>
+              <a:buChar char="•"/>
+              <a:defRPr sz="1350" kern="1200">
+                <a:solidFill>
+                  <a:schemeClr val="tx1"/>
+                </a:solidFill>
+                <a:latin typeface="+mn-lt"/>
+                <a:ea typeface="+mn-ea"/>
+                <a:cs typeface="+mn-cs"/>
+              </a:defRPr>
+            </a:lvl4pPr>
+            <a:lvl5pPr marL="1543050" indent="-171450" algn="l" defTabSz="685800" rtl="0" eaLnBrk="1" latinLnBrk="0" hangingPunct="1">
+              <a:lnSpc>
+                <a:spcPct val="90000"/>
+              </a:lnSpc>
+              <a:spcBef>
+                <a:spcPts val="375"/>
+              </a:spcBef>
+              <a:buFont typeface="Arial" panose="020B0604020202020204" pitchFamily="34" charset="0"/>
+              <a:buChar char="•"/>
+              <a:defRPr sz="1350" kern="1200">
+                <a:solidFill>
+                  <a:schemeClr val="tx1"/>
+                </a:solidFill>
+                <a:latin typeface="+mn-lt"/>
+                <a:ea typeface="+mn-ea"/>
+                <a:cs typeface="+mn-cs"/>
+              </a:defRPr>
+            </a:lvl5pPr>
+            <a:lvl6pPr marL="1885950" indent="-171450" algn="l" defTabSz="685800" rtl="0" eaLnBrk="1" latinLnBrk="0" hangingPunct="1">
+              <a:lnSpc>
+                <a:spcPct val="90000"/>
+              </a:lnSpc>
+              <a:spcBef>
+                <a:spcPts val="375"/>
+              </a:spcBef>
+              <a:buFont typeface="Arial" panose="020B0604020202020204" pitchFamily="34" charset="0"/>
+              <a:buChar char="•"/>
+              <a:defRPr sz="1350" kern="1200">
+                <a:solidFill>
+                  <a:schemeClr val="tx1"/>
+                </a:solidFill>
+                <a:latin typeface="+mn-lt"/>
+                <a:ea typeface="+mn-ea"/>
+                <a:cs typeface="+mn-cs"/>
+              </a:defRPr>
+            </a:lvl6pPr>
+            <a:lvl7pPr marL="2228850" indent="-171450" algn="l" defTabSz="685800" rtl="0" eaLnBrk="1" latinLnBrk="0" hangingPunct="1">
+              <a:lnSpc>
+                <a:spcPct val="90000"/>
+              </a:lnSpc>
+              <a:spcBef>
+                <a:spcPts val="375"/>
+              </a:spcBef>
+              <a:buFont typeface="Arial" panose="020B0604020202020204" pitchFamily="34" charset="0"/>
+              <a:buChar char="•"/>
+              <a:defRPr sz="1350" kern="1200">
+                <a:solidFill>
+                  <a:schemeClr val="tx1"/>
+                </a:solidFill>
+                <a:latin typeface="+mn-lt"/>
+                <a:ea typeface="+mn-ea"/>
+                <a:cs typeface="+mn-cs"/>
+              </a:defRPr>
+            </a:lvl7pPr>
+            <a:lvl8pPr marL="2571750" indent="-171450" algn="l" defTabSz="685800" rtl="0" eaLnBrk="1" latinLnBrk="0" hangingPunct="1">
+              <a:lnSpc>
+                <a:spcPct val="90000"/>
+              </a:lnSpc>
+              <a:spcBef>
+                <a:spcPts val="375"/>
+              </a:spcBef>
+              <a:buFont typeface="Arial" panose="020B0604020202020204" pitchFamily="34" charset="0"/>
+              <a:buChar char="•"/>
+              <a:defRPr sz="1350" kern="1200">
+                <a:solidFill>
+                  <a:schemeClr val="tx1"/>
+                </a:solidFill>
+                <a:latin typeface="+mn-lt"/>
+                <a:ea typeface="+mn-ea"/>
+                <a:cs typeface="+mn-cs"/>
+              </a:defRPr>
+            </a:lvl8pPr>
+            <a:lvl9pPr marL="2914650" indent="-171450" algn="l" defTabSz="685800" rtl="0" eaLnBrk="1" latinLnBrk="0" hangingPunct="1">
+              <a:lnSpc>
+                <a:spcPct val="90000"/>
+              </a:lnSpc>
+              <a:spcBef>
+                <a:spcPts val="375"/>
+              </a:spcBef>
+              <a:buFont typeface="Arial" panose="020B0604020202020204" pitchFamily="34" charset="0"/>
+              <a:buChar char="•"/>
+              <a:defRPr sz="1350" kern="1200">
+                <a:solidFill>
+                  <a:schemeClr val="tx1"/>
+                </a:solidFill>
+                <a:latin typeface="+mn-lt"/>
+                <a:ea typeface="+mn-ea"/>
+                <a:cs typeface="+mn-cs"/>
+              </a:defRPr>
+            </a:lvl9pPr>
+          </a:lstStyle>
+          <a:p>
+            <a:r>
+              <a:rPr lang="en-CA" dirty="0"/>
+              <a:t>APK on Google Drive</a:t>
+            </a:r>
+          </a:p>
+          <a:p>
+            <a:r>
+              <a:rPr lang="en-CA" dirty="0"/>
+              <a:t>GitHub repo shared</a:t>
+            </a:r>
+          </a:p>
+          <a:p>
+            <a:r>
+              <a:rPr lang="en-CA" dirty="0"/>
+              <a:t>Option for partner to export to iOS in future</a:t>
+            </a:r>
+          </a:p>
+        </p:txBody>
+      </p:sp>
     </p:spTree>
     <p:extLst>
       <p:ext uri="{BB962C8B-B14F-4D97-AF65-F5344CB8AC3E}">
@@ -6995,6 +9662,9 @@
   <p:clrMapOvr>
     <a:masterClrMapping/>
   </p:clrMapOvr>
+  <p:transition spd="slow">
+    <p:push/>
+  </p:transition>
 </p:sld>
 </file>
 
@@ -7055,7 +9725,7 @@
           <p:nvPr/>
         </p:nvPicPr>
         <p:blipFill>
-          <a:blip r:embed="rId2">
+          <a:blip r:embed="rId3">
             <a:alphaModFix amt="20000"/>
             <a:extLst>
               <a:ext uri="{28A0092B-C50C-407E-A947-70E740481C1C}">
@@ -7135,28 +9805,108 @@
           <a:p>
             <a:r>
               <a:rPr lang="en-CA" dirty="0"/>
-              <a:t>Classroom Teacher/Student limitations</a:t>
-            </a:r>
-          </a:p>
-          <a:p>
-            <a:pPr lvl="1"/>
-            <a:r>
-              <a:rPr lang="en-CA" dirty="0"/>
-              <a:t>Any student can be a teacher as well</a:t>
-            </a:r>
-          </a:p>
-        </p:txBody>
-      </p:sp>
+              <a:t>Google authentication</a:t>
+            </a:r>
+          </a:p>
+        </p:txBody>
+      </p:sp>
+      <p:pic>
+        <p:nvPicPr>
+          <p:cNvPr id="8" name="Picture 7" descr="A picture containing sign, drawing, light&#10;&#10;Description automatically generated">
+            <a:extLst>
+              <a:ext uri="{FF2B5EF4-FFF2-40B4-BE49-F238E27FC236}">
+                <a16:creationId xmlns:a16="http://schemas.microsoft.com/office/drawing/2014/main" id="{9E289591-A333-4689-8F9E-7DD1226F7FF8}"/>
+              </a:ext>
+            </a:extLst>
+          </p:cNvPr>
+          <p:cNvPicPr>
+            <a:picLocks noChangeAspect="1"/>
+          </p:cNvPicPr>
+          <p:nvPr/>
+        </p:nvPicPr>
+        <p:blipFill>
+          <a:blip r:embed="rId4">
+            <a:extLst>
+              <a:ext uri="{28A0092B-C50C-407E-A947-70E740481C1C}">
+                <a14:useLocalDpi xmlns:a14="http://schemas.microsoft.com/office/drawing/2010/main" val="0"/>
+              </a:ext>
+            </a:extLst>
+          </a:blip>
+          <a:stretch>
+            <a:fillRect/>
+          </a:stretch>
+        </p:blipFill>
+        <p:spPr>
+          <a:xfrm>
+            <a:off x="417068" y="3952416"/>
+            <a:ext cx="5177409" cy="1726107"/>
+          </a:xfrm>
+          <a:prstGeom prst="rect">
+            <a:avLst/>
+          </a:prstGeom>
+        </p:spPr>
+      </p:pic>
+      <p:pic>
+        <p:nvPicPr>
+          <p:cNvPr id="10" name="Graphic 9" descr="Employee badge">
+            <a:extLst>
+              <a:ext uri="{FF2B5EF4-FFF2-40B4-BE49-F238E27FC236}">
+                <a16:creationId xmlns:a16="http://schemas.microsoft.com/office/drawing/2014/main" id="{DC96CC61-0B47-4715-B5E2-6843D9F55E3F}"/>
+              </a:ext>
+            </a:extLst>
+          </p:cNvPr>
+          <p:cNvPicPr>
+            <a:picLocks noChangeAspect="1"/>
+          </p:cNvPicPr>
+          <p:nvPr/>
+        </p:nvPicPr>
+        <p:blipFill>
+          <a:blip r:embed="rId5">
+            <a:extLst>
+              <a:ext uri="{28A0092B-C50C-407E-A947-70E740481C1C}">
+                <a14:useLocalDpi xmlns:a14="http://schemas.microsoft.com/office/drawing/2010/main" val="0"/>
+              </a:ext>
+              <a:ext uri="{96DAC541-7B7A-43D3-8B79-37D633B846F1}">
+                <asvg:svgBlip xmlns:asvg="http://schemas.microsoft.com/office/drawing/2016/SVG/main" r:embed="rId6"/>
+              </a:ext>
+            </a:extLst>
+          </a:blip>
+          <a:stretch>
+            <a:fillRect/>
+          </a:stretch>
+        </p:blipFill>
+        <p:spPr>
+          <a:xfrm>
+            <a:off x="6382512" y="3546593"/>
+            <a:ext cx="2264518" cy="2264518"/>
+          </a:xfrm>
+          <a:prstGeom prst="rect">
+            <a:avLst/>
+          </a:prstGeom>
+        </p:spPr>
+      </p:pic>
     </p:spTree>
     <p:extLst>
       <p:ext uri="{BB962C8B-B14F-4D97-AF65-F5344CB8AC3E}">
-        <p14:creationId xmlns:p14="http://schemas.microsoft.com/office/powerpoint/2010/main" val="639185799"/>
+        <p14:creationId xmlns:p14="http://schemas.microsoft.com/office/powerpoint/2010/main" val="1993336364"/>
       </p:ext>
     </p:extLst>
   </p:cSld>
   <p:clrMapOvr>
     <a:masterClrMapping/>
   </p:clrMapOvr>
+  <mc:AlternateContent xmlns:mc="http://schemas.openxmlformats.org/markup-compatibility/2006">
+    <mc:Choice xmlns:p14="http://schemas.microsoft.com/office/powerpoint/2010/main" Requires="p14">
+      <p:transition spd="slow" p14:dur="1400">
+        <p14:doors dir="vert"/>
+      </p:transition>
+    </mc:Choice>
+    <mc:Fallback>
+      <p:transition spd="slow">
+        <p:fade/>
+      </p:transition>
+    </mc:Fallback>
+  </mc:AlternateContent>
 </p:sld>
 </file>
 
@@ -7217,7 +9967,7 @@
           <p:nvPr/>
         </p:nvPicPr>
         <p:blipFill>
-          <a:blip r:embed="rId2">
+          <a:blip r:embed="rId3">
             <a:alphaModFix amt="20000"/>
             <a:extLst>
               <a:ext uri="{28A0092B-C50C-407E-A947-70E740481C1C}">
@@ -7292,13 +10042,106 @@
           </a:xfrm>
         </p:spPr>
         <p:txBody>
-          <a:bodyPr/>
+          <a:bodyPr vert="horz" lIns="91440" tIns="45720" rIns="91440" bIns="45720" rtlCol="0" anchor="t">
+            <a:normAutofit/>
+          </a:bodyPr>
           <a:lstStyle/>
           <a:p>
-            <a:endParaRPr lang="en-CA" dirty="0"/>
-          </a:p>
-        </p:txBody>
-      </p:sp>
+            <a:r>
+              <a:rPr lang="en-CA" dirty="0"/>
+              <a:t>Flutter is a new framework only created recently</a:t>
+            </a:r>
+          </a:p>
+          <a:p>
+            <a:r>
+              <a:rPr lang="en-CA" dirty="0"/>
+              <a:t>Documentation and online support is limited</a:t>
+            </a:r>
+          </a:p>
+          <a:p>
+            <a:endParaRPr lang="en-CA"/>
+          </a:p>
+          <a:p>
+            <a:endParaRPr lang="en-CA"/>
+          </a:p>
+          <a:p>
+            <a:endParaRPr lang="en-CA"/>
+          </a:p>
+          <a:p>
+            <a:endParaRPr lang="en-CA"/>
+          </a:p>
+          <a:p>
+            <a:r>
+              <a:rPr lang="en-CA" dirty="0"/>
+              <a:t>Futures</a:t>
+            </a:r>
+            <a:endParaRPr lang="en-CA"/>
+          </a:p>
+          <a:p>
+            <a:pPr lvl="1"/>
+            <a:r>
+              <a:rPr lang="en-CA">
+                <a:cs typeface="Calibri"/>
+              </a:rPr>
+              <a:t>Type wrapping data to be available in the future</a:t>
+            </a:r>
+          </a:p>
+          <a:p>
+            <a:pPr lvl="1"/>
+            <a:r>
+              <a:rPr lang="en-CA">
+                <a:cs typeface="Calibri"/>
+              </a:rPr>
+              <a:t>Uncertain when it will be available</a:t>
+            </a:r>
+          </a:p>
+          <a:p>
+            <a:pPr lvl="1"/>
+            <a:r>
+              <a:rPr lang="en-CA">
+                <a:cs typeface="Calibri"/>
+              </a:rPr>
+              <a:t>Allows to sync backend with the frontend UI</a:t>
+            </a:r>
+          </a:p>
+        </p:txBody>
+      </p:sp>
+      <p:pic>
+        <p:nvPicPr>
+          <p:cNvPr id="6" name="Picture 5" descr="A close up of a sign&#10;&#10;Description automatically generated">
+            <a:extLst>
+              <a:ext uri="{FF2B5EF4-FFF2-40B4-BE49-F238E27FC236}">
+                <a16:creationId xmlns:a16="http://schemas.microsoft.com/office/drawing/2014/main" id="{D57B64B1-99B7-4866-836E-438888DE5BB5}"/>
+              </a:ext>
+            </a:extLst>
+          </p:cNvPr>
+          <p:cNvPicPr>
+            <a:picLocks noChangeAspect="1"/>
+          </p:cNvPicPr>
+          <p:nvPr/>
+        </p:nvPicPr>
+        <p:blipFill>
+          <a:blip r:embed="rId4">
+            <a:extLst>
+              <a:ext uri="{28A0092B-C50C-407E-A947-70E740481C1C}">
+                <a14:useLocalDpi xmlns:a14="http://schemas.microsoft.com/office/drawing/2010/main" val="0"/>
+              </a:ext>
+            </a:extLst>
+          </a:blip>
+          <a:stretch>
+            <a:fillRect/>
+          </a:stretch>
+        </p:blipFill>
+        <p:spPr>
+          <a:xfrm>
+            <a:off x="3607308" y="2665476"/>
+            <a:ext cx="1527048" cy="1527048"/>
+          </a:xfrm>
+          <a:prstGeom prst="rect">
+            <a:avLst/>
+          </a:prstGeom>
+        </p:spPr>
+      </p:pic>
     </p:spTree>
     <p:extLst>
       <p:ext uri="{BB962C8B-B14F-4D97-AF65-F5344CB8AC3E}">
@@ -7309,6 +10152,9 @@
   <p:clrMapOvr>
     <a:masterClrMapping/>
   </p:clrMapOvr>
+  <p:transition spd="med">
+    <p:pull/>
+  </p:transition>
 </p:sld>
 </file>
 
@@ -7369,7 +10215,7 @@
           <p:nvPr/>
         </p:nvPicPr>
         <p:blipFill>
-          <a:blip r:embed="rId2">
+          <a:blip r:embed="rId3">
             <a:alphaModFix amt="20000"/>
             <a:extLst>
               <a:ext uri="{28A0092B-C50C-407E-A947-70E740481C1C}">
@@ -7413,11 +10259,14 @@
           <a:lstStyle/>
           <a:p>
             <a:r>
-              <a:rPr lang="en-CA" dirty="0">
-                <a:latin typeface="Britannic Bold" panose="020B0903060703020204" pitchFamily="34" charset="0"/>
+              <a:rPr lang="en-CA">
+                <a:latin typeface="Britannic Bold"/>
               </a:rPr>
-              <a:t>Technical Item 3</a:t>
-            </a:r>
+              <a:t>Technical Item 3 – Internal APIs</a:t>
+            </a:r>
+            <a:endParaRPr lang="en-CA" dirty="0">
+              <a:latin typeface="Britannic Bold" panose="020B0903060703020204" pitchFamily="34" charset="0"/>
+            </a:endParaRPr>
           </a:p>
         </p:txBody>
       </p:sp>
@@ -7444,23 +10293,109 @@
           </a:xfrm>
         </p:spPr>
         <p:txBody>
-          <a:bodyPr/>
+          <a:bodyPr vert="horz" lIns="91440" tIns="45720" rIns="91440" bIns="45720" rtlCol="0" anchor="t">
+            <a:normAutofit/>
+          </a:bodyPr>
           <a:lstStyle/>
           <a:p>
-            <a:endParaRPr lang="en-CA" dirty="0"/>
+            <a:r>
+              <a:rPr lang="en-CA"/>
+              <a:t>Creating internal APIs to connect Google Classroom and Cloud </a:t>
+            </a:r>
+            <a:r>
+              <a:rPr lang="en-CA" err="1"/>
+              <a:t>Firestore</a:t>
+            </a:r>
+            <a:r>
+              <a:rPr lang="en-CA"/>
+              <a:t> to our application</a:t>
+            </a:r>
+          </a:p>
+          <a:p>
+            <a:endParaRPr lang="en-CA">
+              <a:cs typeface="Calibri"/>
+            </a:endParaRPr>
+          </a:p>
+          <a:p>
+            <a:r>
+              <a:rPr lang="en-CA">
+                <a:cs typeface="Calibri"/>
+              </a:rPr>
+              <a:t>Written in Dart</a:t>
+            </a:r>
+          </a:p>
+          <a:p>
+            <a:endParaRPr lang="en-CA">
+              <a:cs typeface="Calibri"/>
+            </a:endParaRPr>
+          </a:p>
+          <a:p>
+            <a:r>
+              <a:rPr lang="en-CA">
+                <a:cs typeface="Calibri"/>
+              </a:rPr>
+              <a:t>ClassroomApiAccess – Wrapper for the Google Classroom API, allows us to pull information from Classroom</a:t>
+            </a:r>
+          </a:p>
+          <a:p>
+            <a:endParaRPr lang="en-CA">
+              <a:cs typeface="Calibri"/>
+            </a:endParaRPr>
+          </a:p>
+          <a:p>
+            <a:r>
+              <a:rPr lang="en-CA">
+                <a:cs typeface="Calibri"/>
+              </a:rPr>
+              <a:t>FirestoreManager – DAO that communicates with out database</a:t>
+            </a:r>
+          </a:p>
+          <a:p>
+            <a:endParaRPr lang="en-CA">
+              <a:cs typeface="Calibri"/>
+            </a:endParaRPr>
+          </a:p>
+          <a:p>
+            <a:r>
+              <a:rPr lang="en-CA">
+                <a:cs typeface="Calibri"/>
+              </a:rPr>
+              <a:t>Chose Firebase (NoSQL)</a:t>
+            </a:r>
+          </a:p>
+          <a:p>
+            <a:endParaRPr lang="en-CA">
+              <a:cs typeface="Calibri"/>
+            </a:endParaRPr>
+          </a:p>
+          <a:p>
+            <a:endParaRPr lang="en-CA">
+              <a:cs typeface="Calibri"/>
+            </a:endParaRPr>
+          </a:p>
+          <a:p>
+            <a:pPr marL="0" indent="0">
+              <a:buNone/>
+            </a:pPr>
+            <a:endParaRPr lang="en-CA">
+              <a:cs typeface="Calibri"/>
+            </a:endParaRPr>
           </a:p>
         </p:txBody>
       </p:sp>
     </p:spTree>
     <p:extLst>
       <p:ext uri="{BB962C8B-B14F-4D97-AF65-F5344CB8AC3E}">
-        <p14:creationId xmlns:p14="http://schemas.microsoft.com/office/powerpoint/2010/main" val="1993336364"/>
+        <p14:creationId xmlns:p14="http://schemas.microsoft.com/office/powerpoint/2010/main" val="639185799"/>
       </p:ext>
     </p:extLst>
   </p:cSld>
   <p:clrMapOvr>
     <a:masterClrMapping/>
   </p:clrMapOvr>
+  <p:transition spd="slow">
+    <p:comb/>
+  </p:transition>
 </p:sld>
 </file>
 
@@ -7469,26 +10404,12 @@
   <p:cSld>
     <p:bg>
       <p:bgPr>
-        <a:gradFill>
-          <a:gsLst>
-            <a:gs pos="0">
-              <a:schemeClr val="accent1">
-                <a:lumMod val="5000"/>
-                <a:lumOff val="95000"/>
-              </a:schemeClr>
-            </a:gs>
-            <a:gs pos="74000">
-              <a:srgbClr val="92D050"/>
-            </a:gs>
-            <a:gs pos="83000">
-              <a:srgbClr val="92D050"/>
-            </a:gs>
-            <a:gs pos="100000">
-              <a:srgbClr val="82C836"/>
-            </a:gs>
-          </a:gsLst>
-          <a:lin ang="5400000" scaled="1"/>
-        </a:gradFill>
+        <a:solidFill>
+          <a:schemeClr val="bg1">
+            <a:tint val="95000"/>
+            <a:satMod val="170000"/>
+          </a:schemeClr>
+        </a:solidFill>
         <a:effectLst/>
       </p:bgPr>
     </p:bg>
@@ -7506,12 +10427,277 @@
           <a:chExt cx="0" cy="0"/>
         </a:xfrm>
       </p:grpSpPr>
+      <p:sp>
+        <p:nvSpPr>
+          <p:cNvPr id="2" name="Title 1">
+            <a:extLst>
+              <a:ext uri="{FF2B5EF4-FFF2-40B4-BE49-F238E27FC236}">
+                <a16:creationId xmlns:a16="http://schemas.microsoft.com/office/drawing/2014/main" id="{BFA378F2-7B95-4CF9-B3E3-BFBFD7218AC4}"/>
+              </a:ext>
+            </a:extLst>
+          </p:cNvPr>
+          <p:cNvSpPr>
+            <a:spLocks noGrp="1"/>
+          </p:cNvSpPr>
+          <p:nvPr>
+            <p:ph type="title"/>
+          </p:nvPr>
+        </p:nvSpPr>
+        <p:spPr>
+          <a:xfrm>
+            <a:off x="603504" y="723578"/>
+            <a:ext cx="2540329" cy="1645501"/>
+          </a:xfrm>
+        </p:spPr>
+        <p:txBody>
+          <a:bodyPr>
+            <a:normAutofit/>
+          </a:bodyPr>
+          <a:lstStyle/>
+          <a:p>
+            <a:r>
+              <a:rPr lang="en-CA" dirty="0">
+                <a:latin typeface="Britannic Bold" panose="020B0903060703020204" pitchFamily="34" charset="0"/>
+              </a:rPr>
+              <a:t>Team Workflow</a:t>
+            </a:r>
+          </a:p>
+        </p:txBody>
+      </p:sp>
+      <p:sp>
+        <p:nvSpPr>
+          <p:cNvPr id="5" name="Content Placeholder 4">
+            <a:extLst>
+              <a:ext uri="{FF2B5EF4-FFF2-40B4-BE49-F238E27FC236}">
+                <a16:creationId xmlns:a16="http://schemas.microsoft.com/office/drawing/2014/main" id="{ACA5D209-A4E9-4FAE-BC74-26F4F18ADEA3}"/>
+              </a:ext>
+            </a:extLst>
+          </p:cNvPr>
+          <p:cNvSpPr>
+            <a:spLocks noGrp="1"/>
+          </p:cNvSpPr>
+          <p:nvPr>
+            <p:ph idx="1"/>
+          </p:nvPr>
+        </p:nvSpPr>
+        <p:spPr>
+          <a:xfrm>
+            <a:off x="603504" y="2548467"/>
+            <a:ext cx="2540328" cy="3628495"/>
+          </a:xfrm>
+        </p:spPr>
+        <p:txBody>
+          <a:bodyPr>
+            <a:normAutofit/>
+          </a:bodyPr>
+          <a:lstStyle/>
+          <a:p>
+            <a:r>
+              <a:rPr lang="en-CA" sz="1600"/>
+              <a:t>Personal communication: Discord</a:t>
+            </a:r>
+          </a:p>
+          <a:p>
+            <a:r>
+              <a:rPr lang="en-CA" sz="1600"/>
+              <a:t>Organization and task distribution: Trello</a:t>
+            </a:r>
+          </a:p>
+        </p:txBody>
+      </p:sp>
+      <p:sp>
+        <p:nvSpPr>
+          <p:cNvPr id="19" name="Rectangle 18">
+            <a:extLst>
+              <a:ext uri="{FF2B5EF4-FFF2-40B4-BE49-F238E27FC236}">
+                <a16:creationId xmlns:a16="http://schemas.microsoft.com/office/drawing/2014/main" id="{EBB6D9F6-3E47-45AD-8461-718A3C87E3E8}"/>
+              </a:ext>
+              <a:ext uri="{C183D7F6-B498-43B3-948B-1728B52AA6E4}">
+                <adec:decorative xmlns:adec="http://schemas.microsoft.com/office/drawing/2017/decorative" val="1"/>
+              </a:ext>
+            </a:extLst>
+          </p:cNvPr>
+          <p:cNvSpPr>
+            <a:spLocks noGrp="1" noRot="1" noChangeAspect="1" noMove="1" noResize="1" noEditPoints="1" noAdjustHandles="1" noChangeArrowheads="1" noChangeShapeType="1" noTextEdit="1"/>
+          </p:cNvSpPr>
+          <p:nvPr>
+            <p:extLst>
+              <p:ext uri="{386F3935-93C4-4BCD-93E2-E3B085C9AB24}">
+                <p16:designElem xmlns:p16="http://schemas.microsoft.com/office/powerpoint/2015/main" val="1"/>
+              </p:ext>
+            </p:extLst>
+          </p:nvPr>
+        </p:nvSpPr>
+        <p:spPr>
+          <a:xfrm>
+            <a:off x="3403806" y="0"/>
+            <a:ext cx="5740194" cy="6858000"/>
+          </a:xfrm>
+          <a:prstGeom prst="rect">
+            <a:avLst/>
+          </a:prstGeom>
+          <a:solidFill>
+            <a:srgbClr val="FFFFFF">
+              <a:alpha val="80000"/>
+            </a:srgbClr>
+          </a:solidFill>
+          <a:ln>
+            <a:noFill/>
+          </a:ln>
+        </p:spPr>
+        <p:style>
+          <a:lnRef idx="2">
+            <a:schemeClr val="accent1">
+              <a:shade val="50000"/>
+            </a:schemeClr>
+          </a:lnRef>
+          <a:fillRef idx="1">
+            <a:schemeClr val="accent1"/>
+          </a:fillRef>
+          <a:effectRef idx="0">
+            <a:schemeClr val="accent1"/>
+          </a:effectRef>
+          <a:fontRef idx="minor">
+            <a:schemeClr val="lt1"/>
+          </a:fontRef>
+        </p:style>
+        <p:txBody>
+          <a:bodyPr rtlCol="0" anchor="ctr"/>
+          <a:lstStyle/>
+          <a:p>
+            <a:pPr marL="0" marR="0" lvl="0" indent="0" algn="ctr" defTabSz="914400" rtl="0" eaLnBrk="1" fontAlgn="auto" latinLnBrk="0" hangingPunct="1">
+              <a:lnSpc>
+                <a:spcPct val="100000"/>
+              </a:lnSpc>
+              <a:spcBef>
+                <a:spcPts val="0"/>
+              </a:spcBef>
+              <a:spcAft>
+                <a:spcPts val="0"/>
+              </a:spcAft>
+              <a:buClrTx/>
+              <a:buSzTx/>
+              <a:buFontTx/>
+              <a:buNone/>
+              <a:tabLst/>
+              <a:defRPr/>
+            </a:pPr>
+            <a:endParaRPr kumimoji="0" lang="en-US" sz="1800" b="0" i="0" u="none" strike="noStrike" kern="1200" cap="none" spc="0" normalizeH="0" baseline="0" noProof="0" dirty="0">
+              <a:ln>
+                <a:noFill/>
+              </a:ln>
+              <a:solidFill>
+                <a:prstClr val="white"/>
+              </a:solidFill>
+              <a:effectLst/>
+              <a:uLnTx/>
+              <a:uFillTx/>
+              <a:latin typeface="Calibri" panose="020F0502020204030204"/>
+              <a:ea typeface="+mn-ea"/>
+              <a:cs typeface="+mn-cs"/>
+            </a:endParaRPr>
+          </a:p>
+        </p:txBody>
+      </p:sp>
+      <p:sp>
+        <p:nvSpPr>
+          <p:cNvPr id="21" name="Rectangle 20">
+            <a:extLst>
+              <a:ext uri="{FF2B5EF4-FFF2-40B4-BE49-F238E27FC236}">
+                <a16:creationId xmlns:a16="http://schemas.microsoft.com/office/drawing/2014/main" id="{A3B16A00-A549-4B07-B8C2-4B3A966D9E26}"/>
+              </a:ext>
+              <a:ext uri="{C183D7F6-B498-43B3-948B-1728B52AA6E4}">
+                <adec:decorative xmlns:adec="http://schemas.microsoft.com/office/drawing/2017/decorative" val="1"/>
+              </a:ext>
+            </a:extLst>
+          </p:cNvPr>
+          <p:cNvSpPr>
+            <a:spLocks noGrp="1" noRot="1" noChangeAspect="1" noMove="1" noResize="1" noEditPoints="1" noAdjustHandles="1" noChangeArrowheads="1" noChangeShapeType="1" noTextEdit="1"/>
+          </p:cNvSpPr>
+          <p:nvPr>
+            <p:extLst>
+              <p:ext uri="{386F3935-93C4-4BCD-93E2-E3B085C9AB24}">
+                <p16:designElem xmlns:p16="http://schemas.microsoft.com/office/powerpoint/2015/main" val="1"/>
+              </p:ext>
+            </p:extLst>
+          </p:nvPr>
+        </p:nvSpPr>
+        <p:spPr>
+          <a:xfrm>
+            <a:off x="3645105" y="321732"/>
+            <a:ext cx="3083291" cy="3674848"/>
+          </a:xfrm>
+          <a:prstGeom prst="rect">
+            <a:avLst/>
+          </a:prstGeom>
+          <a:solidFill>
+            <a:srgbClr val="FFFFFF"/>
+          </a:solidFill>
+          <a:ln w="15875" cap="sq">
+            <a:noFill/>
+            <a:miter lim="800000"/>
+          </a:ln>
+        </p:spPr>
+        <p:style>
+          <a:lnRef idx="2">
+            <a:schemeClr val="accent1">
+              <a:shade val="50000"/>
+            </a:schemeClr>
+          </a:lnRef>
+          <a:fillRef idx="1">
+            <a:schemeClr val="accent1"/>
+          </a:fillRef>
+          <a:effectRef idx="0">
+            <a:schemeClr val="accent1"/>
+          </a:effectRef>
+          <a:fontRef idx="minor">
+            <a:schemeClr val="lt1"/>
+          </a:fontRef>
+        </p:style>
+        <p:txBody>
+          <a:bodyPr rtlCol="0" anchor="ctr"/>
+          <a:lstStyle/>
+          <a:p>
+            <a:pPr marL="0" marR="0" lvl="0" indent="0" algn="ctr" defTabSz="914400" rtl="0" eaLnBrk="1" fontAlgn="auto" latinLnBrk="0" hangingPunct="1">
+              <a:lnSpc>
+                <a:spcPct val="100000"/>
+              </a:lnSpc>
+              <a:spcBef>
+                <a:spcPts val="0"/>
+              </a:spcBef>
+              <a:spcAft>
+                <a:spcPts val="0"/>
+              </a:spcAft>
+              <a:buClrTx/>
+              <a:buSzTx/>
+              <a:buFontTx/>
+              <a:buNone/>
+              <a:tabLst/>
+              <a:defRPr/>
+            </a:pPr>
+            <a:endParaRPr kumimoji="0" lang="en-US" sz="1800" b="0" i="0" u="none" strike="noStrike" kern="1200" cap="none" spc="0" normalizeH="0" baseline="0" noProof="0">
+              <a:ln>
+                <a:noFill/>
+              </a:ln>
+              <a:solidFill>
+                <a:prstClr val="white"/>
+              </a:solidFill>
+              <a:effectLst/>
+              <a:uLnTx/>
+              <a:uFillTx/>
+              <a:latin typeface="Calibri" panose="020F0502020204030204"/>
+              <a:ea typeface="+mn-ea"/>
+              <a:cs typeface="+mn-cs"/>
+            </a:endParaRPr>
+          </a:p>
+        </p:txBody>
+      </p:sp>
       <p:pic>
         <p:nvPicPr>
-          <p:cNvPr id="4" name="Picture 3" descr="A close up of a logo&#10;&#10;Description automatically generated">
-            <a:extLst>
-              <a:ext uri="{FF2B5EF4-FFF2-40B4-BE49-F238E27FC236}">
-                <a16:creationId xmlns:a16="http://schemas.microsoft.com/office/drawing/2014/main" id="{A101321E-B77C-4089-B439-BC624610E501}"/>
+          <p:cNvPr id="14" name="Picture 13" descr="A close up of a logo&#10;&#10;Description automatically generated">
+            <a:extLst>
+              <a:ext uri="{FF2B5EF4-FFF2-40B4-BE49-F238E27FC236}">
+                <a16:creationId xmlns:a16="http://schemas.microsoft.com/office/drawing/2014/main" id="{D7F1F7EB-DC37-4CFE-A22A-A7862684BF49}"/>
               </a:ext>
             </a:extLst>
           </p:cNvPr>
@@ -7521,8 +10707,7 @@
           <p:nvPr/>
         </p:nvPicPr>
         <p:blipFill>
-          <a:blip r:embed="rId2">
-            <a:alphaModFix amt="20000"/>
+          <a:blip r:embed="rId3">
             <a:extLst>
               <a:ext uri="{28A0092B-C50C-407E-A947-70E740481C1C}">
                 <a14:useLocalDpi xmlns:a14="http://schemas.microsoft.com/office/drawing/2010/main" val="0"/>
@@ -7535,8 +10720,8 @@
         </p:blipFill>
         <p:spPr>
           <a:xfrm>
-            <a:off x="694490" y="-240225"/>
-            <a:ext cx="7886700" cy="7236047"/>
+            <a:off x="3757097" y="738962"/>
+            <a:ext cx="2831924" cy="2831924"/>
           </a:xfrm>
           <a:prstGeom prst="rect">
             <a:avLst/>
@@ -7545,76 +10730,94 @@
       </p:pic>
       <p:sp>
         <p:nvSpPr>
-          <p:cNvPr id="2" name="Title 1">
-            <a:extLst>
-              <a:ext uri="{FF2B5EF4-FFF2-40B4-BE49-F238E27FC236}">
-                <a16:creationId xmlns:a16="http://schemas.microsoft.com/office/drawing/2014/main" id="{BFA378F2-7B95-4CF9-B3E3-BFBFD7218AC4}"/>
-              </a:ext>
-            </a:extLst>
-          </p:cNvPr>
-          <p:cNvSpPr>
-            <a:spLocks noGrp="1"/>
-          </p:cNvSpPr>
-          <p:nvPr>
-            <p:ph type="title"/>
-          </p:nvPr>
-        </p:nvSpPr>
-        <p:spPr/>
-        <p:txBody>
-          <a:bodyPr/>
-          <a:lstStyle/>
-          <a:p>
-            <a:r>
-              <a:rPr lang="en-CA" dirty="0">
-                <a:latin typeface="Britannic Bold" panose="020B0903060703020204" pitchFamily="34" charset="0"/>
-              </a:rPr>
-              <a:t>Team Workflow</a:t>
-            </a:r>
-          </a:p>
-        </p:txBody>
-      </p:sp>
-      <p:sp>
-        <p:nvSpPr>
-          <p:cNvPr id="5" name="Content Placeholder 4">
-            <a:extLst>
-              <a:ext uri="{FF2B5EF4-FFF2-40B4-BE49-F238E27FC236}">
-                <a16:creationId xmlns:a16="http://schemas.microsoft.com/office/drawing/2014/main" id="{ACA5D209-A4E9-4FAE-BC74-26F4F18ADEA3}"/>
-              </a:ext>
-            </a:extLst>
-          </p:cNvPr>
-          <p:cNvSpPr>
-            <a:spLocks noGrp="1"/>
-          </p:cNvSpPr>
-          <p:nvPr>
-            <p:ph idx="1"/>
+          <p:cNvPr id="23" name="Rectangle 22">
+            <a:extLst>
+              <a:ext uri="{FF2B5EF4-FFF2-40B4-BE49-F238E27FC236}">
+                <a16:creationId xmlns:a16="http://schemas.microsoft.com/office/drawing/2014/main" id="{33B86BAE-87B4-4192-ABB2-627FFC965AC7}"/>
+              </a:ext>
+              <a:ext uri="{C183D7F6-B498-43B3-948B-1728B52AA6E4}">
+                <adec:decorative xmlns:adec="http://schemas.microsoft.com/office/drawing/2017/decorative" val="1"/>
+              </a:ext>
+            </a:extLst>
+          </p:cNvPr>
+          <p:cNvSpPr>
+            <a:spLocks noGrp="1" noRot="1" noChangeAspect="1" noMove="1" noResize="1" noEditPoints="1" noAdjustHandles="1" noChangeArrowheads="1" noChangeShapeType="1" noTextEdit="1"/>
+          </p:cNvSpPr>
+          <p:nvPr>
+            <p:extLst>
+              <p:ext uri="{386F3935-93C4-4BCD-93E2-E3B085C9AB24}">
+                <p16:designElem xmlns:p16="http://schemas.microsoft.com/office/powerpoint/2015/main" val="1"/>
+              </p:ext>
+            </p:extLst>
           </p:nvPr>
         </p:nvSpPr>
         <p:spPr>
           <a:xfrm>
-            <a:off x="628650" y="1825625"/>
-            <a:ext cx="7886700" cy="4501558"/>
+            <a:off x="6838617" y="321732"/>
+            <a:ext cx="2074512" cy="3026832"/>
           </a:xfrm>
+          <a:prstGeom prst="rect">
+            <a:avLst/>
+          </a:prstGeom>
+          <a:solidFill>
+            <a:srgbClr val="FFFFFF"/>
+          </a:solidFill>
+          <a:ln w="15875" cap="sq">
+            <a:noFill/>
+            <a:miter lim="800000"/>
+          </a:ln>
         </p:spPr>
-        <p:txBody>
-          <a:bodyPr/>
+        <p:style>
+          <a:lnRef idx="2">
+            <a:schemeClr val="accent1">
+              <a:shade val="50000"/>
+            </a:schemeClr>
+          </a:lnRef>
+          <a:fillRef idx="1">
+            <a:schemeClr val="accent1"/>
+          </a:fillRef>
+          <a:effectRef idx="0">
+            <a:schemeClr val="accent1"/>
+          </a:effectRef>
+          <a:fontRef idx="minor">
+            <a:schemeClr val="lt1"/>
+          </a:fontRef>
+        </p:style>
+        <p:txBody>
+          <a:bodyPr rtlCol="0" anchor="ctr"/>
           <a:lstStyle/>
           <a:p>
-            <a:r>
-              <a:rPr lang="en-CA" dirty="0"/>
-              <a:t>Personal communication: Discord</a:t>
-            </a:r>
-          </a:p>
-          <a:p>
-            <a:r>
-              <a:rPr lang="en-CA" dirty="0"/>
-              <a:t>Organization and task distribution: Trello</a:t>
-            </a:r>
-          </a:p>
-          <a:p>
-            <a:r>
-              <a:rPr lang="en-CA" dirty="0"/>
-              <a:t>Pull requests through GitHub</a:t>
-            </a:r>
+            <a:pPr marL="0" marR="0" lvl="0" indent="0" algn="ctr" defTabSz="914400" rtl="0" eaLnBrk="1" fontAlgn="auto" latinLnBrk="0" hangingPunct="1">
+              <a:lnSpc>
+                <a:spcPct val="100000"/>
+              </a:lnSpc>
+              <a:spcBef>
+                <a:spcPts val="0"/>
+              </a:spcBef>
+              <a:spcAft>
+                <a:spcPts val="0"/>
+              </a:spcAft>
+              <a:buClrTx/>
+              <a:buSzTx/>
+              <a:buFontTx/>
+              <a:buNone/>
+              <a:tabLst/>
+              <a:defRPr/>
+            </a:pPr>
+            <a:endParaRPr kumimoji="0" lang="en-US" sz="1800" b="0" i="0" u="none" strike="noStrike" kern="1200" cap="none" spc="0" normalizeH="0" baseline="0" noProof="0">
+              <a:ln>
+                <a:noFill/>
+              </a:ln>
+              <a:solidFill>
+                <a:prstClr val="white"/>
+              </a:solidFill>
+              <a:effectLst/>
+              <a:uLnTx/>
+              <a:uFillTx/>
+              <a:latin typeface="Calibri" panose="020F0502020204030204"/>
+              <a:ea typeface="+mn-ea"/>
+              <a:cs typeface="+mn-cs"/>
+            </a:endParaRPr>
           </a:p>
         </p:txBody>
       </p:sp>
@@ -7633,13 +10836,13 @@
           <p:nvPr/>
         </p:nvPicPr>
         <p:blipFill>
-          <a:blip r:embed="rId3">
+          <a:blip r:embed="rId4">
             <a:extLst>
               <a:ext uri="{28A0092B-C50C-407E-A947-70E740481C1C}">
                 <a14:useLocalDpi xmlns:a14="http://schemas.microsoft.com/office/drawing/2010/main" val="0"/>
               </a:ext>
               <a:ext uri="{96DAC541-7B7A-43D3-8B79-37D633B846F1}">
-                <asvg:svgBlip xmlns:asvg="http://schemas.microsoft.com/office/drawing/2016/SVG/main" r:embed="rId4"/>
+                <asvg:svgBlip xmlns:asvg="http://schemas.microsoft.com/office/drawing/2016/SVG/main" r:embed="rId5"/>
               </a:ext>
             </a:extLst>
           </a:blip>
@@ -7649,8 +10852,233 @@
         </p:blipFill>
         <p:spPr>
           <a:xfrm>
-            <a:off x="1150749" y="4765097"/>
-            <a:ext cx="1790054" cy="1790054"/>
+            <a:off x="6959729" y="918594"/>
+            <a:ext cx="1828877" cy="1828877"/>
+          </a:xfrm>
+          <a:prstGeom prst="rect">
+            <a:avLst/>
+          </a:prstGeom>
+        </p:spPr>
+      </p:pic>
+      <p:sp>
+        <p:nvSpPr>
+          <p:cNvPr id="25" name="Rectangle 24">
+            <a:extLst>
+              <a:ext uri="{FF2B5EF4-FFF2-40B4-BE49-F238E27FC236}">
+                <a16:creationId xmlns:a16="http://schemas.microsoft.com/office/drawing/2014/main" id="{22BB4F03-4463-45CC-89A7-8E03412EDDBF}"/>
+              </a:ext>
+              <a:ext uri="{C183D7F6-B498-43B3-948B-1728B52AA6E4}">
+                <adec:decorative xmlns:adec="http://schemas.microsoft.com/office/drawing/2017/decorative" val="1"/>
+              </a:ext>
+            </a:extLst>
+          </p:cNvPr>
+          <p:cNvSpPr>
+            <a:spLocks noGrp="1" noRot="1" noChangeAspect="1" noMove="1" noResize="1" noEditPoints="1" noAdjustHandles="1" noChangeArrowheads="1" noChangeShapeType="1" noTextEdit="1"/>
+          </p:cNvSpPr>
+          <p:nvPr>
+            <p:extLst>
+              <p:ext uri="{386F3935-93C4-4BCD-93E2-E3B085C9AB24}">
+                <p16:designElem xmlns:p16="http://schemas.microsoft.com/office/powerpoint/2015/main" val="1"/>
+              </p:ext>
+            </p:extLst>
+          </p:nvPr>
+        </p:nvSpPr>
+        <p:spPr>
+          <a:xfrm>
+            <a:off x="3645105" y="4155753"/>
+            <a:ext cx="3083291" cy="2380509"/>
+          </a:xfrm>
+          <a:prstGeom prst="rect">
+            <a:avLst/>
+          </a:prstGeom>
+          <a:solidFill>
+            <a:srgbClr val="FFFFFF"/>
+          </a:solidFill>
+          <a:ln w="15875" cap="sq">
+            <a:noFill/>
+            <a:miter lim="800000"/>
+          </a:ln>
+        </p:spPr>
+        <p:style>
+          <a:lnRef idx="2">
+            <a:schemeClr val="accent1">
+              <a:shade val="50000"/>
+            </a:schemeClr>
+          </a:lnRef>
+          <a:fillRef idx="1">
+            <a:schemeClr val="accent1"/>
+          </a:fillRef>
+          <a:effectRef idx="0">
+            <a:schemeClr val="accent1"/>
+          </a:effectRef>
+          <a:fontRef idx="minor">
+            <a:schemeClr val="lt1"/>
+          </a:fontRef>
+        </p:style>
+        <p:txBody>
+          <a:bodyPr rtlCol="0" anchor="ctr"/>
+          <a:lstStyle/>
+          <a:p>
+            <a:pPr marL="0" marR="0" lvl="0" indent="0" algn="ctr" defTabSz="914400" rtl="0" eaLnBrk="1" fontAlgn="auto" latinLnBrk="0" hangingPunct="1">
+              <a:lnSpc>
+                <a:spcPct val="100000"/>
+              </a:lnSpc>
+              <a:spcBef>
+                <a:spcPts val="0"/>
+              </a:spcBef>
+              <a:spcAft>
+                <a:spcPts val="0"/>
+              </a:spcAft>
+              <a:buClrTx/>
+              <a:buSzTx/>
+              <a:buFontTx/>
+              <a:buNone/>
+              <a:tabLst/>
+              <a:defRPr/>
+            </a:pPr>
+            <a:endParaRPr kumimoji="0" lang="en-US" sz="1800" b="0" i="0" u="none" strike="noStrike" kern="1200" cap="none" spc="0" normalizeH="0" baseline="0" noProof="0">
+              <a:ln>
+                <a:noFill/>
+              </a:ln>
+              <a:solidFill>
+                <a:prstClr val="white"/>
+              </a:solidFill>
+              <a:effectLst/>
+              <a:uLnTx/>
+              <a:uFillTx/>
+              <a:latin typeface="Calibri" panose="020F0502020204030204"/>
+              <a:ea typeface="+mn-ea"/>
+              <a:cs typeface="+mn-cs"/>
+            </a:endParaRPr>
+          </a:p>
+        </p:txBody>
+      </p:sp>
+      <p:sp>
+        <p:nvSpPr>
+          <p:cNvPr id="27" name="Rectangle 26">
+            <a:extLst>
+              <a:ext uri="{FF2B5EF4-FFF2-40B4-BE49-F238E27FC236}">
+                <a16:creationId xmlns:a16="http://schemas.microsoft.com/office/drawing/2014/main" id="{80E1AEAE-1F52-4C29-925C-27738417E9F5}"/>
+              </a:ext>
+              <a:ext uri="{C183D7F6-B498-43B3-948B-1728B52AA6E4}">
+                <adec:decorative xmlns:adec="http://schemas.microsoft.com/office/drawing/2017/decorative" val="1"/>
+              </a:ext>
+            </a:extLst>
+          </p:cNvPr>
+          <p:cNvSpPr>
+            <a:spLocks noGrp="1" noRot="1" noChangeAspect="1" noMove="1" noResize="1" noEditPoints="1" noAdjustHandles="1" noChangeArrowheads="1" noChangeShapeType="1" noTextEdit="1"/>
+          </p:cNvSpPr>
+          <p:nvPr>
+            <p:extLst>
+              <p:ext uri="{386F3935-93C4-4BCD-93E2-E3B085C9AB24}">
+                <p16:designElem xmlns:p16="http://schemas.microsoft.com/office/powerpoint/2015/main" val="1"/>
+              </p:ext>
+            </p:extLst>
+          </p:nvPr>
+        </p:nvSpPr>
+        <p:spPr>
+          <a:xfrm>
+            <a:off x="6838617" y="3509431"/>
+            <a:ext cx="2074512" cy="3026832"/>
+          </a:xfrm>
+          <a:prstGeom prst="rect">
+            <a:avLst/>
+          </a:prstGeom>
+          <a:solidFill>
+            <a:srgbClr val="FFFFFF"/>
+          </a:solidFill>
+          <a:ln w="15875" cap="sq">
+            <a:noFill/>
+            <a:miter lim="800000"/>
+          </a:ln>
+        </p:spPr>
+        <p:style>
+          <a:lnRef idx="2">
+            <a:schemeClr val="accent1">
+              <a:shade val="50000"/>
+            </a:schemeClr>
+          </a:lnRef>
+          <a:fillRef idx="1">
+            <a:schemeClr val="accent1"/>
+          </a:fillRef>
+          <a:effectRef idx="0">
+            <a:schemeClr val="accent1"/>
+          </a:effectRef>
+          <a:fontRef idx="minor">
+            <a:schemeClr val="lt1"/>
+          </a:fontRef>
+        </p:style>
+        <p:txBody>
+          <a:bodyPr rtlCol="0" anchor="ctr"/>
+          <a:lstStyle/>
+          <a:p>
+            <a:pPr marL="0" marR="0" lvl="0" indent="0" algn="ctr" defTabSz="914400" rtl="0" eaLnBrk="1" fontAlgn="auto" latinLnBrk="0" hangingPunct="1">
+              <a:lnSpc>
+                <a:spcPct val="100000"/>
+              </a:lnSpc>
+              <a:spcBef>
+                <a:spcPts val="0"/>
+              </a:spcBef>
+              <a:spcAft>
+                <a:spcPts val="0"/>
+              </a:spcAft>
+              <a:buClrTx/>
+              <a:buSzTx/>
+              <a:buFontTx/>
+              <a:buNone/>
+              <a:tabLst/>
+              <a:defRPr/>
+            </a:pPr>
+            <a:endParaRPr kumimoji="0" lang="en-US" sz="1800" b="0" i="0" u="none" strike="noStrike" kern="1200" cap="none" spc="0" normalizeH="0" baseline="0" noProof="0">
+              <a:ln>
+                <a:noFill/>
+              </a:ln>
+              <a:solidFill>
+                <a:prstClr val="white"/>
+              </a:solidFill>
+              <a:effectLst/>
+              <a:uLnTx/>
+              <a:uFillTx/>
+              <a:latin typeface="Calibri" panose="020F0502020204030204"/>
+              <a:ea typeface="+mn-ea"/>
+              <a:cs typeface="+mn-cs"/>
+            </a:endParaRPr>
+          </a:p>
+        </p:txBody>
+      </p:sp>
+      <p:pic>
+        <p:nvPicPr>
+          <p:cNvPr id="11" name="Graphic 10" descr="Group brainstorm">
+            <a:extLst>
+              <a:ext uri="{FF2B5EF4-FFF2-40B4-BE49-F238E27FC236}">
+                <a16:creationId xmlns:a16="http://schemas.microsoft.com/office/drawing/2014/main" id="{6FE323D0-DCDA-43E3-9D81-CAC9F2C4681C}"/>
+              </a:ext>
+            </a:extLst>
+          </p:cNvPr>
+          <p:cNvPicPr>
+            <a:picLocks noChangeAspect="1"/>
+          </p:cNvPicPr>
+          <p:nvPr/>
+        </p:nvPicPr>
+        <p:blipFill>
+          <a:blip r:embed="rId6">
+            <a:extLst>
+              <a:ext uri="{28A0092B-C50C-407E-A947-70E740481C1C}">
+                <a14:useLocalDpi xmlns:a14="http://schemas.microsoft.com/office/drawing/2010/main" val="0"/>
+              </a:ext>
+              <a:ext uri="{96DAC541-7B7A-43D3-8B79-37D633B846F1}">
+                <asvg:svgBlip xmlns:asvg="http://schemas.microsoft.com/office/drawing/2016/SVG/main" r:embed="rId7"/>
+              </a:ext>
+            </a:extLst>
+          </a:blip>
+          <a:stretch>
+            <a:fillRect/>
+          </a:stretch>
+        </p:blipFill>
+        <p:spPr>
+          <a:xfrm>
+            <a:off x="6959729" y="4112642"/>
+            <a:ext cx="1828877" cy="1828877"/>
           </a:xfrm>
           <a:prstGeom prst="rect">
             <a:avLst/>
@@ -7659,10 +11087,10 @@
       </p:pic>
       <p:pic>
         <p:nvPicPr>
-          <p:cNvPr id="11" name="Graphic 10" descr="Group brainstorm">
-            <a:extLst>
-              <a:ext uri="{FF2B5EF4-FFF2-40B4-BE49-F238E27FC236}">
-                <a16:creationId xmlns:a16="http://schemas.microsoft.com/office/drawing/2014/main" id="{6FE323D0-DCDA-43E3-9D81-CAC9F2C4681C}"/>
+          <p:cNvPr id="12" name="Picture 11" descr="A close up of a logo&#10;&#10;Description automatically generated">
+            <a:extLst>
+              <a:ext uri="{FF2B5EF4-FFF2-40B4-BE49-F238E27FC236}">
+                <a16:creationId xmlns:a16="http://schemas.microsoft.com/office/drawing/2014/main" id="{C832B25F-435D-4892-9AEA-EC678E6B308F}"/>
               </a:ext>
             </a:extLst>
           </p:cNvPr>
@@ -7672,13 +11100,10 @@
           <p:nvPr/>
         </p:nvPicPr>
         <p:blipFill>
-          <a:blip r:embed="rId5">
+          <a:blip r:embed="rId8">
             <a:extLst>
               <a:ext uri="{28A0092B-C50C-407E-A947-70E740481C1C}">
                 <a14:useLocalDpi xmlns:a14="http://schemas.microsoft.com/office/drawing/2010/main" val="0"/>
-              </a:ext>
-              <a:ext uri="{96DAC541-7B7A-43D3-8B79-37D633B846F1}">
-                <asvg:svgBlip xmlns:asvg="http://schemas.microsoft.com/office/drawing/2016/SVG/main" r:embed="rId6"/>
               </a:ext>
             </a:extLst>
           </a:blip>
@@ -7688,44 +11113,8 @@
         </p:blipFill>
         <p:spPr>
           <a:xfrm>
-            <a:off x="5594889" y="4427532"/>
-            <a:ext cx="2465185" cy="2465185"/>
-          </a:xfrm>
-          <a:prstGeom prst="rect">
-            <a:avLst/>
-          </a:prstGeom>
-        </p:spPr>
-      </p:pic>
-      <p:pic>
-        <p:nvPicPr>
-          <p:cNvPr id="15" name="Picture 14" descr="A picture containing computer&#10;&#10;Description automatically generated">
-            <a:extLst>
-              <a:ext uri="{FF2B5EF4-FFF2-40B4-BE49-F238E27FC236}">
-                <a16:creationId xmlns:a16="http://schemas.microsoft.com/office/drawing/2014/main" id="{ECFBC2A4-6F14-4FC7-AE37-158FC4E00735}"/>
-              </a:ext>
-            </a:extLst>
-          </p:cNvPr>
-          <p:cNvPicPr>
-            <a:picLocks noChangeAspect="1"/>
-          </p:cNvPicPr>
-          <p:nvPr/>
-        </p:nvPicPr>
-        <p:blipFill>
-          <a:blip r:embed="rId7">
-            <a:extLst>
-              <a:ext uri="{28A0092B-C50C-407E-A947-70E740481C1C}">
-                <a14:useLocalDpi xmlns:a14="http://schemas.microsoft.com/office/drawing/2010/main" val="0"/>
-              </a:ext>
-            </a:extLst>
-          </a:blip>
-          <a:stretch>
-            <a:fillRect/>
-          </a:stretch>
-        </p:blipFill>
-        <p:spPr>
-          <a:xfrm>
-            <a:off x="7315175" y="185923"/>
-            <a:ext cx="1572235" cy="1572235"/>
+            <a:off x="4165828" y="4318312"/>
+            <a:ext cx="2014462" cy="2014462"/>
           </a:xfrm>
           <a:prstGeom prst="rect">
             <a:avLst/>
@@ -7740,8 +11129,20 @@
     </p:extLst>
   </p:cSld>
   <p:clrMapOvr>
-    <a:masterClrMapping/>
+    <a:overrideClrMapping bg1="dk1" tx1="lt1" bg2="dk2" tx2="lt2" accent1="accent1" accent2="accent2" accent3="accent3" accent4="accent4" accent5="accent5" accent6="accent6" hlink="hlink" folHlink="folHlink"/>
   </p:clrMapOvr>
+  <mc:AlternateContent xmlns:mc="http://schemas.openxmlformats.org/markup-compatibility/2006">
+    <mc:Choice xmlns:p14="http://schemas.microsoft.com/office/powerpoint/2010/main" Requires="p14">
+      <p:transition spd="slow" p14:dur="1300">
+        <p14:pan dir="u"/>
+      </p:transition>
+    </mc:Choice>
+    <mc:Fallback>
+      <p:transition spd="slow">
+        <p:fade/>
+      </p:transition>
+    </mc:Fallback>
+  </mc:AlternateContent>
 </p:sld>
 </file>
 
@@ -8631,23 +12032,6 @@
 </file>
 
 <file path=customXml/item1.xml><?xml version="1.0" encoding="utf-8"?>
-<p:properties xmlns:p="http://schemas.microsoft.com/office/2006/metadata/properties" xmlns:xsi="http://www.w3.org/2001/XMLSchema-instance" xmlns:pc="http://schemas.microsoft.com/office/infopath/2007/PartnerControls">
-  <documentManagement>
-    <MediaServiceKeyPoints xmlns="71af3243-3dd4-4a8d-8c0d-dd76da1f02a5" xsi:nil="true"/>
-  </documentManagement>
-</p:properties>
-</file>
-
-<file path=customXml/item2.xml><?xml version="1.0" encoding="utf-8"?>
-<?mso-contentType ?>
-<FormTemplates xmlns="http://schemas.microsoft.com/sharepoint/v3/contenttype/forms">
-  <Display>DocumentLibraryForm</Display>
-  <Edit>DocumentLibraryForm</Edit>
-  <New>DocumentLibraryForm</New>
-</FormTemplates>
-</file>
-
-<file path=customXml/item3.xml><?xml version="1.0" encoding="utf-8"?>
 <ct:contentTypeSchema xmlns:ct="http://schemas.microsoft.com/office/2006/metadata/contentType" xmlns:ma="http://schemas.microsoft.com/office/2006/metadata/properties/metaAttributes" ct:_="" ma:_="" ma:contentTypeName="Document" ma:contentTypeID="0x01010079F111ED35F8CC479449609E8A0923A6" ma:contentTypeVersion="11" ma:contentTypeDescription="Create a new document." ma:contentTypeScope="" ma:versionID="96291512c1ee715ab617f4c07df79fc1">
   <xsd:schema xmlns:xsd="http://www.w3.org/2001/XMLSchema" xmlns:xs="http://www.w3.org/2001/XMLSchema" xmlns:p="http://schemas.microsoft.com/office/2006/metadata/properties" xmlns:ns2="71af3243-3dd4-4a8d-8c0d-dd76da1f02a5" xmlns:ns3="16c05727-aa75-4e4a-9b5f-8a80a1165891" targetNamespace="http://schemas.microsoft.com/office/2006/metadata/properties" ma:root="true" ma:fieldsID="8256c27c40ca5c40ce1cf6c44f0205df" ns2:_="" ns3:_="">
     <xsd:import namespace="71af3243-3dd4-4a8d-8c0d-dd76da1f02a5"/>
@@ -8858,25 +12242,24 @@
 </ct:contentTypeSchema>
 </file>
 
-<file path=customXml/itemProps1.xml><?xml version="1.0" encoding="utf-8"?>
-<ds:datastoreItem xmlns:ds="http://schemas.openxmlformats.org/officeDocument/2006/customXml" ds:itemID="{03C7D9E6-B0D9-433E-BD46-EB60F64F4DA8}">
-  <ds:schemaRefs>
-    <ds:schemaRef ds:uri="http://schemas.microsoft.com/office/2006/metadata/properties"/>
-    <ds:schemaRef ds:uri="http://schemas.microsoft.com/office/infopath/2007/PartnerControls"/>
-    <ds:schemaRef ds:uri="71af3243-3dd4-4a8d-8c0d-dd76da1f02a5"/>
-  </ds:schemaRefs>
-</ds:datastoreItem>
+<file path=customXml/item2.xml><?xml version="1.0" encoding="utf-8"?>
+<?mso-contentType ?>
+<FormTemplates xmlns="http://schemas.microsoft.com/sharepoint/v3/contenttype/forms">
+  <Display>DocumentLibraryForm</Display>
+  <Edit>DocumentLibraryForm</Edit>
+  <New>DocumentLibraryForm</New>
+</FormTemplates>
 </file>
 
-<file path=customXml/itemProps2.xml><?xml version="1.0" encoding="utf-8"?>
-<ds:datastoreItem xmlns:ds="http://schemas.openxmlformats.org/officeDocument/2006/customXml" ds:itemID="{5CA875DA-F9FD-4F83-A049-3B1027B542DE}">
-  <ds:schemaRefs>
-    <ds:schemaRef ds:uri="http://schemas.microsoft.com/sharepoint/v3/contenttype/forms"/>
-  </ds:schemaRefs>
-</ds:datastoreItem>
+<file path=customXml/item3.xml><?xml version="1.0" encoding="utf-8"?>
+<p:properties xmlns:p="http://schemas.microsoft.com/office/2006/metadata/properties" xmlns:xsi="http://www.w3.org/2001/XMLSchema-instance" xmlns:pc="http://schemas.microsoft.com/office/infopath/2007/PartnerControls">
+  <documentManagement>
+    <MediaServiceKeyPoints xmlns="71af3243-3dd4-4a8d-8c0d-dd76da1f02a5" xsi:nil="true"/>
+  </documentManagement>
+</p:properties>
 </file>
 
-<file path=customXml/itemProps3.xml><?xml version="1.0" encoding="utf-8"?>
+<file path=customXml/itemProps1.xml><?xml version="1.0" encoding="utf-8"?>
 <ds:datastoreItem xmlns:ds="http://schemas.openxmlformats.org/officeDocument/2006/customXml" ds:itemID="{B2AB02E3-5ADF-4BF0-9C1B-35CDF3FE95B0}">
   <ds:schemaRefs>
     <ds:schemaRef ds:uri="http://schemas.microsoft.com/office/2006/metadata/contentType"/>
@@ -8893,4 +12276,22 @@
     <ds:schemaRef ds:uri="http://schemas.microsoft.com/internal/obd"/>
   </ds:schemaRefs>
 </ds:datastoreItem>
+</file>
+
+<file path=customXml/itemProps2.xml><?xml version="1.0" encoding="utf-8"?>
+<ds:datastoreItem xmlns:ds="http://schemas.openxmlformats.org/officeDocument/2006/customXml" ds:itemID="{5CA875DA-F9FD-4F83-A049-3B1027B542DE}">
+  <ds:schemaRefs>
+    <ds:schemaRef ds:uri="http://schemas.microsoft.com/sharepoint/v3/contenttype/forms"/>
+  </ds:schemaRefs>
+</ds:datastoreItem>
+</file>
+
+<file path=customXml/itemProps3.xml><?xml version="1.0" encoding="utf-8"?>
+<ds:datastoreItem xmlns:ds="http://schemas.openxmlformats.org/officeDocument/2006/customXml" ds:itemID="{03C7D9E6-B0D9-433E-BD46-EB60F64F4DA8}">
+  <ds:schemaRefs>
+    <ds:schemaRef ds:uri="http://schemas.microsoft.com/office/2006/metadata/properties"/>
+    <ds:schemaRef ds:uri="http://schemas.microsoft.com/office/infopath/2007/PartnerControls"/>
+    <ds:schemaRef ds:uri="71af3243-3dd4-4a8d-8c0d-dd76da1f02a5"/>
+  </ds:schemaRefs>
+</ds:datastoreItem>
 </file>
</xml_diff>

<commit_message>
Minor typo fix on slides.
</commit_message>
<xml_diff>
--- a/d3/CSC301 TDSB Education app final presentation.pptx
+++ b/d3/CSC301 TDSB Education app final presentation.pptx
@@ -6739,13 +6739,13 @@
   <p:clrMapOvr>
     <a:masterClrMapping/>
   </p:clrMapOvr>
-  <mc:AlternateContent xmlns:mc="http://schemas.openxmlformats.org/markup-compatibility/2006">
-    <mc:Choice xmlns:p159="http://schemas.microsoft.com/office/powerpoint/2015/09/main" Requires="p159">
+  <mc:AlternateContent xmlns:mc="http://schemas.openxmlformats.org/markup-compatibility/2006" xmlns:p159="http://schemas.microsoft.com/office/powerpoint/2015/09/main">
+    <mc:Choice Requires="p159">
       <p:transition xmlns:p14="http://schemas.microsoft.com/office/powerpoint/2010/main" spd="slow" p14:dur="2000">
         <p159:morph option="byObject"/>
       </p:transition>
     </mc:Choice>
-    <mc:Fallback>
+    <mc:Fallback xmlns="">
       <p:transition spd="slow">
         <p:fade/>
       </p:transition>
@@ -8090,13 +8090,13 @@
   <p:clrMapOvr>
     <a:masterClrMapping/>
   </p:clrMapOvr>
-  <mc:AlternateContent xmlns:mc="http://schemas.openxmlformats.org/markup-compatibility/2006">
-    <mc:Choice xmlns:p15="http://schemas.microsoft.com/office/powerpoint/2012/main" Requires="p15">
+  <mc:AlternateContent xmlns:mc="http://schemas.openxmlformats.org/markup-compatibility/2006" xmlns:p15="http://schemas.microsoft.com/office/powerpoint/2012/main">
+    <mc:Choice Requires="p15">
       <p:transition xmlns:p14="http://schemas.microsoft.com/office/powerpoint/2010/main" spd="slow" p14:dur="2000">
         <p15:prstTrans prst="drape"/>
       </p:transition>
     </mc:Choice>
-    <mc:Fallback>
+    <mc:Fallback xmlns="">
       <p:transition spd="slow">
         <p:fade/>
       </p:transition>
@@ -9895,13 +9895,13 @@
   <p:clrMapOvr>
     <a:masterClrMapping/>
   </p:clrMapOvr>
-  <mc:AlternateContent xmlns:mc="http://schemas.openxmlformats.org/markup-compatibility/2006">
-    <mc:Choice xmlns:p14="http://schemas.microsoft.com/office/powerpoint/2010/main" Requires="p14">
+  <mc:AlternateContent xmlns:mc="http://schemas.openxmlformats.org/markup-compatibility/2006" xmlns:p14="http://schemas.microsoft.com/office/powerpoint/2010/main">
+    <mc:Choice Requires="p14">
       <p:transition spd="slow" p14:dur="1400">
         <p14:doors dir="vert"/>
       </p:transition>
     </mc:Choice>
-    <mc:Fallback>
+    <mc:Fallback xmlns="">
       <p:transition spd="slow">
         <p:fade/>
       </p:transition>
@@ -10299,77 +10299,89 @@
           <a:lstStyle/>
           <a:p>
             <a:r>
+              <a:rPr lang="en-CA" dirty="0"/>
+              <a:t>Creating internal APIs to connect Google Classroom and Cloud </a:t>
+            </a:r>
+            <a:r>
               <a:rPr lang="en-CA"/>
-              <a:t>Creating internal APIs to connect Google Classroom and Cloud </a:t>
-            </a:r>
-            <a:r>
-              <a:rPr lang="en-CA" err="1"/>
               <a:t>Firestore</a:t>
             </a:r>
             <a:r>
-              <a:rPr lang="en-CA"/>
+              <a:rPr lang="en-CA" dirty="0"/>
               <a:t> to our application</a:t>
             </a:r>
           </a:p>
           <a:p>
-            <a:endParaRPr lang="en-CA">
+            <a:endParaRPr lang="en-CA" dirty="0">
               <a:cs typeface="Calibri"/>
             </a:endParaRPr>
           </a:p>
           <a:p>
             <a:r>
-              <a:rPr lang="en-CA">
+              <a:rPr lang="en-CA" dirty="0">
                 <a:cs typeface="Calibri"/>
               </a:rPr>
               <a:t>Written in Dart</a:t>
             </a:r>
           </a:p>
           <a:p>
-            <a:endParaRPr lang="en-CA">
+            <a:endParaRPr lang="en-CA" dirty="0">
               <a:cs typeface="Calibri"/>
             </a:endParaRPr>
           </a:p>
           <a:p>
             <a:r>
-              <a:rPr lang="en-CA">
+              <a:rPr lang="en-CA" dirty="0" err="1">
                 <a:cs typeface="Calibri"/>
               </a:rPr>
-              <a:t>ClassroomApiAccess – Wrapper for the Google Classroom API, allows us to pull information from Classroom</a:t>
-            </a:r>
-          </a:p>
-          <a:p>
-            <a:endParaRPr lang="en-CA">
+              <a:t>ClassroomApiAccess</a:t>
+            </a:r>
+            <a:r>
+              <a:rPr lang="en-CA" dirty="0">
+                <a:cs typeface="Calibri"/>
+              </a:rPr>
+              <a:t> – Wrapper for the Google Classroom API, allows us to pull information from Classroom</a:t>
+            </a:r>
+          </a:p>
+          <a:p>
+            <a:endParaRPr lang="en-CA" dirty="0">
               <a:cs typeface="Calibri"/>
             </a:endParaRPr>
           </a:p>
           <a:p>
             <a:r>
-              <a:rPr lang="en-CA">
+              <a:rPr lang="en-CA" dirty="0" err="1">
                 <a:cs typeface="Calibri"/>
               </a:rPr>
-              <a:t>FirestoreManager – DAO that communicates with out database</a:t>
-            </a:r>
-          </a:p>
-          <a:p>
-            <a:endParaRPr lang="en-CA">
+              <a:t>FirestoreManager</a:t>
+            </a:r>
+            <a:r>
+              <a:rPr lang="en-CA" dirty="0">
+                <a:cs typeface="Calibri"/>
+              </a:rPr>
+              <a:t> – DAO that communicates without database</a:t>
+            </a:r>
+          </a:p>
+          <a:p>
+            <a:endParaRPr lang="en-CA" dirty="0">
               <a:cs typeface="Calibri"/>
             </a:endParaRPr>
           </a:p>
           <a:p>
             <a:r>
-              <a:rPr lang="en-CA">
+              <a:rPr lang="en-CA" dirty="0">
                 <a:cs typeface="Calibri"/>
               </a:rPr>
               <a:t>Chose Firebase (NoSQL)</a:t>
             </a:r>
           </a:p>
           <a:p>
-            <a:endParaRPr lang="en-CA">
+            <a:endParaRPr lang="en-CA" dirty="0">
               <a:cs typeface="Calibri"/>
             </a:endParaRPr>
           </a:p>
           <a:p>
-            <a:endParaRPr lang="en-CA">
+            <a:endParaRPr lang="en-CA" dirty="0">
               <a:cs typeface="Calibri"/>
             </a:endParaRPr>
           </a:p>
@@ -10377,7 +10389,7 @@
             <a:pPr marL="0" indent="0">
               <a:buNone/>
             </a:pPr>
-            <a:endParaRPr lang="en-CA">
+            <a:endParaRPr lang="en-CA" dirty="0">
               <a:cs typeface="Calibri"/>
             </a:endParaRPr>
           </a:p>
@@ -11131,13 +11143,13 @@
   <p:clrMapOvr>
     <a:overrideClrMapping bg1="dk1" tx1="lt1" bg2="dk2" tx2="lt2" accent1="accent1" accent2="accent2" accent3="accent3" accent4="accent4" accent5="accent5" accent6="accent6" hlink="hlink" folHlink="folHlink"/>
   </p:clrMapOvr>
-  <mc:AlternateContent xmlns:mc="http://schemas.openxmlformats.org/markup-compatibility/2006">
-    <mc:Choice xmlns:p14="http://schemas.microsoft.com/office/powerpoint/2010/main" Requires="p14">
+  <mc:AlternateContent xmlns:mc="http://schemas.openxmlformats.org/markup-compatibility/2006" xmlns:p14="http://schemas.microsoft.com/office/powerpoint/2010/main">
+    <mc:Choice Requires="p14">
       <p:transition spd="slow" p14:dur="1300">
         <p14:pan dir="u"/>
       </p:transition>
     </mc:Choice>
-    <mc:Fallback>
+    <mc:Fallback xmlns="">
       <p:transition spd="slow">
         <p:fade/>
       </p:transition>
@@ -12032,6 +12044,23 @@
 </file>
 
 <file path=customXml/item1.xml><?xml version="1.0" encoding="utf-8"?>
+<p:properties xmlns:p="http://schemas.microsoft.com/office/2006/metadata/properties" xmlns:xsi="http://www.w3.org/2001/XMLSchema-instance" xmlns:pc="http://schemas.microsoft.com/office/infopath/2007/PartnerControls">
+  <documentManagement>
+    <MediaServiceKeyPoints xmlns="71af3243-3dd4-4a8d-8c0d-dd76da1f02a5" xsi:nil="true"/>
+  </documentManagement>
+</p:properties>
+</file>
+
+<file path=customXml/item2.xml><?xml version="1.0" encoding="utf-8"?>
+<?mso-contentType ?>
+<FormTemplates xmlns="http://schemas.microsoft.com/sharepoint/v3/contenttype/forms">
+  <Display>DocumentLibraryForm</Display>
+  <Edit>DocumentLibraryForm</Edit>
+  <New>DocumentLibraryForm</New>
+</FormTemplates>
+</file>
+
+<file path=customXml/item3.xml><?xml version="1.0" encoding="utf-8"?>
 <ct:contentTypeSchema xmlns:ct="http://schemas.microsoft.com/office/2006/metadata/contentType" xmlns:ma="http://schemas.microsoft.com/office/2006/metadata/properties/metaAttributes" ct:_="" ma:_="" ma:contentTypeName="Document" ma:contentTypeID="0x01010079F111ED35F8CC479449609E8A0923A6" ma:contentTypeVersion="11" ma:contentTypeDescription="Create a new document." ma:contentTypeScope="" ma:versionID="96291512c1ee715ab617f4c07df79fc1">
   <xsd:schema xmlns:xsd="http://www.w3.org/2001/XMLSchema" xmlns:xs="http://www.w3.org/2001/XMLSchema" xmlns:p="http://schemas.microsoft.com/office/2006/metadata/properties" xmlns:ns2="71af3243-3dd4-4a8d-8c0d-dd76da1f02a5" xmlns:ns3="16c05727-aa75-4e4a-9b5f-8a80a1165891" targetNamespace="http://schemas.microsoft.com/office/2006/metadata/properties" ma:root="true" ma:fieldsID="8256c27c40ca5c40ce1cf6c44f0205df" ns2:_="" ns3:_="">
     <xsd:import namespace="71af3243-3dd4-4a8d-8c0d-dd76da1f02a5"/>
@@ -12242,24 +12271,25 @@
 </ct:contentTypeSchema>
 </file>
 
-<file path=customXml/item2.xml><?xml version="1.0" encoding="utf-8"?>
-<?mso-contentType ?>
-<FormTemplates xmlns="http://schemas.microsoft.com/sharepoint/v3/contenttype/forms">
-  <Display>DocumentLibraryForm</Display>
-  <Edit>DocumentLibraryForm</Edit>
-  <New>DocumentLibraryForm</New>
-</FormTemplates>
+<file path=customXml/itemProps1.xml><?xml version="1.0" encoding="utf-8"?>
+<ds:datastoreItem xmlns:ds="http://schemas.openxmlformats.org/officeDocument/2006/customXml" ds:itemID="{03C7D9E6-B0D9-433E-BD46-EB60F64F4DA8}">
+  <ds:schemaRefs>
+    <ds:schemaRef ds:uri="http://schemas.microsoft.com/office/2006/metadata/properties"/>
+    <ds:schemaRef ds:uri="http://schemas.microsoft.com/office/infopath/2007/PartnerControls"/>
+    <ds:schemaRef ds:uri="71af3243-3dd4-4a8d-8c0d-dd76da1f02a5"/>
+  </ds:schemaRefs>
+</ds:datastoreItem>
 </file>
 
-<file path=customXml/item3.xml><?xml version="1.0" encoding="utf-8"?>
-<p:properties xmlns:p="http://schemas.microsoft.com/office/2006/metadata/properties" xmlns:xsi="http://www.w3.org/2001/XMLSchema-instance" xmlns:pc="http://schemas.microsoft.com/office/infopath/2007/PartnerControls">
-  <documentManagement>
-    <MediaServiceKeyPoints xmlns="71af3243-3dd4-4a8d-8c0d-dd76da1f02a5" xsi:nil="true"/>
-  </documentManagement>
-</p:properties>
+<file path=customXml/itemProps2.xml><?xml version="1.0" encoding="utf-8"?>
+<ds:datastoreItem xmlns:ds="http://schemas.openxmlformats.org/officeDocument/2006/customXml" ds:itemID="{5CA875DA-F9FD-4F83-A049-3B1027B542DE}">
+  <ds:schemaRefs>
+    <ds:schemaRef ds:uri="http://schemas.microsoft.com/sharepoint/v3/contenttype/forms"/>
+  </ds:schemaRefs>
+</ds:datastoreItem>
 </file>
 
-<file path=customXml/itemProps1.xml><?xml version="1.0" encoding="utf-8"?>
+<file path=customXml/itemProps3.xml><?xml version="1.0" encoding="utf-8"?>
 <ds:datastoreItem xmlns:ds="http://schemas.openxmlformats.org/officeDocument/2006/customXml" ds:itemID="{B2AB02E3-5ADF-4BF0-9C1B-35CDF3FE95B0}">
   <ds:schemaRefs>
     <ds:schemaRef ds:uri="http://schemas.microsoft.com/office/2006/metadata/contentType"/>
@@ -12276,22 +12306,4 @@
     <ds:schemaRef ds:uri="http://schemas.microsoft.com/internal/obd"/>
   </ds:schemaRefs>
 </ds:datastoreItem>
-</file>
-
-<file path=customXml/itemProps2.xml><?xml version="1.0" encoding="utf-8"?>
-<ds:datastoreItem xmlns:ds="http://schemas.openxmlformats.org/officeDocument/2006/customXml" ds:itemID="{5CA875DA-F9FD-4F83-A049-3B1027B542DE}">
-  <ds:schemaRefs>
-    <ds:schemaRef ds:uri="http://schemas.microsoft.com/sharepoint/v3/contenttype/forms"/>
-  </ds:schemaRefs>
-</ds:datastoreItem>
-</file>
-
-<file path=customXml/itemProps3.xml><?xml version="1.0" encoding="utf-8"?>
-<ds:datastoreItem xmlns:ds="http://schemas.openxmlformats.org/officeDocument/2006/customXml" ds:itemID="{03C7D9E6-B0D9-433E-BD46-EB60F64F4DA8}">
-  <ds:schemaRefs>
-    <ds:schemaRef ds:uri="http://schemas.microsoft.com/office/2006/metadata/properties"/>
-    <ds:schemaRef ds:uri="http://schemas.microsoft.com/office/infopath/2007/PartnerControls"/>
-    <ds:schemaRef ds:uri="71af3243-3dd4-4a8d-8c0d-dd76da1f02a5"/>
-  </ds:schemaRefs>
-</ds:datastoreItem>
 </file>
</xml_diff>